<commit_message>
powerpoint and new ACM doc
</commit_message>
<xml_diff>
--- a/Presentación DataMiningHealth.pptx
+++ b/Presentación DataMiningHealth.pptx
@@ -5,7 +5,7 @@
     <p:sldMasterId id="2147483711" r:id="rId1"/>
   </p:sldMasterIdLst>
   <p:notesMasterIdLst>
-    <p:notesMasterId r:id="rId22"/>
+    <p:notesMasterId r:id="rId46"/>
   </p:notesMasterIdLst>
   <p:sldIdLst>
     <p:sldId id="256" r:id="rId2"/>
@@ -28,6 +28,30 @@
     <p:sldId id="272" r:id="rId19"/>
     <p:sldId id="273" r:id="rId20"/>
     <p:sldId id="274" r:id="rId21"/>
+    <p:sldId id="276" r:id="rId22"/>
+    <p:sldId id="277" r:id="rId23"/>
+    <p:sldId id="278" r:id="rId24"/>
+    <p:sldId id="279" r:id="rId25"/>
+    <p:sldId id="280" r:id="rId26"/>
+    <p:sldId id="281" r:id="rId27"/>
+    <p:sldId id="282" r:id="rId28"/>
+    <p:sldId id="283" r:id="rId29"/>
+    <p:sldId id="284" r:id="rId30"/>
+    <p:sldId id="285" r:id="rId31"/>
+    <p:sldId id="286" r:id="rId32"/>
+    <p:sldId id="287" r:id="rId33"/>
+    <p:sldId id="288" r:id="rId34"/>
+    <p:sldId id="289" r:id="rId35"/>
+    <p:sldId id="290" r:id="rId36"/>
+    <p:sldId id="291" r:id="rId37"/>
+    <p:sldId id="292" r:id="rId38"/>
+    <p:sldId id="293" r:id="rId39"/>
+    <p:sldId id="294" r:id="rId40"/>
+    <p:sldId id="295" r:id="rId41"/>
+    <p:sldId id="296" r:id="rId42"/>
+    <p:sldId id="297" r:id="rId43"/>
+    <p:sldId id="298" r:id="rId44"/>
+    <p:sldId id="299" r:id="rId45"/>
   </p:sldIdLst>
   <p:sldSz cx="12192000" cy="6858000"/>
   <p:notesSz cx="6858000" cy="9144000"/>
@@ -228,7 +252,7 @@
           <a:p>
             <a:fld id="{C230A0C7-110F-445E-B540-501A2B1F546E}" type="datetimeFigureOut">
               <a:rPr lang="es-ES" smtClean="0"/>
-              <a:t>28/12/2019</a:t>
+              <a:t>29/12/2019</a:t>
             </a:fld>
             <a:endParaRPr lang="es-ES"/>
           </a:p>
@@ -1343,7 +1367,7 @@
           <a:p>
             <a:fld id="{84A2E3DD-9BCF-4B36-A258-34DF4D8074F3}" type="datetimeFigureOut">
               <a:rPr lang="es-ES" smtClean="0"/>
-              <a:t>28/12/2019</a:t>
+              <a:t>29/12/2019</a:t>
             </a:fld>
             <a:endParaRPr lang="es-ES"/>
           </a:p>
@@ -1594,7 +1618,7 @@
           <a:p>
             <a:fld id="{84A2E3DD-9BCF-4B36-A258-34DF4D8074F3}" type="datetimeFigureOut">
               <a:rPr lang="es-ES" smtClean="0"/>
-              <a:t>28/12/2019</a:t>
+              <a:t>29/12/2019</a:t>
             </a:fld>
             <a:endParaRPr lang="es-ES"/>
           </a:p>
@@ -1908,7 +1932,7 @@
           <a:p>
             <a:fld id="{84A2E3DD-9BCF-4B36-A258-34DF4D8074F3}" type="datetimeFigureOut">
               <a:rPr lang="es-ES" smtClean="0"/>
-              <a:t>28/12/2019</a:t>
+              <a:t>29/12/2019</a:t>
             </a:fld>
             <a:endParaRPr lang="es-ES"/>
           </a:p>
@@ -2241,7 +2265,7 @@
           <a:p>
             <a:fld id="{84A2E3DD-9BCF-4B36-A258-34DF4D8074F3}" type="datetimeFigureOut">
               <a:rPr lang="es-ES" smtClean="0"/>
-              <a:t>28/12/2019</a:t>
+              <a:t>29/12/2019</a:t>
             </a:fld>
             <a:endParaRPr lang="es-ES"/>
           </a:p>
@@ -2555,7 +2579,7 @@
           <a:p>
             <a:fld id="{84A2E3DD-9BCF-4B36-A258-34DF4D8074F3}" type="datetimeFigureOut">
               <a:rPr lang="es-ES" smtClean="0"/>
-              <a:t>28/12/2019</a:t>
+              <a:t>29/12/2019</a:t>
             </a:fld>
             <a:endParaRPr lang="es-ES"/>
           </a:p>
@@ -2948,7 +2972,7 @@
           <a:p>
             <a:fld id="{84A2E3DD-9BCF-4B36-A258-34DF4D8074F3}" type="datetimeFigureOut">
               <a:rPr lang="es-ES" smtClean="0"/>
-              <a:t>28/12/2019</a:t>
+              <a:t>29/12/2019</a:t>
             </a:fld>
             <a:endParaRPr lang="es-ES"/>
           </a:p>
@@ -3118,7 +3142,7 @@
           <a:p>
             <a:fld id="{84A2E3DD-9BCF-4B36-A258-34DF4D8074F3}" type="datetimeFigureOut">
               <a:rPr lang="es-ES" smtClean="0"/>
-              <a:t>28/12/2019</a:t>
+              <a:t>29/12/2019</a:t>
             </a:fld>
             <a:endParaRPr lang="es-ES"/>
           </a:p>
@@ -3298,7 +3322,7 @@
           <a:p>
             <a:fld id="{84A2E3DD-9BCF-4B36-A258-34DF4D8074F3}" type="datetimeFigureOut">
               <a:rPr lang="es-ES" smtClean="0"/>
-              <a:t>28/12/2019</a:t>
+              <a:t>29/12/2019</a:t>
             </a:fld>
             <a:endParaRPr lang="es-ES"/>
           </a:p>
@@ -3468,7 +3492,7 @@
           <a:p>
             <a:fld id="{84A2E3DD-9BCF-4B36-A258-34DF4D8074F3}" type="datetimeFigureOut">
               <a:rPr lang="es-ES" smtClean="0"/>
-              <a:t>28/12/2019</a:t>
+              <a:t>29/12/2019</a:t>
             </a:fld>
             <a:endParaRPr lang="es-ES"/>
           </a:p>
@@ -3715,7 +3739,7 @@
           <a:p>
             <a:fld id="{84A2E3DD-9BCF-4B36-A258-34DF4D8074F3}" type="datetimeFigureOut">
               <a:rPr lang="es-ES" smtClean="0"/>
-              <a:t>28/12/2019</a:t>
+              <a:t>29/12/2019</a:t>
             </a:fld>
             <a:endParaRPr lang="es-ES"/>
           </a:p>
@@ -3947,7 +3971,7 @@
           <a:p>
             <a:fld id="{84A2E3DD-9BCF-4B36-A258-34DF4D8074F3}" type="datetimeFigureOut">
               <a:rPr lang="es-ES" smtClean="0"/>
-              <a:t>28/12/2019</a:t>
+              <a:t>29/12/2019</a:t>
             </a:fld>
             <a:endParaRPr lang="es-ES"/>
           </a:p>
@@ -4321,7 +4345,7 @@
           <a:p>
             <a:fld id="{84A2E3DD-9BCF-4B36-A258-34DF4D8074F3}" type="datetimeFigureOut">
               <a:rPr lang="es-ES" smtClean="0"/>
-              <a:t>28/12/2019</a:t>
+              <a:t>29/12/2019</a:t>
             </a:fld>
             <a:endParaRPr lang="es-ES"/>
           </a:p>
@@ -4444,7 +4468,7 @@
           <a:p>
             <a:fld id="{84A2E3DD-9BCF-4B36-A258-34DF4D8074F3}" type="datetimeFigureOut">
               <a:rPr lang="es-ES" smtClean="0"/>
-              <a:t>28/12/2019</a:t>
+              <a:t>29/12/2019</a:t>
             </a:fld>
             <a:endParaRPr lang="es-ES"/>
           </a:p>
@@ -4539,7 +4563,7 @@
           <a:p>
             <a:fld id="{84A2E3DD-9BCF-4B36-A258-34DF4D8074F3}" type="datetimeFigureOut">
               <a:rPr lang="es-ES" smtClean="0"/>
-              <a:t>28/12/2019</a:t>
+              <a:t>29/12/2019</a:t>
             </a:fld>
             <a:endParaRPr lang="es-ES"/>
           </a:p>
@@ -4794,7 +4818,7 @@
           <a:p>
             <a:fld id="{84A2E3DD-9BCF-4B36-A258-34DF4D8074F3}" type="datetimeFigureOut">
               <a:rPr lang="es-ES" smtClean="0"/>
-              <a:t>28/12/2019</a:t>
+              <a:t>29/12/2019</a:t>
             </a:fld>
             <a:endParaRPr lang="es-ES"/>
           </a:p>
@@ -5099,7 +5123,7 @@
           <a:p>
             <a:fld id="{84A2E3DD-9BCF-4B36-A258-34DF4D8074F3}" type="datetimeFigureOut">
               <a:rPr lang="es-ES" smtClean="0"/>
-              <a:t>28/12/2019</a:t>
+              <a:t>29/12/2019</a:t>
             </a:fld>
             <a:endParaRPr lang="es-ES"/>
           </a:p>
@@ -5801,7 +5825,7 @@
           <a:p>
             <a:fld id="{84A2E3DD-9BCF-4B36-A258-34DF4D8074F3}" type="datetimeFigureOut">
               <a:rPr lang="es-ES" smtClean="0"/>
-              <a:t>28/12/2019</a:t>
+              <a:t>29/12/2019</a:t>
             </a:fld>
             <a:endParaRPr lang="es-ES"/>
           </a:p>
@@ -6450,7 +6474,7 @@
           <a:p>
             <a:r>
               <a:rPr lang="es-ES" dirty="0"/>
-              <a:t>2. Primera iteración: </a:t>
+              <a:t>2.1. Primera iteración: </a:t>
             </a:r>
             <a:r>
               <a:rPr lang="es-ES" dirty="0" err="1"/>
@@ -6608,7 +6632,7 @@
           <a:p>
             <a:r>
               <a:rPr lang="es-ES" dirty="0"/>
-              <a:t>2. Primera iteración: </a:t>
+              <a:t>2.1. Primera iteración: </a:t>
             </a:r>
             <a:r>
               <a:rPr lang="es-ES" dirty="0" err="1"/>
@@ -6834,7 +6858,7 @@
           <a:p>
             <a:r>
               <a:rPr lang="es-ES" dirty="0"/>
-              <a:t>2. Primera iteración: </a:t>
+              <a:t>2.1. Primera iteración: </a:t>
             </a:r>
             <a:r>
               <a:rPr lang="es-ES" dirty="0" err="1"/>
@@ -7026,7 +7050,7 @@
           <a:p>
             <a:r>
               <a:rPr lang="es-ES" dirty="0"/>
-              <a:t>2. Primera iteración: </a:t>
+              <a:t>2.1. Primera iteración: </a:t>
             </a:r>
             <a:r>
               <a:rPr lang="es-ES" dirty="0" err="1"/>
@@ -7203,7 +7227,7 @@
           <a:p>
             <a:r>
               <a:rPr lang="es-ES" dirty="0"/>
-              <a:t>2. Primera iteración: </a:t>
+              <a:t>2.1. Primera iteración: </a:t>
             </a:r>
             <a:r>
               <a:rPr lang="es-ES" dirty="0" err="1"/>
@@ -7333,7 +7357,7 @@
           <a:p>
             <a:r>
               <a:rPr lang="es-ES" dirty="0"/>
-              <a:t>2. Primera iteración: </a:t>
+              <a:t>2.1. Primera iteración: </a:t>
             </a:r>
             <a:r>
               <a:rPr lang="es-ES" dirty="0" err="1"/>
@@ -7502,7 +7526,7 @@
           <a:p>
             <a:r>
               <a:rPr lang="es-ES" dirty="0"/>
-              <a:t>2. Primera iteración: data </a:t>
+              <a:t>2.1. Primera iteración: data </a:t>
             </a:r>
             <a:r>
               <a:rPr lang="es-ES" dirty="0" err="1"/>
@@ -7557,7 +7581,7 @@
             </a:pPr>
             <a:r>
               <a:rPr lang="es-ES" dirty="0"/>
-              <a:t>				</a:t>
+              <a:t>						</a:t>
             </a:r>
             <a:r>
               <a:rPr lang="es-ES" sz="3600" dirty="0"/>
@@ -7639,7 +7663,7 @@
           <a:p>
             <a:r>
               <a:rPr lang="es-ES" dirty="0"/>
-              <a:t>2. Primera iteración: data </a:t>
+              <a:t>2.1. Primera iteración: data </a:t>
             </a:r>
             <a:r>
               <a:rPr lang="es-ES" dirty="0" err="1"/>
@@ -7769,7 +7793,7 @@
           <a:p>
             <a:r>
               <a:rPr lang="es-ES" dirty="0"/>
-              <a:t>2. Primera iteración: data </a:t>
+              <a:t>2.1. Primera iteración: data </a:t>
             </a:r>
             <a:r>
               <a:rPr lang="es-ES" dirty="0" err="1"/>
@@ -7894,7 +7918,7 @@
           <a:p>
             <a:r>
               <a:rPr lang="es-ES" dirty="0"/>
-              <a:t>2. Primera iteración: data </a:t>
+              <a:t>2.1. Primera iteración: data </a:t>
             </a:r>
             <a:r>
               <a:rPr lang="es-ES" dirty="0" err="1"/>
@@ -8070,7 +8094,12 @@
             <p:ph idx="1"/>
           </p:nvPr>
         </p:nvSpPr>
-        <p:spPr/>
+        <p:spPr>
+          <a:xfrm>
+            <a:off x="677334" y="1930400"/>
+            <a:ext cx="8596668" cy="3880773"/>
+          </a:xfrm>
+        </p:spPr>
         <p:txBody>
           <a:bodyPr/>
           <a:lstStyle/>
@@ -8192,7 +8221,7 @@
           <a:p>
             <a:r>
               <a:rPr lang="es-ES" dirty="0"/>
-              <a:t>2. Primera iteración: data </a:t>
+              <a:t>2.1. Primera iteración: data </a:t>
             </a:r>
             <a:r>
               <a:rPr lang="es-ES" dirty="0" err="1"/>
@@ -8315,6 +8344,1281 @@
 </p:sld>
 </file>
 
+<file path=ppt/slides/slide21.xml><?xml version="1.0" encoding="utf-8"?>
+<p:sld xmlns:a="http://schemas.openxmlformats.org/drawingml/2006/main" xmlns:r="http://schemas.openxmlformats.org/officeDocument/2006/relationships" xmlns:p="http://schemas.openxmlformats.org/presentationml/2006/main">
+  <p:cSld>
+    <p:spTree>
+      <p:nvGrpSpPr>
+        <p:cNvPr id="1" name=""/>
+        <p:cNvGrpSpPr/>
+        <p:nvPr/>
+      </p:nvGrpSpPr>
+      <p:grpSpPr>
+        <a:xfrm>
+          <a:off x="0" y="0"/>
+          <a:ext cx="0" cy="0"/>
+          <a:chOff x="0" y="0"/>
+          <a:chExt cx="0" cy="0"/>
+        </a:xfrm>
+      </p:grpSpPr>
+      <p:sp>
+        <p:nvSpPr>
+          <p:cNvPr id="2" name="Título 1">
+            <a:extLst>
+              <a:ext uri="{FF2B5EF4-FFF2-40B4-BE49-F238E27FC236}">
+                <a16:creationId xmlns:a16="http://schemas.microsoft.com/office/drawing/2014/main" id="{713C02B5-CD52-4C57-A973-686529F05156}"/>
+              </a:ext>
+            </a:extLst>
+          </p:cNvPr>
+          <p:cNvSpPr>
+            <a:spLocks noGrp="1"/>
+          </p:cNvSpPr>
+          <p:nvPr>
+            <p:ph type="title"/>
+          </p:nvPr>
+        </p:nvSpPr>
+        <p:spPr/>
+        <p:txBody>
+          <a:bodyPr/>
+          <a:lstStyle/>
+          <a:p>
+            <a:r>
+              <a:rPr lang="es-ES" dirty="0"/>
+              <a:t>2.1. Primera iteración: data </a:t>
+            </a:r>
+            <a:r>
+              <a:rPr lang="es-ES" dirty="0" err="1"/>
+              <a:t>mining</a:t>
+            </a:r>
+            <a:endParaRPr lang="es-ES" dirty="0"/>
+          </a:p>
+        </p:txBody>
+      </p:sp>
+      <p:sp>
+        <p:nvSpPr>
+          <p:cNvPr id="3" name="Marcador de contenido 2">
+            <a:extLst>
+              <a:ext uri="{FF2B5EF4-FFF2-40B4-BE49-F238E27FC236}">
+                <a16:creationId xmlns:a16="http://schemas.microsoft.com/office/drawing/2014/main" id="{C04CABB0-F69E-47FE-82C9-C9022F4AE937}"/>
+              </a:ext>
+            </a:extLst>
+          </p:cNvPr>
+          <p:cNvSpPr>
+            <a:spLocks noGrp="1"/>
+          </p:cNvSpPr>
+          <p:nvPr>
+            <p:ph idx="1"/>
+          </p:nvPr>
+        </p:nvSpPr>
+        <p:spPr>
+          <a:xfrm>
+            <a:off x="838200" y="1815783"/>
+            <a:ext cx="10515600" cy="4351338"/>
+          </a:xfrm>
+        </p:spPr>
+        <p:txBody>
+          <a:bodyPr/>
+          <a:lstStyle/>
+          <a:p>
+            <a:pPr marL="0" indent="0">
+              <a:buNone/>
+            </a:pPr>
+            <a:r>
+              <a:rPr lang="es-ES" sz="2000" dirty="0"/>
+              <a:t>CONCLUSIONES</a:t>
+            </a:r>
+          </a:p>
+          <a:p>
+            <a:r>
+              <a:rPr lang="es-ES" dirty="0"/>
+              <a:t>Los modelos fallan prediciendo “Sí” como “Quizás”</a:t>
+            </a:r>
+          </a:p>
+          <a:p>
+            <a:r>
+              <a:rPr lang="es-ES" dirty="0"/>
+              <a:t>Quizá no sea un resultado del todo erróneo…</a:t>
+            </a:r>
+          </a:p>
+        </p:txBody>
+      </p:sp>
+    </p:spTree>
+    <p:extLst>
+      <p:ext uri="{BB962C8B-B14F-4D97-AF65-F5344CB8AC3E}">
+        <p14:creationId xmlns:p14="http://schemas.microsoft.com/office/powerpoint/2010/main" val="2190875444"/>
+      </p:ext>
+    </p:extLst>
+  </p:cSld>
+  <p:clrMapOvr>
+    <a:masterClrMapping/>
+  </p:clrMapOvr>
+</p:sld>
+</file>
+
+<file path=ppt/slides/slide22.xml><?xml version="1.0" encoding="utf-8"?>
+<p:sld xmlns:a="http://schemas.openxmlformats.org/drawingml/2006/main" xmlns:r="http://schemas.openxmlformats.org/officeDocument/2006/relationships" xmlns:p="http://schemas.openxmlformats.org/presentationml/2006/main">
+  <p:cSld>
+    <p:spTree>
+      <p:nvGrpSpPr>
+        <p:cNvPr id="1" name=""/>
+        <p:cNvGrpSpPr/>
+        <p:nvPr/>
+      </p:nvGrpSpPr>
+      <p:grpSpPr>
+        <a:xfrm>
+          <a:off x="0" y="0"/>
+          <a:ext cx="0" cy="0"/>
+          <a:chOff x="0" y="0"/>
+          <a:chExt cx="0" cy="0"/>
+        </a:xfrm>
+      </p:grpSpPr>
+      <p:sp>
+        <p:nvSpPr>
+          <p:cNvPr id="2" name="Título 1">
+            <a:extLst>
+              <a:ext uri="{FF2B5EF4-FFF2-40B4-BE49-F238E27FC236}">
+                <a16:creationId xmlns:a16="http://schemas.microsoft.com/office/drawing/2014/main" id="{713C02B5-CD52-4C57-A973-686529F05156}"/>
+              </a:ext>
+            </a:extLst>
+          </p:cNvPr>
+          <p:cNvSpPr>
+            <a:spLocks noGrp="1"/>
+          </p:cNvSpPr>
+          <p:nvPr>
+            <p:ph type="title"/>
+          </p:nvPr>
+        </p:nvSpPr>
+        <p:spPr/>
+        <p:txBody>
+          <a:bodyPr/>
+          <a:lstStyle/>
+          <a:p>
+            <a:r>
+              <a:rPr lang="es-ES" dirty="0"/>
+              <a:t>2.1. Primera iteración: data </a:t>
+            </a:r>
+            <a:r>
+              <a:rPr lang="es-ES" dirty="0" err="1"/>
+              <a:t>mining</a:t>
+            </a:r>
+            <a:endParaRPr lang="es-ES" dirty="0"/>
+          </a:p>
+        </p:txBody>
+      </p:sp>
+      <p:sp>
+        <p:nvSpPr>
+          <p:cNvPr id="3" name="Marcador de contenido 2">
+            <a:extLst>
+              <a:ext uri="{FF2B5EF4-FFF2-40B4-BE49-F238E27FC236}">
+                <a16:creationId xmlns:a16="http://schemas.microsoft.com/office/drawing/2014/main" id="{C04CABB0-F69E-47FE-82C9-C9022F4AE937}"/>
+              </a:ext>
+            </a:extLst>
+          </p:cNvPr>
+          <p:cNvSpPr>
+            <a:spLocks noGrp="1"/>
+          </p:cNvSpPr>
+          <p:nvPr>
+            <p:ph idx="1"/>
+          </p:nvPr>
+        </p:nvSpPr>
+        <p:spPr>
+          <a:xfrm>
+            <a:off x="838200" y="1815783"/>
+            <a:ext cx="10515600" cy="4351338"/>
+          </a:xfrm>
+        </p:spPr>
+        <p:txBody>
+          <a:bodyPr/>
+          <a:lstStyle/>
+          <a:p>
+            <a:pPr marL="0" indent="0">
+              <a:buNone/>
+            </a:pPr>
+            <a:r>
+              <a:rPr lang="es-ES" sz="2000" dirty="0"/>
+              <a:t>CONCLUSIONES</a:t>
+            </a:r>
+          </a:p>
+          <a:p>
+            <a:r>
+              <a:rPr lang="es-ES" dirty="0"/>
+              <a:t>Los modelos fallan prediciendo “Sí” como “Quizás”</a:t>
+            </a:r>
+          </a:p>
+          <a:p>
+            <a:r>
+              <a:rPr lang="es-ES" dirty="0"/>
+              <a:t>Quizá no sea un resultado del todo erróneo…</a:t>
+            </a:r>
+          </a:p>
+          <a:p>
+            <a:pPr marL="0" indent="0">
+              <a:buNone/>
+            </a:pPr>
+            <a:endParaRPr lang="es-ES" dirty="0"/>
+          </a:p>
+          <a:p>
+            <a:endParaRPr lang="es-ES" dirty="0"/>
+          </a:p>
+          <a:p>
+            <a:endParaRPr lang="es-ES" dirty="0"/>
+          </a:p>
+          <a:p>
+            <a:endParaRPr lang="es-ES" dirty="0"/>
+          </a:p>
+          <a:p>
+            <a:endParaRPr lang="es-ES" dirty="0"/>
+          </a:p>
+          <a:p>
+            <a:pPr marL="0" indent="0">
+              <a:buNone/>
+            </a:pPr>
+            <a:r>
+              <a:rPr lang="es-ES" dirty="0"/>
+              <a:t>						</a:t>
+            </a:r>
+            <a:r>
+              <a:rPr lang="es-ES" sz="3600" dirty="0"/>
+              <a:t>	¡Otra iteración!</a:t>
+            </a:r>
+            <a:endParaRPr lang="es-ES" dirty="0"/>
+          </a:p>
+        </p:txBody>
+      </p:sp>
+    </p:spTree>
+    <p:extLst>
+      <p:ext uri="{BB962C8B-B14F-4D97-AF65-F5344CB8AC3E}">
+        <p14:creationId xmlns:p14="http://schemas.microsoft.com/office/powerpoint/2010/main" val="3741469642"/>
+      </p:ext>
+    </p:extLst>
+  </p:cSld>
+  <p:clrMapOvr>
+    <a:masterClrMapping/>
+  </p:clrMapOvr>
+</p:sld>
+</file>
+
+<file path=ppt/slides/slide23.xml><?xml version="1.0" encoding="utf-8"?>
+<p:sld xmlns:a="http://schemas.openxmlformats.org/drawingml/2006/main" xmlns:r="http://schemas.openxmlformats.org/officeDocument/2006/relationships" xmlns:p="http://schemas.openxmlformats.org/presentationml/2006/main">
+  <p:cSld>
+    <p:spTree>
+      <p:nvGrpSpPr>
+        <p:cNvPr id="1" name=""/>
+        <p:cNvGrpSpPr/>
+        <p:nvPr/>
+      </p:nvGrpSpPr>
+      <p:grpSpPr>
+        <a:xfrm>
+          <a:off x="0" y="0"/>
+          <a:ext cx="0" cy="0"/>
+          <a:chOff x="0" y="0"/>
+          <a:chExt cx="0" cy="0"/>
+        </a:xfrm>
+      </p:grpSpPr>
+      <p:sp>
+        <p:nvSpPr>
+          <p:cNvPr id="2" name="Título 1">
+            <a:extLst>
+              <a:ext uri="{FF2B5EF4-FFF2-40B4-BE49-F238E27FC236}">
+                <a16:creationId xmlns:a16="http://schemas.microsoft.com/office/drawing/2014/main" id="{31040B96-F7F5-4E55-9F04-197FE94B3E4A}"/>
+              </a:ext>
+            </a:extLst>
+          </p:cNvPr>
+          <p:cNvSpPr>
+            <a:spLocks noGrp="1"/>
+          </p:cNvSpPr>
+          <p:nvPr>
+            <p:ph type="title"/>
+          </p:nvPr>
+        </p:nvSpPr>
+        <p:spPr/>
+        <p:txBody>
+          <a:bodyPr/>
+          <a:lstStyle/>
+          <a:p>
+            <a:r>
+              <a:rPr lang="es-ES" dirty="0"/>
+              <a:t>2.2. Segunda iteración: </a:t>
+            </a:r>
+            <a:r>
+              <a:rPr lang="es-ES" dirty="0" err="1"/>
+              <a:t>pre-procesado</a:t>
+            </a:r>
+            <a:endParaRPr lang="es-ES" dirty="0"/>
+          </a:p>
+        </p:txBody>
+      </p:sp>
+      <p:sp>
+        <p:nvSpPr>
+          <p:cNvPr id="3" name="Marcador de contenido 2">
+            <a:extLst>
+              <a:ext uri="{FF2B5EF4-FFF2-40B4-BE49-F238E27FC236}">
+                <a16:creationId xmlns:a16="http://schemas.microsoft.com/office/drawing/2014/main" id="{4AFC15C3-293C-4190-8A9C-9646813A9701}"/>
+              </a:ext>
+            </a:extLst>
+          </p:cNvPr>
+          <p:cNvSpPr>
+            <a:spLocks noGrp="1"/>
+          </p:cNvSpPr>
+          <p:nvPr>
+            <p:ph idx="1"/>
+          </p:nvPr>
+        </p:nvSpPr>
+        <p:spPr>
+          <a:xfrm>
+            <a:off x="589651" y="1930400"/>
+            <a:ext cx="8596668" cy="3880773"/>
+          </a:xfrm>
+        </p:spPr>
+        <p:txBody>
+          <a:bodyPr/>
+          <a:lstStyle/>
+          <a:p>
+            <a:r>
+              <a:rPr lang="es-ES" dirty="0"/>
+              <a:t>Juntar los “Sí” con los “Quizás”</a:t>
+            </a:r>
+          </a:p>
+          <a:p>
+            <a:endParaRPr lang="es-ES" dirty="0"/>
+          </a:p>
+          <a:p>
+            <a:endParaRPr lang="es-ES" dirty="0"/>
+          </a:p>
+          <a:p>
+            <a:endParaRPr lang="es-ES" dirty="0"/>
+          </a:p>
+        </p:txBody>
+      </p:sp>
+      <p:pic>
+        <p:nvPicPr>
+          <p:cNvPr id="5" name="Imagen 4">
+            <a:extLst>
+              <a:ext uri="{FF2B5EF4-FFF2-40B4-BE49-F238E27FC236}">
+                <a16:creationId xmlns:a16="http://schemas.microsoft.com/office/drawing/2014/main" id="{4E4D3E15-FA22-479F-A793-12A7AF8E8436}"/>
+              </a:ext>
+            </a:extLst>
+          </p:cNvPr>
+          <p:cNvPicPr/>
+          <p:nvPr/>
+        </p:nvPicPr>
+        <p:blipFill>
+          <a:blip r:embed="rId2">
+            <a:extLst>
+              <a:ext uri="{28A0092B-C50C-407E-A947-70E740481C1C}">
+                <a14:useLocalDpi xmlns:a14="http://schemas.microsoft.com/office/drawing/2010/main" val="0"/>
+              </a:ext>
+            </a:extLst>
+          </a:blip>
+          <a:srcRect/>
+          <a:stretch>
+            <a:fillRect/>
+          </a:stretch>
+        </p:blipFill>
+        <p:spPr bwMode="auto">
+          <a:xfrm>
+            <a:off x="2642139" y="2580569"/>
+            <a:ext cx="5712721" cy="3880773"/>
+          </a:xfrm>
+          <a:prstGeom prst="rect">
+            <a:avLst/>
+          </a:prstGeom>
+          <a:noFill/>
+          <a:ln>
+            <a:noFill/>
+          </a:ln>
+        </p:spPr>
+      </p:pic>
+    </p:spTree>
+    <p:extLst>
+      <p:ext uri="{BB962C8B-B14F-4D97-AF65-F5344CB8AC3E}">
+        <p14:creationId xmlns:p14="http://schemas.microsoft.com/office/powerpoint/2010/main" val="1742727850"/>
+      </p:ext>
+    </p:extLst>
+  </p:cSld>
+  <p:clrMapOvr>
+    <a:masterClrMapping/>
+  </p:clrMapOvr>
+</p:sld>
+</file>
+
+<file path=ppt/slides/slide24.xml><?xml version="1.0" encoding="utf-8"?>
+<p:sld xmlns:a="http://schemas.openxmlformats.org/drawingml/2006/main" xmlns:r="http://schemas.openxmlformats.org/officeDocument/2006/relationships" xmlns:p="http://schemas.openxmlformats.org/presentationml/2006/main">
+  <p:cSld>
+    <p:spTree>
+      <p:nvGrpSpPr>
+        <p:cNvPr id="1" name=""/>
+        <p:cNvGrpSpPr/>
+        <p:nvPr/>
+      </p:nvGrpSpPr>
+      <p:grpSpPr>
+        <a:xfrm>
+          <a:off x="0" y="0"/>
+          <a:ext cx="0" cy="0"/>
+          <a:chOff x="0" y="0"/>
+          <a:chExt cx="0" cy="0"/>
+        </a:xfrm>
+      </p:grpSpPr>
+      <p:sp>
+        <p:nvSpPr>
+          <p:cNvPr id="2" name="Título 1">
+            <a:extLst>
+              <a:ext uri="{FF2B5EF4-FFF2-40B4-BE49-F238E27FC236}">
+                <a16:creationId xmlns:a16="http://schemas.microsoft.com/office/drawing/2014/main" id="{31040B96-F7F5-4E55-9F04-197FE94B3E4A}"/>
+              </a:ext>
+            </a:extLst>
+          </p:cNvPr>
+          <p:cNvSpPr>
+            <a:spLocks noGrp="1"/>
+          </p:cNvSpPr>
+          <p:nvPr>
+            <p:ph type="title"/>
+          </p:nvPr>
+        </p:nvSpPr>
+        <p:spPr/>
+        <p:txBody>
+          <a:bodyPr/>
+          <a:lstStyle/>
+          <a:p>
+            <a:r>
+              <a:rPr lang="es-ES" dirty="0"/>
+              <a:t>2.2. Segunda iteración: data </a:t>
+            </a:r>
+            <a:r>
+              <a:rPr lang="es-ES" dirty="0" err="1"/>
+              <a:t>mining</a:t>
+            </a:r>
+            <a:endParaRPr lang="es-ES" dirty="0"/>
+          </a:p>
+        </p:txBody>
+      </p:sp>
+      <p:sp>
+        <p:nvSpPr>
+          <p:cNvPr id="3" name="Marcador de contenido 2">
+            <a:extLst>
+              <a:ext uri="{FF2B5EF4-FFF2-40B4-BE49-F238E27FC236}">
+                <a16:creationId xmlns:a16="http://schemas.microsoft.com/office/drawing/2014/main" id="{4AFC15C3-293C-4190-8A9C-9646813A9701}"/>
+              </a:ext>
+            </a:extLst>
+          </p:cNvPr>
+          <p:cNvSpPr>
+            <a:spLocks noGrp="1"/>
+          </p:cNvSpPr>
+          <p:nvPr>
+            <p:ph idx="1"/>
+          </p:nvPr>
+        </p:nvSpPr>
+        <p:spPr>
+          <a:xfrm>
+            <a:off x="589651" y="1930400"/>
+            <a:ext cx="8596668" cy="3880773"/>
+          </a:xfrm>
+        </p:spPr>
+        <p:txBody>
+          <a:bodyPr/>
+          <a:lstStyle/>
+          <a:p>
+            <a:r>
+              <a:rPr lang="es-ES" dirty="0" err="1"/>
+              <a:t>Random</a:t>
+            </a:r>
+            <a:r>
+              <a:rPr lang="es-ES" dirty="0"/>
+              <a:t> </a:t>
+            </a:r>
+            <a:r>
+              <a:rPr lang="es-ES" dirty="0" err="1"/>
+              <a:t>forest</a:t>
+            </a:r>
+            <a:endParaRPr lang="es-ES" dirty="0"/>
+          </a:p>
+          <a:p>
+            <a:endParaRPr lang="es-ES" dirty="0"/>
+          </a:p>
+          <a:p>
+            <a:endParaRPr lang="es-ES" dirty="0"/>
+          </a:p>
+          <a:p>
+            <a:endParaRPr lang="es-ES" dirty="0"/>
+          </a:p>
+          <a:p>
+            <a:endParaRPr lang="es-ES" dirty="0"/>
+          </a:p>
+          <a:p>
+            <a:endParaRPr lang="es-ES" dirty="0"/>
+          </a:p>
+        </p:txBody>
+      </p:sp>
+      <p:pic>
+        <p:nvPicPr>
+          <p:cNvPr id="6" name="Imagen 5">
+            <a:extLst>
+              <a:ext uri="{FF2B5EF4-FFF2-40B4-BE49-F238E27FC236}">
+                <a16:creationId xmlns:a16="http://schemas.microsoft.com/office/drawing/2014/main" id="{91780C34-D64F-45F8-8CED-C9424B7E797B}"/>
+              </a:ext>
+            </a:extLst>
+          </p:cNvPr>
+          <p:cNvPicPr/>
+          <p:nvPr/>
+        </p:nvPicPr>
+        <p:blipFill>
+          <a:blip r:embed="rId2"/>
+          <a:stretch>
+            <a:fillRect/>
+          </a:stretch>
+        </p:blipFill>
+        <p:spPr>
+          <a:xfrm>
+            <a:off x="1930433" y="2503118"/>
+            <a:ext cx="7451561" cy="3308055"/>
+          </a:xfrm>
+          <a:prstGeom prst="rect">
+            <a:avLst/>
+          </a:prstGeom>
+        </p:spPr>
+      </p:pic>
+    </p:spTree>
+    <p:extLst>
+      <p:ext uri="{BB962C8B-B14F-4D97-AF65-F5344CB8AC3E}">
+        <p14:creationId xmlns:p14="http://schemas.microsoft.com/office/powerpoint/2010/main" val="3255807888"/>
+      </p:ext>
+    </p:extLst>
+  </p:cSld>
+  <p:clrMapOvr>
+    <a:masterClrMapping/>
+  </p:clrMapOvr>
+</p:sld>
+</file>
+
+<file path=ppt/slides/slide25.xml><?xml version="1.0" encoding="utf-8"?>
+<p:sld xmlns:a="http://schemas.openxmlformats.org/drawingml/2006/main" xmlns:r="http://schemas.openxmlformats.org/officeDocument/2006/relationships" xmlns:p="http://schemas.openxmlformats.org/presentationml/2006/main">
+  <p:cSld>
+    <p:spTree>
+      <p:nvGrpSpPr>
+        <p:cNvPr id="1" name=""/>
+        <p:cNvGrpSpPr/>
+        <p:nvPr/>
+      </p:nvGrpSpPr>
+      <p:grpSpPr>
+        <a:xfrm>
+          <a:off x="0" y="0"/>
+          <a:ext cx="0" cy="0"/>
+          <a:chOff x="0" y="0"/>
+          <a:chExt cx="0" cy="0"/>
+        </a:xfrm>
+      </p:grpSpPr>
+      <p:sp>
+        <p:nvSpPr>
+          <p:cNvPr id="2" name="Título 1">
+            <a:extLst>
+              <a:ext uri="{FF2B5EF4-FFF2-40B4-BE49-F238E27FC236}">
+                <a16:creationId xmlns:a16="http://schemas.microsoft.com/office/drawing/2014/main" id="{31040B96-F7F5-4E55-9F04-197FE94B3E4A}"/>
+              </a:ext>
+            </a:extLst>
+          </p:cNvPr>
+          <p:cNvSpPr>
+            <a:spLocks noGrp="1"/>
+          </p:cNvSpPr>
+          <p:nvPr>
+            <p:ph type="title"/>
+          </p:nvPr>
+        </p:nvSpPr>
+        <p:spPr/>
+        <p:txBody>
+          <a:bodyPr/>
+          <a:lstStyle/>
+          <a:p>
+            <a:r>
+              <a:rPr lang="es-ES" dirty="0"/>
+              <a:t>2.2. Segunda iteración: data </a:t>
+            </a:r>
+            <a:r>
+              <a:rPr lang="es-ES" dirty="0" err="1"/>
+              <a:t>mining</a:t>
+            </a:r>
+            <a:endParaRPr lang="es-ES" dirty="0"/>
+          </a:p>
+        </p:txBody>
+      </p:sp>
+      <p:sp>
+        <p:nvSpPr>
+          <p:cNvPr id="3" name="Marcador de contenido 2">
+            <a:extLst>
+              <a:ext uri="{FF2B5EF4-FFF2-40B4-BE49-F238E27FC236}">
+                <a16:creationId xmlns:a16="http://schemas.microsoft.com/office/drawing/2014/main" id="{4AFC15C3-293C-4190-8A9C-9646813A9701}"/>
+              </a:ext>
+            </a:extLst>
+          </p:cNvPr>
+          <p:cNvSpPr>
+            <a:spLocks noGrp="1"/>
+          </p:cNvSpPr>
+          <p:nvPr>
+            <p:ph idx="1"/>
+          </p:nvPr>
+        </p:nvSpPr>
+        <p:spPr>
+          <a:xfrm>
+            <a:off x="589651" y="1930400"/>
+            <a:ext cx="8596668" cy="3880773"/>
+          </a:xfrm>
+        </p:spPr>
+        <p:txBody>
+          <a:bodyPr/>
+          <a:lstStyle/>
+          <a:p>
+            <a:r>
+              <a:rPr lang="es-ES" dirty="0"/>
+              <a:t>Regresión logística</a:t>
+            </a:r>
+          </a:p>
+          <a:p>
+            <a:endParaRPr lang="es-ES" dirty="0"/>
+          </a:p>
+          <a:p>
+            <a:endParaRPr lang="es-ES" dirty="0"/>
+          </a:p>
+          <a:p>
+            <a:endParaRPr lang="es-ES" dirty="0"/>
+          </a:p>
+          <a:p>
+            <a:endParaRPr lang="es-ES" dirty="0"/>
+          </a:p>
+          <a:p>
+            <a:endParaRPr lang="es-ES" dirty="0"/>
+          </a:p>
+        </p:txBody>
+      </p:sp>
+      <p:pic>
+        <p:nvPicPr>
+          <p:cNvPr id="5" name="Imagen 4">
+            <a:extLst>
+              <a:ext uri="{FF2B5EF4-FFF2-40B4-BE49-F238E27FC236}">
+                <a16:creationId xmlns:a16="http://schemas.microsoft.com/office/drawing/2014/main" id="{74A49369-F1BA-44C1-9E94-01E43B2EC7B3}"/>
+              </a:ext>
+            </a:extLst>
+          </p:cNvPr>
+          <p:cNvPicPr/>
+          <p:nvPr/>
+        </p:nvPicPr>
+        <p:blipFill>
+          <a:blip r:embed="rId2"/>
+          <a:stretch>
+            <a:fillRect/>
+          </a:stretch>
+        </p:blipFill>
+        <p:spPr>
+          <a:xfrm>
+            <a:off x="2043736" y="2503907"/>
+            <a:ext cx="7452000" cy="3420000"/>
+          </a:xfrm>
+          <a:prstGeom prst="rect">
+            <a:avLst/>
+          </a:prstGeom>
+        </p:spPr>
+      </p:pic>
+    </p:spTree>
+    <p:extLst>
+      <p:ext uri="{BB962C8B-B14F-4D97-AF65-F5344CB8AC3E}">
+        <p14:creationId xmlns:p14="http://schemas.microsoft.com/office/powerpoint/2010/main" val="1527130439"/>
+      </p:ext>
+    </p:extLst>
+  </p:cSld>
+  <p:clrMapOvr>
+    <a:masterClrMapping/>
+  </p:clrMapOvr>
+</p:sld>
+</file>
+
+<file path=ppt/slides/slide26.xml><?xml version="1.0" encoding="utf-8"?>
+<p:sld xmlns:a="http://schemas.openxmlformats.org/drawingml/2006/main" xmlns:r="http://schemas.openxmlformats.org/officeDocument/2006/relationships" xmlns:p="http://schemas.openxmlformats.org/presentationml/2006/main">
+  <p:cSld>
+    <p:spTree>
+      <p:nvGrpSpPr>
+        <p:cNvPr id="1" name=""/>
+        <p:cNvGrpSpPr/>
+        <p:nvPr/>
+      </p:nvGrpSpPr>
+      <p:grpSpPr>
+        <a:xfrm>
+          <a:off x="0" y="0"/>
+          <a:ext cx="0" cy="0"/>
+          <a:chOff x="0" y="0"/>
+          <a:chExt cx="0" cy="0"/>
+        </a:xfrm>
+      </p:grpSpPr>
+      <p:sp>
+        <p:nvSpPr>
+          <p:cNvPr id="2" name="Título 1">
+            <a:extLst>
+              <a:ext uri="{FF2B5EF4-FFF2-40B4-BE49-F238E27FC236}">
+                <a16:creationId xmlns:a16="http://schemas.microsoft.com/office/drawing/2014/main" id="{713C02B5-CD52-4C57-A973-686529F05156}"/>
+              </a:ext>
+            </a:extLst>
+          </p:cNvPr>
+          <p:cNvSpPr>
+            <a:spLocks noGrp="1"/>
+          </p:cNvSpPr>
+          <p:nvPr>
+            <p:ph type="title"/>
+          </p:nvPr>
+        </p:nvSpPr>
+        <p:spPr/>
+        <p:txBody>
+          <a:bodyPr/>
+          <a:lstStyle/>
+          <a:p>
+            <a:r>
+              <a:rPr lang="es-ES" dirty="0"/>
+              <a:t>2.2. Segunda iteración: data </a:t>
+            </a:r>
+            <a:r>
+              <a:rPr lang="es-ES" dirty="0" err="1"/>
+              <a:t>mining</a:t>
+            </a:r>
+            <a:endParaRPr lang="es-ES" dirty="0"/>
+          </a:p>
+        </p:txBody>
+      </p:sp>
+      <p:sp>
+        <p:nvSpPr>
+          <p:cNvPr id="3" name="Marcador de contenido 2">
+            <a:extLst>
+              <a:ext uri="{FF2B5EF4-FFF2-40B4-BE49-F238E27FC236}">
+                <a16:creationId xmlns:a16="http://schemas.microsoft.com/office/drawing/2014/main" id="{C04CABB0-F69E-47FE-82C9-C9022F4AE937}"/>
+              </a:ext>
+            </a:extLst>
+          </p:cNvPr>
+          <p:cNvSpPr>
+            <a:spLocks noGrp="1"/>
+          </p:cNvSpPr>
+          <p:nvPr>
+            <p:ph idx="1"/>
+          </p:nvPr>
+        </p:nvSpPr>
+        <p:spPr>
+          <a:xfrm>
+            <a:off x="838200" y="1815783"/>
+            <a:ext cx="10515600" cy="4351338"/>
+          </a:xfrm>
+        </p:spPr>
+        <p:txBody>
+          <a:bodyPr/>
+          <a:lstStyle/>
+          <a:p>
+            <a:pPr marL="0" indent="0">
+              <a:buNone/>
+            </a:pPr>
+            <a:r>
+              <a:rPr lang="es-ES" sz="2000" dirty="0"/>
+              <a:t>CONCLUSIONES</a:t>
+            </a:r>
+          </a:p>
+          <a:p>
+            <a:r>
+              <a:rPr lang="es-ES" dirty="0"/>
+              <a:t>Proporción de acierto de 2/3</a:t>
+            </a:r>
+          </a:p>
+          <a:p>
+            <a:r>
+              <a:rPr lang="es-ES" dirty="0"/>
+              <a:t>Generalmente, son mejores resultados</a:t>
+            </a:r>
+          </a:p>
+        </p:txBody>
+      </p:sp>
+    </p:spTree>
+    <p:extLst>
+      <p:ext uri="{BB962C8B-B14F-4D97-AF65-F5344CB8AC3E}">
+        <p14:creationId xmlns:p14="http://schemas.microsoft.com/office/powerpoint/2010/main" val="1171535017"/>
+      </p:ext>
+    </p:extLst>
+  </p:cSld>
+  <p:clrMapOvr>
+    <a:masterClrMapping/>
+  </p:clrMapOvr>
+</p:sld>
+</file>
+
+<file path=ppt/slides/slide27.xml><?xml version="1.0" encoding="utf-8"?>
+<p:sld xmlns:a="http://schemas.openxmlformats.org/drawingml/2006/main" xmlns:r="http://schemas.openxmlformats.org/officeDocument/2006/relationships" xmlns:p="http://schemas.openxmlformats.org/presentationml/2006/main">
+  <p:cSld>
+    <p:spTree>
+      <p:nvGrpSpPr>
+        <p:cNvPr id="1" name=""/>
+        <p:cNvGrpSpPr/>
+        <p:nvPr/>
+      </p:nvGrpSpPr>
+      <p:grpSpPr>
+        <a:xfrm>
+          <a:off x="0" y="0"/>
+          <a:ext cx="0" cy="0"/>
+          <a:chOff x="0" y="0"/>
+          <a:chExt cx="0" cy="0"/>
+        </a:xfrm>
+      </p:grpSpPr>
+      <p:sp>
+        <p:nvSpPr>
+          <p:cNvPr id="2" name="Título 1">
+            <a:extLst>
+              <a:ext uri="{FF2B5EF4-FFF2-40B4-BE49-F238E27FC236}">
+                <a16:creationId xmlns:a16="http://schemas.microsoft.com/office/drawing/2014/main" id="{713C02B5-CD52-4C57-A973-686529F05156}"/>
+              </a:ext>
+            </a:extLst>
+          </p:cNvPr>
+          <p:cNvSpPr>
+            <a:spLocks noGrp="1"/>
+          </p:cNvSpPr>
+          <p:nvPr>
+            <p:ph type="title"/>
+          </p:nvPr>
+        </p:nvSpPr>
+        <p:spPr/>
+        <p:txBody>
+          <a:bodyPr/>
+          <a:lstStyle/>
+          <a:p>
+            <a:r>
+              <a:rPr lang="es-ES" dirty="0"/>
+              <a:t>2.2. Segunda iteración: data </a:t>
+            </a:r>
+            <a:r>
+              <a:rPr lang="es-ES" dirty="0" err="1"/>
+              <a:t>mining</a:t>
+            </a:r>
+            <a:endParaRPr lang="es-ES" dirty="0"/>
+          </a:p>
+        </p:txBody>
+      </p:sp>
+      <p:sp>
+        <p:nvSpPr>
+          <p:cNvPr id="3" name="Marcador de contenido 2">
+            <a:extLst>
+              <a:ext uri="{FF2B5EF4-FFF2-40B4-BE49-F238E27FC236}">
+                <a16:creationId xmlns:a16="http://schemas.microsoft.com/office/drawing/2014/main" id="{C04CABB0-F69E-47FE-82C9-C9022F4AE937}"/>
+              </a:ext>
+            </a:extLst>
+          </p:cNvPr>
+          <p:cNvSpPr>
+            <a:spLocks noGrp="1"/>
+          </p:cNvSpPr>
+          <p:nvPr>
+            <p:ph idx="1"/>
+          </p:nvPr>
+        </p:nvSpPr>
+        <p:spPr>
+          <a:xfrm>
+            <a:off x="838200" y="1815783"/>
+            <a:ext cx="10515600" cy="4351338"/>
+          </a:xfrm>
+        </p:spPr>
+        <p:txBody>
+          <a:bodyPr/>
+          <a:lstStyle/>
+          <a:p>
+            <a:pPr marL="0" indent="0">
+              <a:buNone/>
+            </a:pPr>
+            <a:r>
+              <a:rPr lang="es-ES" sz="2000" dirty="0"/>
+              <a:t>CONCLUSIONES</a:t>
+            </a:r>
+          </a:p>
+          <a:p>
+            <a:r>
+              <a:rPr lang="es-ES" dirty="0"/>
+              <a:t>Proporción de acierto de 2/3</a:t>
+            </a:r>
+          </a:p>
+          <a:p>
+            <a:r>
+              <a:rPr lang="es-ES" dirty="0"/>
+              <a:t>Generalmente, son mejores resultados</a:t>
+            </a:r>
+          </a:p>
+          <a:p>
+            <a:pPr marL="0" indent="0">
+              <a:buNone/>
+            </a:pPr>
+            <a:endParaRPr lang="es-ES" dirty="0"/>
+          </a:p>
+          <a:p>
+            <a:pPr marL="0" indent="0">
+              <a:buNone/>
+            </a:pPr>
+            <a:endParaRPr lang="es-ES" dirty="0"/>
+          </a:p>
+          <a:p>
+            <a:pPr marL="0" indent="0">
+              <a:buNone/>
+            </a:pPr>
+            <a:endParaRPr lang="es-ES" dirty="0"/>
+          </a:p>
+          <a:p>
+            <a:pPr marL="0" indent="0">
+              <a:buNone/>
+            </a:pPr>
+            <a:endParaRPr lang="es-ES" dirty="0"/>
+          </a:p>
+          <a:p>
+            <a:pPr marL="0" indent="0">
+              <a:buNone/>
+            </a:pPr>
+            <a:endParaRPr lang="es-ES" dirty="0"/>
+          </a:p>
+          <a:p>
+            <a:pPr marL="0" indent="0">
+              <a:buNone/>
+            </a:pPr>
+            <a:r>
+              <a:rPr lang="es-ES" dirty="0"/>
+              <a:t>						</a:t>
+            </a:r>
+            <a:r>
+              <a:rPr lang="es-ES" sz="2000" dirty="0"/>
+              <a:t>	</a:t>
+            </a:r>
+            <a:r>
+              <a:rPr lang="es-ES" sz="3600" dirty="0"/>
+              <a:t>¡Otra iteración!</a:t>
+            </a:r>
+          </a:p>
+          <a:p>
+            <a:endParaRPr lang="es-ES" dirty="0"/>
+          </a:p>
+          <a:p>
+            <a:endParaRPr lang="es-ES" dirty="0"/>
+          </a:p>
+          <a:p>
+            <a:endParaRPr lang="es-ES" dirty="0"/>
+          </a:p>
+          <a:p>
+            <a:endParaRPr lang="es-ES" dirty="0"/>
+          </a:p>
+        </p:txBody>
+      </p:sp>
+    </p:spTree>
+    <p:extLst>
+      <p:ext uri="{BB962C8B-B14F-4D97-AF65-F5344CB8AC3E}">
+        <p14:creationId xmlns:p14="http://schemas.microsoft.com/office/powerpoint/2010/main" val="4221929985"/>
+      </p:ext>
+    </p:extLst>
+  </p:cSld>
+  <p:clrMapOvr>
+    <a:masterClrMapping/>
+  </p:clrMapOvr>
+</p:sld>
+</file>
+
+<file path=ppt/slides/slide28.xml><?xml version="1.0" encoding="utf-8"?>
+<p:sld xmlns:a="http://schemas.openxmlformats.org/drawingml/2006/main" xmlns:r="http://schemas.openxmlformats.org/officeDocument/2006/relationships" xmlns:p="http://schemas.openxmlformats.org/presentationml/2006/main">
+  <p:cSld>
+    <p:spTree>
+      <p:nvGrpSpPr>
+        <p:cNvPr id="1" name=""/>
+        <p:cNvGrpSpPr/>
+        <p:nvPr/>
+      </p:nvGrpSpPr>
+      <p:grpSpPr>
+        <a:xfrm>
+          <a:off x="0" y="0"/>
+          <a:ext cx="0" cy="0"/>
+          <a:chOff x="0" y="0"/>
+          <a:chExt cx="0" cy="0"/>
+        </a:xfrm>
+      </p:grpSpPr>
+      <p:sp>
+        <p:nvSpPr>
+          <p:cNvPr id="2" name="Título 1">
+            <a:extLst>
+              <a:ext uri="{FF2B5EF4-FFF2-40B4-BE49-F238E27FC236}">
+                <a16:creationId xmlns:a16="http://schemas.microsoft.com/office/drawing/2014/main" id="{713C02B5-CD52-4C57-A973-686529F05156}"/>
+              </a:ext>
+            </a:extLst>
+          </p:cNvPr>
+          <p:cNvSpPr>
+            <a:spLocks noGrp="1"/>
+          </p:cNvSpPr>
+          <p:nvPr>
+            <p:ph type="title"/>
+          </p:nvPr>
+        </p:nvSpPr>
+        <p:spPr/>
+        <p:txBody>
+          <a:bodyPr/>
+          <a:lstStyle/>
+          <a:p>
+            <a:r>
+              <a:rPr lang="es-ES" dirty="0"/>
+              <a:t>2.3. Tercera iteración: </a:t>
+            </a:r>
+            <a:r>
+              <a:rPr lang="es-ES" dirty="0" err="1"/>
+              <a:t>pre-procesado</a:t>
+            </a:r>
+            <a:endParaRPr lang="es-ES" dirty="0"/>
+          </a:p>
+        </p:txBody>
+      </p:sp>
+      <p:sp>
+        <p:nvSpPr>
+          <p:cNvPr id="3" name="Marcador de contenido 2">
+            <a:extLst>
+              <a:ext uri="{FF2B5EF4-FFF2-40B4-BE49-F238E27FC236}">
+                <a16:creationId xmlns:a16="http://schemas.microsoft.com/office/drawing/2014/main" id="{C04CABB0-F69E-47FE-82C9-C9022F4AE937}"/>
+              </a:ext>
+            </a:extLst>
+          </p:cNvPr>
+          <p:cNvSpPr>
+            <a:spLocks noGrp="1"/>
+          </p:cNvSpPr>
+          <p:nvPr>
+            <p:ph idx="1"/>
+          </p:nvPr>
+        </p:nvSpPr>
+        <p:spPr>
+          <a:xfrm>
+            <a:off x="838200" y="1815783"/>
+            <a:ext cx="10515600" cy="4351338"/>
+          </a:xfrm>
+        </p:spPr>
+        <p:txBody>
+          <a:bodyPr/>
+          <a:lstStyle/>
+          <a:p>
+            <a:r>
+              <a:rPr lang="es-ES" dirty="0"/>
+              <a:t>Cambiar de columna </a:t>
+            </a:r>
+            <a:r>
+              <a:rPr lang="es-ES" dirty="0" err="1"/>
+              <a:t>label</a:t>
+            </a:r>
+            <a:r>
+              <a:rPr lang="es-ES" dirty="0"/>
+              <a:t> </a:t>
+            </a:r>
+            <a:r>
+              <a:rPr lang="es-ES" dirty="0">
+                <a:sym typeface="Wingdings" panose="05000000000000000000" pitchFamily="2" charset="2"/>
+              </a:rPr>
+              <a:t> Juntar dos columnas</a:t>
+            </a:r>
+          </a:p>
+          <a:p>
+            <a:pPr lvl="1"/>
+            <a:r>
+              <a:rPr lang="en-US" i="1" dirty="0"/>
+              <a:t>If yes, what condition(s) have you been diagnosed with?</a:t>
+            </a:r>
+            <a:endParaRPr lang="es-ES" dirty="0"/>
+          </a:p>
+          <a:p>
+            <a:pPr lvl="1"/>
+            <a:r>
+              <a:rPr lang="en-US" i="1" dirty="0"/>
+              <a:t>If maybe, what condition(s) do you believe you have?</a:t>
+            </a:r>
+            <a:endParaRPr lang="es-ES" dirty="0"/>
+          </a:p>
+          <a:p>
+            <a:endParaRPr lang="es-ES" dirty="0"/>
+          </a:p>
+          <a:p>
+            <a:endParaRPr lang="es-ES" dirty="0"/>
+          </a:p>
+          <a:p>
+            <a:endParaRPr lang="es-ES" dirty="0"/>
+          </a:p>
+        </p:txBody>
+      </p:sp>
+    </p:spTree>
+    <p:extLst>
+      <p:ext uri="{BB962C8B-B14F-4D97-AF65-F5344CB8AC3E}">
+        <p14:creationId xmlns:p14="http://schemas.microsoft.com/office/powerpoint/2010/main" val="2281107628"/>
+      </p:ext>
+    </p:extLst>
+  </p:cSld>
+  <p:clrMapOvr>
+    <a:masterClrMapping/>
+  </p:clrMapOvr>
+</p:sld>
+</file>
+
+<file path=ppt/slides/slide29.xml><?xml version="1.0" encoding="utf-8"?>
+<p:sld xmlns:a="http://schemas.openxmlformats.org/drawingml/2006/main" xmlns:r="http://schemas.openxmlformats.org/officeDocument/2006/relationships" xmlns:p="http://schemas.openxmlformats.org/presentationml/2006/main">
+  <p:cSld>
+    <p:spTree>
+      <p:nvGrpSpPr>
+        <p:cNvPr id="1" name=""/>
+        <p:cNvGrpSpPr/>
+        <p:nvPr/>
+      </p:nvGrpSpPr>
+      <p:grpSpPr>
+        <a:xfrm>
+          <a:off x="0" y="0"/>
+          <a:ext cx="0" cy="0"/>
+          <a:chOff x="0" y="0"/>
+          <a:chExt cx="0" cy="0"/>
+        </a:xfrm>
+      </p:grpSpPr>
+      <p:sp>
+        <p:nvSpPr>
+          <p:cNvPr id="2" name="Título 1">
+            <a:extLst>
+              <a:ext uri="{FF2B5EF4-FFF2-40B4-BE49-F238E27FC236}">
+                <a16:creationId xmlns:a16="http://schemas.microsoft.com/office/drawing/2014/main" id="{713C02B5-CD52-4C57-A973-686529F05156}"/>
+              </a:ext>
+            </a:extLst>
+          </p:cNvPr>
+          <p:cNvSpPr>
+            <a:spLocks noGrp="1"/>
+          </p:cNvSpPr>
+          <p:nvPr>
+            <p:ph type="title"/>
+          </p:nvPr>
+        </p:nvSpPr>
+        <p:spPr/>
+        <p:txBody>
+          <a:bodyPr/>
+          <a:lstStyle/>
+          <a:p>
+            <a:r>
+              <a:rPr lang="es-ES" dirty="0"/>
+              <a:t>2.3. Tercera iteración: </a:t>
+            </a:r>
+            <a:r>
+              <a:rPr lang="es-ES" dirty="0" err="1"/>
+              <a:t>pre-procesado</a:t>
+            </a:r>
+            <a:endParaRPr lang="es-ES" dirty="0"/>
+          </a:p>
+        </p:txBody>
+      </p:sp>
+      <p:sp>
+        <p:nvSpPr>
+          <p:cNvPr id="3" name="Marcador de contenido 2">
+            <a:extLst>
+              <a:ext uri="{FF2B5EF4-FFF2-40B4-BE49-F238E27FC236}">
+                <a16:creationId xmlns:a16="http://schemas.microsoft.com/office/drawing/2014/main" id="{C04CABB0-F69E-47FE-82C9-C9022F4AE937}"/>
+              </a:ext>
+            </a:extLst>
+          </p:cNvPr>
+          <p:cNvSpPr>
+            <a:spLocks noGrp="1"/>
+          </p:cNvSpPr>
+          <p:nvPr>
+            <p:ph idx="1"/>
+          </p:nvPr>
+        </p:nvSpPr>
+        <p:spPr>
+          <a:xfrm>
+            <a:off x="838200" y="1815783"/>
+            <a:ext cx="10515600" cy="4351338"/>
+          </a:xfrm>
+        </p:spPr>
+        <p:txBody>
+          <a:bodyPr/>
+          <a:lstStyle/>
+          <a:p>
+            <a:r>
+              <a:rPr lang="es-ES" dirty="0"/>
+              <a:t>Cambiar de columna </a:t>
+            </a:r>
+            <a:r>
+              <a:rPr lang="es-ES" dirty="0" err="1"/>
+              <a:t>label</a:t>
+            </a:r>
+            <a:r>
+              <a:rPr lang="es-ES" dirty="0"/>
+              <a:t> </a:t>
+            </a:r>
+            <a:r>
+              <a:rPr lang="es-ES" dirty="0">
+                <a:sym typeface="Wingdings" panose="05000000000000000000" pitchFamily="2" charset="2"/>
+              </a:rPr>
+              <a:t> Juntar dos columnas</a:t>
+            </a:r>
+          </a:p>
+          <a:p>
+            <a:pPr lvl="1"/>
+            <a:r>
+              <a:rPr lang="en-US" i="1" dirty="0"/>
+              <a:t>If yes, what condition(s) have you been diagnosed with?</a:t>
+            </a:r>
+            <a:endParaRPr lang="es-ES" dirty="0"/>
+          </a:p>
+          <a:p>
+            <a:pPr lvl="1"/>
+            <a:r>
+              <a:rPr lang="en-US" i="1" dirty="0"/>
+              <a:t>If maybe, what condition(s) do you believe you have?</a:t>
+            </a:r>
+            <a:endParaRPr lang="es-ES" dirty="0"/>
+          </a:p>
+          <a:p>
+            <a:endParaRPr lang="es-ES" dirty="0"/>
+          </a:p>
+          <a:p>
+            <a:endParaRPr lang="es-ES" dirty="0"/>
+          </a:p>
+          <a:p>
+            <a:endParaRPr lang="es-ES" dirty="0"/>
+          </a:p>
+        </p:txBody>
+      </p:sp>
+      <p:pic>
+        <p:nvPicPr>
+          <p:cNvPr id="4" name="Imagen 3">
+            <a:extLst>
+              <a:ext uri="{FF2B5EF4-FFF2-40B4-BE49-F238E27FC236}">
+                <a16:creationId xmlns:a16="http://schemas.microsoft.com/office/drawing/2014/main" id="{FA68109E-F6A5-4A48-8507-DA90CBC0A80D}"/>
+              </a:ext>
+            </a:extLst>
+          </p:cNvPr>
+          <p:cNvPicPr/>
+          <p:nvPr/>
+        </p:nvPicPr>
+        <p:blipFill>
+          <a:blip r:embed="rId2">
+            <a:extLst>
+              <a:ext uri="{28A0092B-C50C-407E-A947-70E740481C1C}">
+                <a14:useLocalDpi xmlns:a14="http://schemas.microsoft.com/office/drawing/2010/main" val="0"/>
+              </a:ext>
+            </a:extLst>
+          </a:blip>
+          <a:srcRect/>
+          <a:stretch>
+            <a:fillRect/>
+          </a:stretch>
+        </p:blipFill>
+        <p:spPr bwMode="auto">
+          <a:xfrm>
+            <a:off x="1297617" y="3152048"/>
+            <a:ext cx="5554119" cy="3705952"/>
+          </a:xfrm>
+          <a:prstGeom prst="rect">
+            <a:avLst/>
+          </a:prstGeom>
+          <a:noFill/>
+          <a:ln>
+            <a:noFill/>
+          </a:ln>
+        </p:spPr>
+      </p:pic>
+    </p:spTree>
+    <p:extLst>
+      <p:ext uri="{BB962C8B-B14F-4D97-AF65-F5344CB8AC3E}">
+        <p14:creationId xmlns:p14="http://schemas.microsoft.com/office/powerpoint/2010/main" val="77169741"/>
+      </p:ext>
+    </p:extLst>
+  </p:cSld>
+  <p:clrMapOvr>
+    <a:masterClrMapping/>
+  </p:clrMapOvr>
+</p:sld>
+</file>
+
 <file path=ppt/slides/slide3.xml><?xml version="1.0" encoding="utf-8"?>
 <p:sld xmlns:a="http://schemas.openxmlformats.org/drawingml/2006/main" xmlns:r="http://schemas.openxmlformats.org/officeDocument/2006/relationships" xmlns:p="http://schemas.openxmlformats.org/presentationml/2006/main">
   <p:cSld>
@@ -8376,7 +9680,12 @@
             <p:ph idx="1"/>
           </p:nvPr>
         </p:nvSpPr>
-        <p:spPr/>
+        <p:spPr>
+          <a:xfrm>
+            <a:off x="671292" y="1933710"/>
+            <a:ext cx="8596668" cy="3880773"/>
+          </a:xfrm>
+        </p:spPr>
         <p:txBody>
           <a:bodyPr/>
           <a:lstStyle/>
@@ -8532,6 +9841,1428 @@
 </p:sld>
 </file>
 
+<file path=ppt/slides/slide30.xml><?xml version="1.0" encoding="utf-8"?>
+<p:sld xmlns:a="http://schemas.openxmlformats.org/drawingml/2006/main" xmlns:r="http://schemas.openxmlformats.org/officeDocument/2006/relationships" xmlns:p="http://schemas.openxmlformats.org/presentationml/2006/main">
+  <p:cSld>
+    <p:spTree>
+      <p:nvGrpSpPr>
+        <p:cNvPr id="1" name=""/>
+        <p:cNvGrpSpPr/>
+        <p:nvPr/>
+      </p:nvGrpSpPr>
+      <p:grpSpPr>
+        <a:xfrm>
+          <a:off x="0" y="0"/>
+          <a:ext cx="0" cy="0"/>
+          <a:chOff x="0" y="0"/>
+          <a:chExt cx="0" cy="0"/>
+        </a:xfrm>
+      </p:grpSpPr>
+      <p:sp>
+        <p:nvSpPr>
+          <p:cNvPr id="2" name="Título 1">
+            <a:extLst>
+              <a:ext uri="{FF2B5EF4-FFF2-40B4-BE49-F238E27FC236}">
+                <a16:creationId xmlns:a16="http://schemas.microsoft.com/office/drawing/2014/main" id="{713C02B5-CD52-4C57-A973-686529F05156}"/>
+              </a:ext>
+            </a:extLst>
+          </p:cNvPr>
+          <p:cNvSpPr>
+            <a:spLocks noGrp="1"/>
+          </p:cNvSpPr>
+          <p:nvPr>
+            <p:ph type="title"/>
+          </p:nvPr>
+        </p:nvSpPr>
+        <p:spPr/>
+        <p:txBody>
+          <a:bodyPr/>
+          <a:lstStyle/>
+          <a:p>
+            <a:r>
+              <a:rPr lang="es-ES" dirty="0"/>
+              <a:t>2.3. Tercera iteración: data </a:t>
+            </a:r>
+            <a:r>
+              <a:rPr lang="es-ES" dirty="0" err="1"/>
+              <a:t>mining</a:t>
+            </a:r>
+            <a:endParaRPr lang="es-ES" dirty="0"/>
+          </a:p>
+        </p:txBody>
+      </p:sp>
+      <p:sp>
+        <p:nvSpPr>
+          <p:cNvPr id="3" name="Marcador de contenido 2">
+            <a:extLst>
+              <a:ext uri="{FF2B5EF4-FFF2-40B4-BE49-F238E27FC236}">
+                <a16:creationId xmlns:a16="http://schemas.microsoft.com/office/drawing/2014/main" id="{C04CABB0-F69E-47FE-82C9-C9022F4AE937}"/>
+              </a:ext>
+            </a:extLst>
+          </p:cNvPr>
+          <p:cNvSpPr>
+            <a:spLocks noGrp="1"/>
+          </p:cNvSpPr>
+          <p:nvPr>
+            <p:ph idx="1"/>
+          </p:nvPr>
+        </p:nvSpPr>
+        <p:spPr>
+          <a:xfrm>
+            <a:off x="838200" y="1815783"/>
+            <a:ext cx="10515600" cy="4351338"/>
+          </a:xfrm>
+        </p:spPr>
+        <p:txBody>
+          <a:bodyPr/>
+          <a:lstStyle/>
+          <a:p>
+            <a:r>
+              <a:rPr lang="es-ES" dirty="0"/>
+              <a:t>Árbol de decisión</a:t>
+            </a:r>
+          </a:p>
+        </p:txBody>
+      </p:sp>
+      <p:pic>
+        <p:nvPicPr>
+          <p:cNvPr id="6" name="Imagen 5">
+            <a:extLst>
+              <a:ext uri="{FF2B5EF4-FFF2-40B4-BE49-F238E27FC236}">
+                <a16:creationId xmlns:a16="http://schemas.microsoft.com/office/drawing/2014/main" id="{638835D7-2F54-45BA-B24E-5D9FFD175457}"/>
+              </a:ext>
+            </a:extLst>
+          </p:cNvPr>
+          <p:cNvPicPr/>
+          <p:nvPr/>
+        </p:nvPicPr>
+        <p:blipFill>
+          <a:blip r:embed="rId2"/>
+          <a:stretch>
+            <a:fillRect/>
+          </a:stretch>
+        </p:blipFill>
+        <p:spPr>
+          <a:xfrm>
+            <a:off x="1596971" y="2267628"/>
+            <a:ext cx="8048069" cy="4351337"/>
+          </a:xfrm>
+          <a:prstGeom prst="rect">
+            <a:avLst/>
+          </a:prstGeom>
+        </p:spPr>
+      </p:pic>
+    </p:spTree>
+    <p:extLst>
+      <p:ext uri="{BB962C8B-B14F-4D97-AF65-F5344CB8AC3E}">
+        <p14:creationId xmlns:p14="http://schemas.microsoft.com/office/powerpoint/2010/main" val="2580939046"/>
+      </p:ext>
+    </p:extLst>
+  </p:cSld>
+  <p:clrMapOvr>
+    <a:masterClrMapping/>
+  </p:clrMapOvr>
+</p:sld>
+</file>
+
+<file path=ppt/slides/slide31.xml><?xml version="1.0" encoding="utf-8"?>
+<p:sld xmlns:a="http://schemas.openxmlformats.org/drawingml/2006/main" xmlns:r="http://schemas.openxmlformats.org/officeDocument/2006/relationships" xmlns:p="http://schemas.openxmlformats.org/presentationml/2006/main">
+  <p:cSld>
+    <p:spTree>
+      <p:nvGrpSpPr>
+        <p:cNvPr id="1" name=""/>
+        <p:cNvGrpSpPr/>
+        <p:nvPr/>
+      </p:nvGrpSpPr>
+      <p:grpSpPr>
+        <a:xfrm>
+          <a:off x="0" y="0"/>
+          <a:ext cx="0" cy="0"/>
+          <a:chOff x="0" y="0"/>
+          <a:chExt cx="0" cy="0"/>
+        </a:xfrm>
+      </p:grpSpPr>
+      <p:sp>
+        <p:nvSpPr>
+          <p:cNvPr id="2" name="Título 1">
+            <a:extLst>
+              <a:ext uri="{FF2B5EF4-FFF2-40B4-BE49-F238E27FC236}">
+                <a16:creationId xmlns:a16="http://schemas.microsoft.com/office/drawing/2014/main" id="{713C02B5-CD52-4C57-A973-686529F05156}"/>
+              </a:ext>
+            </a:extLst>
+          </p:cNvPr>
+          <p:cNvSpPr>
+            <a:spLocks noGrp="1"/>
+          </p:cNvSpPr>
+          <p:nvPr>
+            <p:ph type="title"/>
+          </p:nvPr>
+        </p:nvSpPr>
+        <p:spPr/>
+        <p:txBody>
+          <a:bodyPr/>
+          <a:lstStyle/>
+          <a:p>
+            <a:r>
+              <a:rPr lang="es-ES" dirty="0"/>
+              <a:t>2.3. Tercera iteración: data </a:t>
+            </a:r>
+            <a:r>
+              <a:rPr lang="es-ES" dirty="0" err="1"/>
+              <a:t>mining</a:t>
+            </a:r>
+            <a:endParaRPr lang="es-ES" dirty="0"/>
+          </a:p>
+        </p:txBody>
+      </p:sp>
+      <p:sp>
+        <p:nvSpPr>
+          <p:cNvPr id="3" name="Marcador de contenido 2">
+            <a:extLst>
+              <a:ext uri="{FF2B5EF4-FFF2-40B4-BE49-F238E27FC236}">
+                <a16:creationId xmlns:a16="http://schemas.microsoft.com/office/drawing/2014/main" id="{C04CABB0-F69E-47FE-82C9-C9022F4AE937}"/>
+              </a:ext>
+            </a:extLst>
+          </p:cNvPr>
+          <p:cNvSpPr>
+            <a:spLocks noGrp="1"/>
+          </p:cNvSpPr>
+          <p:nvPr>
+            <p:ph idx="1"/>
+          </p:nvPr>
+        </p:nvSpPr>
+        <p:spPr>
+          <a:xfrm>
+            <a:off x="838200" y="1815783"/>
+            <a:ext cx="10515600" cy="4351338"/>
+          </a:xfrm>
+        </p:spPr>
+        <p:txBody>
+          <a:bodyPr/>
+          <a:lstStyle/>
+          <a:p>
+            <a:pPr marL="0" indent="0">
+              <a:buNone/>
+            </a:pPr>
+            <a:r>
+              <a:rPr lang="es-ES" sz="2000" dirty="0"/>
+              <a:t>CONCLUSIONES</a:t>
+            </a:r>
+          </a:p>
+          <a:p>
+            <a:r>
+              <a:rPr lang="es-ES" dirty="0"/>
+              <a:t>“Mala” iteración: las clases estaban muy desbalanceadas</a:t>
+            </a:r>
+          </a:p>
+          <a:p>
+            <a:endParaRPr lang="es-ES" dirty="0"/>
+          </a:p>
+          <a:p>
+            <a:endParaRPr lang="es-ES" dirty="0"/>
+          </a:p>
+          <a:p>
+            <a:endParaRPr lang="es-ES" dirty="0"/>
+          </a:p>
+          <a:p>
+            <a:endParaRPr lang="es-ES" dirty="0"/>
+          </a:p>
+          <a:p>
+            <a:endParaRPr lang="es-ES" dirty="0"/>
+          </a:p>
+          <a:p>
+            <a:endParaRPr lang="es-ES" dirty="0"/>
+          </a:p>
+          <a:p>
+            <a:pPr marL="0" indent="0">
+              <a:buNone/>
+            </a:pPr>
+            <a:r>
+              <a:rPr lang="es-ES" sz="3600" dirty="0"/>
+              <a:t>							¡Otra iteración!</a:t>
+            </a:r>
+          </a:p>
+        </p:txBody>
+      </p:sp>
+    </p:spTree>
+    <p:extLst>
+      <p:ext uri="{BB962C8B-B14F-4D97-AF65-F5344CB8AC3E}">
+        <p14:creationId xmlns:p14="http://schemas.microsoft.com/office/powerpoint/2010/main" val="976396462"/>
+      </p:ext>
+    </p:extLst>
+  </p:cSld>
+  <p:clrMapOvr>
+    <a:masterClrMapping/>
+  </p:clrMapOvr>
+</p:sld>
+</file>
+
+<file path=ppt/slides/slide32.xml><?xml version="1.0" encoding="utf-8"?>
+<p:sld xmlns:a="http://schemas.openxmlformats.org/drawingml/2006/main" xmlns:r="http://schemas.openxmlformats.org/officeDocument/2006/relationships" xmlns:p="http://schemas.openxmlformats.org/presentationml/2006/main">
+  <p:cSld>
+    <p:spTree>
+      <p:nvGrpSpPr>
+        <p:cNvPr id="1" name=""/>
+        <p:cNvGrpSpPr/>
+        <p:nvPr/>
+      </p:nvGrpSpPr>
+      <p:grpSpPr>
+        <a:xfrm>
+          <a:off x="0" y="0"/>
+          <a:ext cx="0" cy="0"/>
+          <a:chOff x="0" y="0"/>
+          <a:chExt cx="0" cy="0"/>
+        </a:xfrm>
+      </p:grpSpPr>
+      <p:sp>
+        <p:nvSpPr>
+          <p:cNvPr id="2" name="Título 1">
+            <a:extLst>
+              <a:ext uri="{FF2B5EF4-FFF2-40B4-BE49-F238E27FC236}">
+                <a16:creationId xmlns:a16="http://schemas.microsoft.com/office/drawing/2014/main" id="{1AEF56AF-E1B2-403A-BB67-76874287F5FF}"/>
+              </a:ext>
+            </a:extLst>
+          </p:cNvPr>
+          <p:cNvSpPr>
+            <a:spLocks noGrp="1"/>
+          </p:cNvSpPr>
+          <p:nvPr>
+            <p:ph type="title"/>
+          </p:nvPr>
+        </p:nvSpPr>
+        <p:spPr/>
+        <p:txBody>
+          <a:bodyPr/>
+          <a:lstStyle/>
+          <a:p>
+            <a:r>
+              <a:rPr lang="es-ES" dirty="0"/>
+              <a:t>2.4. Cuarta iteración: </a:t>
+            </a:r>
+            <a:r>
+              <a:rPr lang="es-ES" dirty="0" err="1"/>
+              <a:t>pre-procesado</a:t>
+            </a:r>
+            <a:endParaRPr lang="es-ES" dirty="0"/>
+          </a:p>
+        </p:txBody>
+      </p:sp>
+      <p:sp>
+        <p:nvSpPr>
+          <p:cNvPr id="3" name="Marcador de contenido 2">
+            <a:extLst>
+              <a:ext uri="{FF2B5EF4-FFF2-40B4-BE49-F238E27FC236}">
+                <a16:creationId xmlns:a16="http://schemas.microsoft.com/office/drawing/2014/main" id="{AF23C72D-2C99-4330-BBEF-3DEA75D32DF6}"/>
+              </a:ext>
+            </a:extLst>
+          </p:cNvPr>
+          <p:cNvSpPr>
+            <a:spLocks noGrp="1"/>
+          </p:cNvSpPr>
+          <p:nvPr>
+            <p:ph idx="1"/>
+          </p:nvPr>
+        </p:nvSpPr>
+        <p:spPr>
+          <a:xfrm>
+            <a:off x="677334" y="1930400"/>
+            <a:ext cx="8596668" cy="3880773"/>
+          </a:xfrm>
+        </p:spPr>
+        <p:txBody>
+          <a:bodyPr/>
+          <a:lstStyle/>
+          <a:p>
+            <a:r>
+              <a:rPr lang="es-ES" dirty="0"/>
+              <a:t>Agrupación en 3 clases</a:t>
+            </a:r>
+          </a:p>
+          <a:p>
+            <a:endParaRPr lang="es-ES" dirty="0"/>
+          </a:p>
+          <a:p>
+            <a:endParaRPr lang="es-ES" dirty="0"/>
+          </a:p>
+          <a:p>
+            <a:endParaRPr lang="es-ES" dirty="0"/>
+          </a:p>
+        </p:txBody>
+      </p:sp>
+      <p:pic>
+        <p:nvPicPr>
+          <p:cNvPr id="4" name="Imagen 3">
+            <a:extLst>
+              <a:ext uri="{FF2B5EF4-FFF2-40B4-BE49-F238E27FC236}">
+                <a16:creationId xmlns:a16="http://schemas.microsoft.com/office/drawing/2014/main" id="{165A76E8-7D65-44E4-B8B4-90246A6723CA}"/>
+              </a:ext>
+            </a:extLst>
+          </p:cNvPr>
+          <p:cNvPicPr/>
+          <p:nvPr/>
+        </p:nvPicPr>
+        <p:blipFill>
+          <a:blip r:embed="rId2">
+            <a:extLst>
+              <a:ext uri="{28A0092B-C50C-407E-A947-70E740481C1C}">
+                <a14:useLocalDpi xmlns:a14="http://schemas.microsoft.com/office/drawing/2010/main" val="0"/>
+              </a:ext>
+            </a:extLst>
+          </a:blip>
+          <a:srcRect/>
+          <a:stretch>
+            <a:fillRect/>
+          </a:stretch>
+        </p:blipFill>
+        <p:spPr bwMode="auto">
+          <a:xfrm>
+            <a:off x="2219935" y="2397429"/>
+            <a:ext cx="6953859" cy="4372889"/>
+          </a:xfrm>
+          <a:prstGeom prst="rect">
+            <a:avLst/>
+          </a:prstGeom>
+          <a:noFill/>
+          <a:ln>
+            <a:noFill/>
+          </a:ln>
+        </p:spPr>
+      </p:pic>
+    </p:spTree>
+    <p:extLst>
+      <p:ext uri="{BB962C8B-B14F-4D97-AF65-F5344CB8AC3E}">
+        <p14:creationId xmlns:p14="http://schemas.microsoft.com/office/powerpoint/2010/main" val="2341559564"/>
+      </p:ext>
+    </p:extLst>
+  </p:cSld>
+  <p:clrMapOvr>
+    <a:masterClrMapping/>
+  </p:clrMapOvr>
+</p:sld>
+</file>
+
+<file path=ppt/slides/slide33.xml><?xml version="1.0" encoding="utf-8"?>
+<p:sld xmlns:a="http://schemas.openxmlformats.org/drawingml/2006/main" xmlns:r="http://schemas.openxmlformats.org/officeDocument/2006/relationships" xmlns:p="http://schemas.openxmlformats.org/presentationml/2006/main">
+  <p:cSld>
+    <p:spTree>
+      <p:nvGrpSpPr>
+        <p:cNvPr id="1" name=""/>
+        <p:cNvGrpSpPr/>
+        <p:nvPr/>
+      </p:nvGrpSpPr>
+      <p:grpSpPr>
+        <a:xfrm>
+          <a:off x="0" y="0"/>
+          <a:ext cx="0" cy="0"/>
+          <a:chOff x="0" y="0"/>
+          <a:chExt cx="0" cy="0"/>
+        </a:xfrm>
+      </p:grpSpPr>
+      <p:sp>
+        <p:nvSpPr>
+          <p:cNvPr id="2" name="Título 1">
+            <a:extLst>
+              <a:ext uri="{FF2B5EF4-FFF2-40B4-BE49-F238E27FC236}">
+                <a16:creationId xmlns:a16="http://schemas.microsoft.com/office/drawing/2014/main" id="{1AEF56AF-E1B2-403A-BB67-76874287F5FF}"/>
+              </a:ext>
+            </a:extLst>
+          </p:cNvPr>
+          <p:cNvSpPr>
+            <a:spLocks noGrp="1"/>
+          </p:cNvSpPr>
+          <p:nvPr>
+            <p:ph type="title"/>
+          </p:nvPr>
+        </p:nvSpPr>
+        <p:spPr/>
+        <p:txBody>
+          <a:bodyPr/>
+          <a:lstStyle/>
+          <a:p>
+            <a:r>
+              <a:rPr lang="es-ES" dirty="0"/>
+              <a:t>2.4. Cuarta iteración: data </a:t>
+            </a:r>
+            <a:r>
+              <a:rPr lang="es-ES" dirty="0" err="1"/>
+              <a:t>mining</a:t>
+            </a:r>
+            <a:endParaRPr lang="es-ES" dirty="0"/>
+          </a:p>
+        </p:txBody>
+      </p:sp>
+      <p:sp>
+        <p:nvSpPr>
+          <p:cNvPr id="3" name="Marcador de contenido 2">
+            <a:extLst>
+              <a:ext uri="{FF2B5EF4-FFF2-40B4-BE49-F238E27FC236}">
+                <a16:creationId xmlns:a16="http://schemas.microsoft.com/office/drawing/2014/main" id="{AF23C72D-2C99-4330-BBEF-3DEA75D32DF6}"/>
+              </a:ext>
+            </a:extLst>
+          </p:cNvPr>
+          <p:cNvSpPr>
+            <a:spLocks noGrp="1"/>
+          </p:cNvSpPr>
+          <p:nvPr>
+            <p:ph idx="1"/>
+          </p:nvPr>
+        </p:nvSpPr>
+        <p:spPr>
+          <a:xfrm>
+            <a:off x="677334" y="1930400"/>
+            <a:ext cx="8596668" cy="3880773"/>
+          </a:xfrm>
+        </p:spPr>
+        <p:txBody>
+          <a:bodyPr/>
+          <a:lstStyle/>
+          <a:p>
+            <a:r>
+              <a:rPr lang="es-ES" dirty="0"/>
+              <a:t>Algoritmo KNN</a:t>
+            </a:r>
+          </a:p>
+          <a:p>
+            <a:endParaRPr lang="es-ES" dirty="0"/>
+          </a:p>
+          <a:p>
+            <a:pPr marL="0" indent="0">
+              <a:buNone/>
+            </a:pPr>
+            <a:endParaRPr lang="es-ES" dirty="0"/>
+          </a:p>
+          <a:p>
+            <a:endParaRPr lang="es-ES" dirty="0"/>
+          </a:p>
+          <a:p>
+            <a:endParaRPr lang="es-ES" dirty="0"/>
+          </a:p>
+          <a:p>
+            <a:endParaRPr lang="es-ES" dirty="0"/>
+          </a:p>
+        </p:txBody>
+      </p:sp>
+      <p:pic>
+        <p:nvPicPr>
+          <p:cNvPr id="5" name="Imagen 4">
+            <a:extLst>
+              <a:ext uri="{FF2B5EF4-FFF2-40B4-BE49-F238E27FC236}">
+                <a16:creationId xmlns:a16="http://schemas.microsoft.com/office/drawing/2014/main" id="{13EA131C-C5F0-4B63-8AE8-E57BD1FB42DE}"/>
+              </a:ext>
+            </a:extLst>
+          </p:cNvPr>
+          <p:cNvPicPr/>
+          <p:nvPr/>
+        </p:nvPicPr>
+        <p:blipFill>
+          <a:blip r:embed="rId2">
+            <a:extLst>
+              <a:ext uri="{28A0092B-C50C-407E-A947-70E740481C1C}">
+                <a14:useLocalDpi xmlns:a14="http://schemas.microsoft.com/office/drawing/2010/main" val="0"/>
+              </a:ext>
+            </a:extLst>
+          </a:blip>
+          <a:stretch>
+            <a:fillRect/>
+          </a:stretch>
+        </p:blipFill>
+        <p:spPr>
+          <a:xfrm>
+            <a:off x="874964" y="2479860"/>
+            <a:ext cx="5651095" cy="3582737"/>
+          </a:xfrm>
+          <a:prstGeom prst="rect">
+            <a:avLst/>
+          </a:prstGeom>
+        </p:spPr>
+      </p:pic>
+      <p:pic>
+        <p:nvPicPr>
+          <p:cNvPr id="6" name="Imagen 5">
+            <a:extLst>
+              <a:ext uri="{FF2B5EF4-FFF2-40B4-BE49-F238E27FC236}">
+                <a16:creationId xmlns:a16="http://schemas.microsoft.com/office/drawing/2014/main" id="{5A6C7CE3-F0FD-4ED0-8A95-67D921A6CD97}"/>
+              </a:ext>
+            </a:extLst>
+          </p:cNvPr>
+          <p:cNvPicPr/>
+          <p:nvPr/>
+        </p:nvPicPr>
+        <p:blipFill>
+          <a:blip r:embed="rId3" cstate="print">
+            <a:extLst>
+              <a:ext uri="{28A0092B-C50C-407E-A947-70E740481C1C}">
+                <a14:useLocalDpi xmlns:a14="http://schemas.microsoft.com/office/drawing/2010/main" val="0"/>
+              </a:ext>
+            </a:extLst>
+          </a:blip>
+          <a:stretch>
+            <a:fillRect/>
+          </a:stretch>
+        </p:blipFill>
+        <p:spPr>
+          <a:xfrm>
+            <a:off x="6712014" y="3209098"/>
+            <a:ext cx="4605021" cy="1320800"/>
+          </a:xfrm>
+          <a:prstGeom prst="rect">
+            <a:avLst/>
+          </a:prstGeom>
+        </p:spPr>
+      </p:pic>
+    </p:spTree>
+    <p:extLst>
+      <p:ext uri="{BB962C8B-B14F-4D97-AF65-F5344CB8AC3E}">
+        <p14:creationId xmlns:p14="http://schemas.microsoft.com/office/powerpoint/2010/main" val="1088952648"/>
+      </p:ext>
+    </p:extLst>
+  </p:cSld>
+  <p:clrMapOvr>
+    <a:masterClrMapping/>
+  </p:clrMapOvr>
+</p:sld>
+</file>
+
+<file path=ppt/slides/slide34.xml><?xml version="1.0" encoding="utf-8"?>
+<p:sld xmlns:a="http://schemas.openxmlformats.org/drawingml/2006/main" xmlns:r="http://schemas.openxmlformats.org/officeDocument/2006/relationships" xmlns:p="http://schemas.openxmlformats.org/presentationml/2006/main">
+  <p:cSld>
+    <p:spTree>
+      <p:nvGrpSpPr>
+        <p:cNvPr id="1" name=""/>
+        <p:cNvGrpSpPr/>
+        <p:nvPr/>
+      </p:nvGrpSpPr>
+      <p:grpSpPr>
+        <a:xfrm>
+          <a:off x="0" y="0"/>
+          <a:ext cx="0" cy="0"/>
+          <a:chOff x="0" y="0"/>
+          <a:chExt cx="0" cy="0"/>
+        </a:xfrm>
+      </p:grpSpPr>
+      <p:sp>
+        <p:nvSpPr>
+          <p:cNvPr id="2" name="Título 1">
+            <a:extLst>
+              <a:ext uri="{FF2B5EF4-FFF2-40B4-BE49-F238E27FC236}">
+                <a16:creationId xmlns:a16="http://schemas.microsoft.com/office/drawing/2014/main" id="{1AEF56AF-E1B2-403A-BB67-76874287F5FF}"/>
+              </a:ext>
+            </a:extLst>
+          </p:cNvPr>
+          <p:cNvSpPr>
+            <a:spLocks noGrp="1"/>
+          </p:cNvSpPr>
+          <p:nvPr>
+            <p:ph type="title"/>
+          </p:nvPr>
+        </p:nvSpPr>
+        <p:spPr/>
+        <p:txBody>
+          <a:bodyPr/>
+          <a:lstStyle/>
+          <a:p>
+            <a:r>
+              <a:rPr lang="es-ES" dirty="0"/>
+              <a:t>2.4. Cuarta iteración: data </a:t>
+            </a:r>
+            <a:r>
+              <a:rPr lang="es-ES" dirty="0" err="1"/>
+              <a:t>mining</a:t>
+            </a:r>
+            <a:endParaRPr lang="es-ES" dirty="0"/>
+          </a:p>
+        </p:txBody>
+      </p:sp>
+      <p:sp>
+        <p:nvSpPr>
+          <p:cNvPr id="3" name="Marcador de contenido 2">
+            <a:extLst>
+              <a:ext uri="{FF2B5EF4-FFF2-40B4-BE49-F238E27FC236}">
+                <a16:creationId xmlns:a16="http://schemas.microsoft.com/office/drawing/2014/main" id="{AF23C72D-2C99-4330-BBEF-3DEA75D32DF6}"/>
+              </a:ext>
+            </a:extLst>
+          </p:cNvPr>
+          <p:cNvSpPr>
+            <a:spLocks noGrp="1"/>
+          </p:cNvSpPr>
+          <p:nvPr>
+            <p:ph idx="1"/>
+          </p:nvPr>
+        </p:nvSpPr>
+        <p:spPr>
+          <a:xfrm>
+            <a:off x="677334" y="1930400"/>
+            <a:ext cx="8596668" cy="3880773"/>
+          </a:xfrm>
+        </p:spPr>
+        <p:txBody>
+          <a:bodyPr/>
+          <a:lstStyle/>
+          <a:p>
+            <a:r>
+              <a:rPr lang="es-ES" dirty="0" err="1"/>
+              <a:t>Random</a:t>
+            </a:r>
+            <a:r>
+              <a:rPr lang="es-ES" dirty="0"/>
+              <a:t> </a:t>
+            </a:r>
+            <a:r>
+              <a:rPr lang="es-ES" dirty="0" err="1"/>
+              <a:t>forest</a:t>
+            </a:r>
+            <a:endParaRPr lang="es-ES" dirty="0"/>
+          </a:p>
+          <a:p>
+            <a:endParaRPr lang="es-ES" dirty="0"/>
+          </a:p>
+          <a:p>
+            <a:pPr marL="0" indent="0">
+              <a:buNone/>
+            </a:pPr>
+            <a:endParaRPr lang="es-ES" dirty="0"/>
+          </a:p>
+          <a:p>
+            <a:endParaRPr lang="es-ES" dirty="0"/>
+          </a:p>
+          <a:p>
+            <a:endParaRPr lang="es-ES" dirty="0"/>
+          </a:p>
+          <a:p>
+            <a:endParaRPr lang="es-ES" dirty="0"/>
+          </a:p>
+        </p:txBody>
+      </p:sp>
+      <p:pic>
+        <p:nvPicPr>
+          <p:cNvPr id="7" name="Imagen 6">
+            <a:extLst>
+              <a:ext uri="{FF2B5EF4-FFF2-40B4-BE49-F238E27FC236}">
+                <a16:creationId xmlns:a16="http://schemas.microsoft.com/office/drawing/2014/main" id="{88B04201-32B4-4C27-926F-8C2EE1C6A6E9}"/>
+              </a:ext>
+            </a:extLst>
+          </p:cNvPr>
+          <p:cNvPicPr/>
+          <p:nvPr/>
+        </p:nvPicPr>
+        <p:blipFill>
+          <a:blip r:embed="rId2"/>
+          <a:stretch>
+            <a:fillRect/>
+          </a:stretch>
+        </p:blipFill>
+        <p:spPr>
+          <a:xfrm>
+            <a:off x="1654862" y="2417522"/>
+            <a:ext cx="8077861" cy="4096011"/>
+          </a:xfrm>
+          <a:prstGeom prst="rect">
+            <a:avLst/>
+          </a:prstGeom>
+        </p:spPr>
+      </p:pic>
+    </p:spTree>
+    <p:extLst>
+      <p:ext uri="{BB962C8B-B14F-4D97-AF65-F5344CB8AC3E}">
+        <p14:creationId xmlns:p14="http://schemas.microsoft.com/office/powerpoint/2010/main" val="390792259"/>
+      </p:ext>
+    </p:extLst>
+  </p:cSld>
+  <p:clrMapOvr>
+    <a:masterClrMapping/>
+  </p:clrMapOvr>
+</p:sld>
+</file>
+
+<file path=ppt/slides/slide35.xml><?xml version="1.0" encoding="utf-8"?>
+<p:sld xmlns:a="http://schemas.openxmlformats.org/drawingml/2006/main" xmlns:r="http://schemas.openxmlformats.org/officeDocument/2006/relationships" xmlns:p="http://schemas.openxmlformats.org/presentationml/2006/main">
+  <p:cSld>
+    <p:spTree>
+      <p:nvGrpSpPr>
+        <p:cNvPr id="1" name=""/>
+        <p:cNvGrpSpPr/>
+        <p:nvPr/>
+      </p:nvGrpSpPr>
+      <p:grpSpPr>
+        <a:xfrm>
+          <a:off x="0" y="0"/>
+          <a:ext cx="0" cy="0"/>
+          <a:chOff x="0" y="0"/>
+          <a:chExt cx="0" cy="0"/>
+        </a:xfrm>
+      </p:grpSpPr>
+      <p:sp>
+        <p:nvSpPr>
+          <p:cNvPr id="2" name="Título 1">
+            <a:extLst>
+              <a:ext uri="{FF2B5EF4-FFF2-40B4-BE49-F238E27FC236}">
+                <a16:creationId xmlns:a16="http://schemas.microsoft.com/office/drawing/2014/main" id="{278991C6-B626-48DD-9042-FB1F7ECED3CF}"/>
+              </a:ext>
+            </a:extLst>
+          </p:cNvPr>
+          <p:cNvSpPr>
+            <a:spLocks noGrp="1"/>
+          </p:cNvSpPr>
+          <p:nvPr>
+            <p:ph type="title"/>
+          </p:nvPr>
+        </p:nvSpPr>
+        <p:spPr/>
+        <p:txBody>
+          <a:bodyPr/>
+          <a:lstStyle/>
+          <a:p>
+            <a:r>
+              <a:rPr lang="es-ES" dirty="0"/>
+              <a:t>2.4. Cuarta iteración: conclusiones</a:t>
+            </a:r>
+          </a:p>
+        </p:txBody>
+      </p:sp>
+      <p:sp>
+        <p:nvSpPr>
+          <p:cNvPr id="3" name="Marcador de contenido 2">
+            <a:extLst>
+              <a:ext uri="{FF2B5EF4-FFF2-40B4-BE49-F238E27FC236}">
+                <a16:creationId xmlns:a16="http://schemas.microsoft.com/office/drawing/2014/main" id="{F11EB9E3-5565-4D5C-B2A4-2E390E46425F}"/>
+              </a:ext>
+            </a:extLst>
+          </p:cNvPr>
+          <p:cNvSpPr>
+            <a:spLocks noGrp="1"/>
+          </p:cNvSpPr>
+          <p:nvPr>
+            <p:ph idx="1"/>
+          </p:nvPr>
+        </p:nvSpPr>
+        <p:spPr>
+          <a:xfrm>
+            <a:off x="677334" y="1930400"/>
+            <a:ext cx="8596668" cy="3880773"/>
+          </a:xfrm>
+        </p:spPr>
+        <p:txBody>
+          <a:bodyPr/>
+          <a:lstStyle/>
+          <a:p>
+            <a:r>
+              <a:rPr lang="es-ES" dirty="0"/>
+              <a:t>Es la iteración que mejores resultados ha conseguido:</a:t>
+            </a:r>
+          </a:p>
+          <a:p>
+            <a:endParaRPr lang="es-ES" dirty="0"/>
+          </a:p>
+          <a:p>
+            <a:endParaRPr lang="es-ES" dirty="0"/>
+          </a:p>
+          <a:p>
+            <a:pPr marL="0" indent="0" algn="ctr">
+              <a:buNone/>
+            </a:pPr>
+            <a:r>
+              <a:rPr lang="es-ES" sz="2800" dirty="0"/>
+              <a:t>¡83.5% </a:t>
+            </a:r>
+            <a:r>
+              <a:rPr lang="es-ES" sz="2800" i="1" dirty="0" err="1"/>
+              <a:t>accuracy</a:t>
+            </a:r>
+            <a:r>
+              <a:rPr lang="es-ES" sz="2800" i="1" dirty="0"/>
+              <a:t>!</a:t>
+            </a:r>
+          </a:p>
+          <a:p>
+            <a:pPr marL="0" indent="0" algn="ctr">
+              <a:buNone/>
+            </a:pPr>
+            <a:endParaRPr lang="es-ES" sz="2800" i="1" dirty="0"/>
+          </a:p>
+          <a:p>
+            <a:pPr marL="0" indent="0">
+              <a:buNone/>
+            </a:pPr>
+            <a:endParaRPr lang="es-ES" sz="2800" i="1" dirty="0"/>
+          </a:p>
+        </p:txBody>
+      </p:sp>
+    </p:spTree>
+    <p:extLst>
+      <p:ext uri="{BB962C8B-B14F-4D97-AF65-F5344CB8AC3E}">
+        <p14:creationId xmlns:p14="http://schemas.microsoft.com/office/powerpoint/2010/main" val="166385472"/>
+      </p:ext>
+    </p:extLst>
+  </p:cSld>
+  <p:clrMapOvr>
+    <a:masterClrMapping/>
+  </p:clrMapOvr>
+</p:sld>
+</file>
+
+<file path=ppt/slides/slide36.xml><?xml version="1.0" encoding="utf-8"?>
+<p:sld xmlns:a="http://schemas.openxmlformats.org/drawingml/2006/main" xmlns:r="http://schemas.openxmlformats.org/officeDocument/2006/relationships" xmlns:p="http://schemas.openxmlformats.org/presentationml/2006/main">
+  <p:cSld>
+    <p:spTree>
+      <p:nvGrpSpPr>
+        <p:cNvPr id="1" name=""/>
+        <p:cNvGrpSpPr/>
+        <p:nvPr/>
+      </p:nvGrpSpPr>
+      <p:grpSpPr>
+        <a:xfrm>
+          <a:off x="0" y="0"/>
+          <a:ext cx="0" cy="0"/>
+          <a:chOff x="0" y="0"/>
+          <a:chExt cx="0" cy="0"/>
+        </a:xfrm>
+      </p:grpSpPr>
+      <p:sp>
+        <p:nvSpPr>
+          <p:cNvPr id="2" name="Título 1">
+            <a:extLst>
+              <a:ext uri="{FF2B5EF4-FFF2-40B4-BE49-F238E27FC236}">
+                <a16:creationId xmlns:a16="http://schemas.microsoft.com/office/drawing/2014/main" id="{278991C6-B626-48DD-9042-FB1F7ECED3CF}"/>
+              </a:ext>
+            </a:extLst>
+          </p:cNvPr>
+          <p:cNvSpPr>
+            <a:spLocks noGrp="1"/>
+          </p:cNvSpPr>
+          <p:nvPr>
+            <p:ph type="title"/>
+          </p:nvPr>
+        </p:nvSpPr>
+        <p:spPr/>
+        <p:txBody>
+          <a:bodyPr/>
+          <a:lstStyle/>
+          <a:p>
+            <a:r>
+              <a:rPr lang="es-ES" dirty="0"/>
+              <a:t>2.4. Cuarta iteración: conclusiones</a:t>
+            </a:r>
+          </a:p>
+        </p:txBody>
+      </p:sp>
+      <p:sp>
+        <p:nvSpPr>
+          <p:cNvPr id="3" name="Marcador de contenido 2">
+            <a:extLst>
+              <a:ext uri="{FF2B5EF4-FFF2-40B4-BE49-F238E27FC236}">
+                <a16:creationId xmlns:a16="http://schemas.microsoft.com/office/drawing/2014/main" id="{F11EB9E3-5565-4D5C-B2A4-2E390E46425F}"/>
+              </a:ext>
+            </a:extLst>
+          </p:cNvPr>
+          <p:cNvSpPr>
+            <a:spLocks noGrp="1"/>
+          </p:cNvSpPr>
+          <p:nvPr>
+            <p:ph idx="1"/>
+          </p:nvPr>
+        </p:nvSpPr>
+        <p:spPr>
+          <a:xfrm>
+            <a:off x="677334" y="1930400"/>
+            <a:ext cx="8596668" cy="3880773"/>
+          </a:xfrm>
+        </p:spPr>
+        <p:txBody>
+          <a:bodyPr/>
+          <a:lstStyle/>
+          <a:p>
+            <a:r>
+              <a:rPr lang="es-ES" dirty="0"/>
+              <a:t>Es la iteración que mejores resultados ha conseguido:</a:t>
+            </a:r>
+          </a:p>
+          <a:p>
+            <a:endParaRPr lang="es-ES" dirty="0"/>
+          </a:p>
+          <a:p>
+            <a:endParaRPr lang="es-ES" dirty="0"/>
+          </a:p>
+          <a:p>
+            <a:pPr marL="0" indent="0" algn="ctr">
+              <a:buNone/>
+            </a:pPr>
+            <a:r>
+              <a:rPr lang="es-ES" sz="2800" dirty="0"/>
+              <a:t>¡83.5% </a:t>
+            </a:r>
+            <a:r>
+              <a:rPr lang="es-ES" sz="2800" i="1" dirty="0" err="1"/>
+              <a:t>accuracy</a:t>
+            </a:r>
+            <a:r>
+              <a:rPr lang="es-ES" sz="2800" dirty="0"/>
+              <a:t>!...</a:t>
+            </a:r>
+          </a:p>
+          <a:p>
+            <a:pPr marL="0" indent="0" algn="ctr">
+              <a:buNone/>
+            </a:pPr>
+            <a:endParaRPr lang="es-ES" sz="2800" i="1" dirty="0"/>
+          </a:p>
+          <a:p>
+            <a:r>
+              <a:rPr lang="es-ES" dirty="0"/>
+              <a:t>No clasifica bien ningún dato de la clase 1 “Otras enfermedades mentales”</a:t>
+            </a:r>
+          </a:p>
+          <a:p>
+            <a:pPr marL="0" indent="0">
+              <a:buNone/>
+            </a:pPr>
+            <a:endParaRPr lang="es-ES" sz="2800" i="1" dirty="0"/>
+          </a:p>
+        </p:txBody>
+      </p:sp>
+    </p:spTree>
+    <p:extLst>
+      <p:ext uri="{BB962C8B-B14F-4D97-AF65-F5344CB8AC3E}">
+        <p14:creationId xmlns:p14="http://schemas.microsoft.com/office/powerpoint/2010/main" val="1710814961"/>
+      </p:ext>
+    </p:extLst>
+  </p:cSld>
+  <p:clrMapOvr>
+    <a:masterClrMapping/>
+  </p:clrMapOvr>
+</p:sld>
+</file>
+
+<file path=ppt/slides/slide37.xml><?xml version="1.0" encoding="utf-8"?>
+<p:sld xmlns:a="http://schemas.openxmlformats.org/drawingml/2006/main" xmlns:r="http://schemas.openxmlformats.org/officeDocument/2006/relationships" xmlns:p="http://schemas.openxmlformats.org/presentationml/2006/main">
+  <p:cSld>
+    <p:spTree>
+      <p:nvGrpSpPr>
+        <p:cNvPr id="1" name=""/>
+        <p:cNvGrpSpPr/>
+        <p:nvPr/>
+      </p:nvGrpSpPr>
+      <p:grpSpPr>
+        <a:xfrm>
+          <a:off x="0" y="0"/>
+          <a:ext cx="0" cy="0"/>
+          <a:chOff x="0" y="0"/>
+          <a:chExt cx="0" cy="0"/>
+        </a:xfrm>
+      </p:grpSpPr>
+      <p:sp>
+        <p:nvSpPr>
+          <p:cNvPr id="2" name="Título 1">
+            <a:extLst>
+              <a:ext uri="{FF2B5EF4-FFF2-40B4-BE49-F238E27FC236}">
+                <a16:creationId xmlns:a16="http://schemas.microsoft.com/office/drawing/2014/main" id="{8E9E77AC-1263-47E0-B404-50B7E866533C}"/>
+              </a:ext>
+            </a:extLst>
+          </p:cNvPr>
+          <p:cNvSpPr>
+            <a:spLocks noGrp="1"/>
+          </p:cNvSpPr>
+          <p:nvPr>
+            <p:ph type="title"/>
+          </p:nvPr>
+        </p:nvSpPr>
+        <p:spPr/>
+        <p:txBody>
+          <a:bodyPr/>
+          <a:lstStyle/>
+          <a:p>
+            <a:r>
+              <a:rPr lang="es-ES" dirty="0"/>
+              <a:t>3. Conclusiones generales</a:t>
+            </a:r>
+          </a:p>
+        </p:txBody>
+      </p:sp>
+      <p:sp>
+        <p:nvSpPr>
+          <p:cNvPr id="3" name="Marcador de contenido 2">
+            <a:extLst>
+              <a:ext uri="{FF2B5EF4-FFF2-40B4-BE49-F238E27FC236}">
+                <a16:creationId xmlns:a16="http://schemas.microsoft.com/office/drawing/2014/main" id="{0B51FE8A-E64A-4D8F-BB06-5696712B92FE}"/>
+              </a:ext>
+            </a:extLst>
+          </p:cNvPr>
+          <p:cNvSpPr>
+            <a:spLocks noGrp="1"/>
+          </p:cNvSpPr>
+          <p:nvPr>
+            <p:ph idx="1"/>
+          </p:nvPr>
+        </p:nvSpPr>
+        <p:spPr>
+          <a:xfrm>
+            <a:off x="677334" y="1930400"/>
+            <a:ext cx="8596668" cy="3880773"/>
+          </a:xfrm>
+        </p:spPr>
+        <p:txBody>
+          <a:bodyPr/>
+          <a:lstStyle/>
+          <a:p>
+            <a:r>
+              <a:rPr lang="es-ES" dirty="0"/>
+              <a:t>Curiosidad por saber el estado mental de una persona según su ambiente de trabajo</a:t>
+            </a:r>
+          </a:p>
+          <a:p>
+            <a:pPr lvl="1"/>
+            <a:r>
+              <a:rPr lang="es-ES" i="1" dirty="0"/>
+              <a:t>“</a:t>
+            </a:r>
+            <a:r>
+              <a:rPr lang="en-US" i="1" dirty="0"/>
+              <a:t>Do you think that discussing a mental health disorder with your employer would have negative consequences?”</a:t>
+            </a:r>
+            <a:endParaRPr lang="es-ES" i="1" dirty="0"/>
+          </a:p>
+          <a:p>
+            <a:pPr lvl="1"/>
+            <a:r>
+              <a:rPr lang="es-ES" i="1" dirty="0"/>
+              <a:t>“</a:t>
+            </a:r>
+            <a:r>
+              <a:rPr lang="en-US" i="1" dirty="0"/>
+              <a:t>Has your employer ever formally discussed mental health (for example, as part of a wellness campaign or other official communication)?”</a:t>
+            </a:r>
+            <a:endParaRPr lang="es-ES" i="1" dirty="0"/>
+          </a:p>
+          <a:p>
+            <a:pPr lvl="1"/>
+            <a:endParaRPr lang="es-ES" i="1" dirty="0"/>
+          </a:p>
+        </p:txBody>
+      </p:sp>
+    </p:spTree>
+    <p:extLst>
+      <p:ext uri="{BB962C8B-B14F-4D97-AF65-F5344CB8AC3E}">
+        <p14:creationId xmlns:p14="http://schemas.microsoft.com/office/powerpoint/2010/main" val="116903557"/>
+      </p:ext>
+    </p:extLst>
+  </p:cSld>
+  <p:clrMapOvr>
+    <a:masterClrMapping/>
+  </p:clrMapOvr>
+</p:sld>
+</file>
+
+<file path=ppt/slides/slide38.xml><?xml version="1.0" encoding="utf-8"?>
+<p:sld xmlns:a="http://schemas.openxmlformats.org/drawingml/2006/main" xmlns:r="http://schemas.openxmlformats.org/officeDocument/2006/relationships" xmlns:p="http://schemas.openxmlformats.org/presentationml/2006/main">
+  <p:cSld>
+    <p:spTree>
+      <p:nvGrpSpPr>
+        <p:cNvPr id="1" name=""/>
+        <p:cNvGrpSpPr/>
+        <p:nvPr/>
+      </p:nvGrpSpPr>
+      <p:grpSpPr>
+        <a:xfrm>
+          <a:off x="0" y="0"/>
+          <a:ext cx="0" cy="0"/>
+          <a:chOff x="0" y="0"/>
+          <a:chExt cx="0" cy="0"/>
+        </a:xfrm>
+      </p:grpSpPr>
+      <p:sp>
+        <p:nvSpPr>
+          <p:cNvPr id="2" name="Título 1">
+            <a:extLst>
+              <a:ext uri="{FF2B5EF4-FFF2-40B4-BE49-F238E27FC236}">
+                <a16:creationId xmlns:a16="http://schemas.microsoft.com/office/drawing/2014/main" id="{8E9E77AC-1263-47E0-B404-50B7E866533C}"/>
+              </a:ext>
+            </a:extLst>
+          </p:cNvPr>
+          <p:cNvSpPr>
+            <a:spLocks noGrp="1"/>
+          </p:cNvSpPr>
+          <p:nvPr>
+            <p:ph type="title"/>
+          </p:nvPr>
+        </p:nvSpPr>
+        <p:spPr/>
+        <p:txBody>
+          <a:bodyPr/>
+          <a:lstStyle/>
+          <a:p>
+            <a:r>
+              <a:rPr lang="es-ES" dirty="0"/>
+              <a:t>3. Conclusiones generales</a:t>
+            </a:r>
+          </a:p>
+        </p:txBody>
+      </p:sp>
+      <p:sp>
+        <p:nvSpPr>
+          <p:cNvPr id="3" name="Marcador de contenido 2">
+            <a:extLst>
+              <a:ext uri="{FF2B5EF4-FFF2-40B4-BE49-F238E27FC236}">
+                <a16:creationId xmlns:a16="http://schemas.microsoft.com/office/drawing/2014/main" id="{0B51FE8A-E64A-4D8F-BB06-5696712B92FE}"/>
+              </a:ext>
+            </a:extLst>
+          </p:cNvPr>
+          <p:cNvSpPr>
+            <a:spLocks noGrp="1"/>
+          </p:cNvSpPr>
+          <p:nvPr>
+            <p:ph idx="1"/>
+          </p:nvPr>
+        </p:nvSpPr>
+        <p:spPr>
+          <a:xfrm>
+            <a:off x="677334" y="1930400"/>
+            <a:ext cx="8596668" cy="3880773"/>
+          </a:xfrm>
+        </p:spPr>
+        <p:txBody>
+          <a:bodyPr/>
+          <a:lstStyle/>
+          <a:p>
+            <a:r>
+              <a:rPr lang="es-ES" dirty="0"/>
+              <a:t>Curiosidad por saber el estado mental de una persona según su ambiente de trabajo</a:t>
+            </a:r>
+            <a:endParaRPr lang="es-ES" i="1" dirty="0"/>
+          </a:p>
+          <a:p>
+            <a:pPr lvl="1"/>
+            <a:r>
+              <a:rPr lang="es-ES" i="1" dirty="0"/>
+              <a:t>“</a:t>
+            </a:r>
+            <a:r>
+              <a:rPr lang="en-US" i="1" dirty="0"/>
+              <a:t>Do you think that discussing a mental health disorder with your employer would have negative consequences?”</a:t>
+            </a:r>
+            <a:endParaRPr lang="es-ES" i="1" dirty="0"/>
+          </a:p>
+          <a:p>
+            <a:pPr lvl="1"/>
+            <a:r>
+              <a:rPr lang="es-ES" i="1" dirty="0"/>
+              <a:t>“</a:t>
+            </a:r>
+            <a:r>
+              <a:rPr lang="en-US" i="1" dirty="0"/>
+              <a:t>Has your employer ever formally discussed mental health (for example, as part of a wellness campaign or other official communication)?”</a:t>
+            </a:r>
+            <a:endParaRPr lang="es-ES" i="1" dirty="0"/>
+          </a:p>
+          <a:p>
+            <a:pPr lvl="1"/>
+            <a:endParaRPr lang="es-ES" i="1" dirty="0"/>
+          </a:p>
+          <a:p>
+            <a:r>
+              <a:rPr lang="es-ES" dirty="0"/>
+              <a:t>Preguntas más importantes que esas</a:t>
+            </a:r>
+          </a:p>
+          <a:p>
+            <a:pPr lvl="1"/>
+            <a:r>
+              <a:rPr lang="es-ES" dirty="0"/>
+              <a:t>“</a:t>
+            </a:r>
+            <a:r>
+              <a:rPr lang="en-US" i="1" dirty="0"/>
+              <a:t>If you have a mental health issue do you feel that it interferes with your work when NOT being treated effectively?”</a:t>
+            </a:r>
+            <a:endParaRPr lang="es-ES" dirty="0"/>
+          </a:p>
+          <a:p>
+            <a:pPr marL="457200" lvl="1" indent="0">
+              <a:buNone/>
+            </a:pPr>
+            <a:endParaRPr lang="es-ES" dirty="0"/>
+          </a:p>
+          <a:p>
+            <a:pPr lvl="1"/>
+            <a:endParaRPr lang="es-ES" i="1" dirty="0"/>
+          </a:p>
+          <a:p>
+            <a:pPr lvl="1"/>
+            <a:endParaRPr lang="es-ES" i="1" dirty="0"/>
+          </a:p>
+        </p:txBody>
+      </p:sp>
+    </p:spTree>
+    <p:extLst>
+      <p:ext uri="{BB962C8B-B14F-4D97-AF65-F5344CB8AC3E}">
+        <p14:creationId xmlns:p14="http://schemas.microsoft.com/office/powerpoint/2010/main" val="2710937869"/>
+      </p:ext>
+    </p:extLst>
+  </p:cSld>
+  <p:clrMapOvr>
+    <a:masterClrMapping/>
+  </p:clrMapOvr>
+</p:sld>
+</file>
+
+<file path=ppt/slides/slide39.xml><?xml version="1.0" encoding="utf-8"?>
+<p:sld xmlns:a="http://schemas.openxmlformats.org/drawingml/2006/main" xmlns:r="http://schemas.openxmlformats.org/officeDocument/2006/relationships" xmlns:p="http://schemas.openxmlformats.org/presentationml/2006/main">
+  <p:cSld>
+    <p:spTree>
+      <p:nvGrpSpPr>
+        <p:cNvPr id="1" name=""/>
+        <p:cNvGrpSpPr/>
+        <p:nvPr/>
+      </p:nvGrpSpPr>
+      <p:grpSpPr>
+        <a:xfrm>
+          <a:off x="0" y="0"/>
+          <a:ext cx="0" cy="0"/>
+          <a:chOff x="0" y="0"/>
+          <a:chExt cx="0" cy="0"/>
+        </a:xfrm>
+      </p:grpSpPr>
+      <p:sp>
+        <p:nvSpPr>
+          <p:cNvPr id="2" name="Título 1">
+            <a:extLst>
+              <a:ext uri="{FF2B5EF4-FFF2-40B4-BE49-F238E27FC236}">
+                <a16:creationId xmlns:a16="http://schemas.microsoft.com/office/drawing/2014/main" id="{8E9E77AC-1263-47E0-B404-50B7E866533C}"/>
+              </a:ext>
+            </a:extLst>
+          </p:cNvPr>
+          <p:cNvSpPr>
+            <a:spLocks noGrp="1"/>
+          </p:cNvSpPr>
+          <p:nvPr>
+            <p:ph type="title"/>
+          </p:nvPr>
+        </p:nvSpPr>
+        <p:spPr/>
+        <p:txBody>
+          <a:bodyPr/>
+          <a:lstStyle/>
+          <a:p>
+            <a:r>
+              <a:rPr lang="es-ES" dirty="0"/>
+              <a:t>3. Conclusiones generales</a:t>
+            </a:r>
+          </a:p>
+        </p:txBody>
+      </p:sp>
+      <p:sp>
+        <p:nvSpPr>
+          <p:cNvPr id="3" name="Marcador de contenido 2">
+            <a:extLst>
+              <a:ext uri="{FF2B5EF4-FFF2-40B4-BE49-F238E27FC236}">
+                <a16:creationId xmlns:a16="http://schemas.microsoft.com/office/drawing/2014/main" id="{0B51FE8A-E64A-4D8F-BB06-5696712B92FE}"/>
+              </a:ext>
+            </a:extLst>
+          </p:cNvPr>
+          <p:cNvSpPr>
+            <a:spLocks noGrp="1"/>
+          </p:cNvSpPr>
+          <p:nvPr>
+            <p:ph idx="1"/>
+          </p:nvPr>
+        </p:nvSpPr>
+        <p:spPr>
+          <a:xfrm>
+            <a:off x="677334" y="1930400"/>
+            <a:ext cx="8596668" cy="4620712"/>
+          </a:xfrm>
+        </p:spPr>
+        <p:txBody>
+          <a:bodyPr>
+            <a:normAutofit/>
+          </a:bodyPr>
+          <a:lstStyle/>
+          <a:p>
+            <a:r>
+              <a:rPr lang="es-ES" dirty="0"/>
+              <a:t>Curiosidad por saber el estado mental de una persona según su ambiente de trabajo</a:t>
+            </a:r>
+            <a:endParaRPr lang="es-ES" i="1" dirty="0"/>
+          </a:p>
+          <a:p>
+            <a:pPr lvl="1"/>
+            <a:r>
+              <a:rPr lang="es-ES" i="1" dirty="0"/>
+              <a:t>“</a:t>
+            </a:r>
+            <a:r>
+              <a:rPr lang="en-US" i="1" dirty="0"/>
+              <a:t>Do you think that discussing a mental health disorder with your employer would have negative consequences?”</a:t>
+            </a:r>
+            <a:endParaRPr lang="es-ES" i="1" dirty="0"/>
+          </a:p>
+          <a:p>
+            <a:pPr lvl="1"/>
+            <a:r>
+              <a:rPr lang="es-ES" i="1" dirty="0"/>
+              <a:t>“</a:t>
+            </a:r>
+            <a:r>
+              <a:rPr lang="en-US" i="1" dirty="0"/>
+              <a:t>Has your employer ever formally discussed mental health (for example, as part of a wellness campaign or other official communication)?”</a:t>
+            </a:r>
+            <a:endParaRPr lang="es-ES" i="1" dirty="0"/>
+          </a:p>
+          <a:p>
+            <a:pPr lvl="1"/>
+            <a:endParaRPr lang="es-ES" i="1" dirty="0"/>
+          </a:p>
+          <a:p>
+            <a:r>
+              <a:rPr lang="es-ES" dirty="0"/>
+              <a:t>Preguntas más importantes que esas</a:t>
+            </a:r>
+          </a:p>
+          <a:p>
+            <a:pPr lvl="1"/>
+            <a:r>
+              <a:rPr lang="en-US" i="1" dirty="0"/>
+              <a:t>“If you have a mental health issue do you feel that it interferes with your work when NOT being treated effectively?”</a:t>
+            </a:r>
+            <a:endParaRPr lang="es-ES" dirty="0"/>
+          </a:p>
+          <a:p>
+            <a:pPr lvl="1"/>
+            <a:endParaRPr lang="es-ES" i="1" dirty="0"/>
+          </a:p>
+          <a:p>
+            <a:pPr marL="457200" lvl="1" indent="0" algn="ctr">
+              <a:buNone/>
+            </a:pPr>
+            <a:r>
+              <a:rPr lang="es-ES" sz="2800" i="1" dirty="0"/>
+              <a:t>Experiencia</a:t>
+            </a:r>
+            <a:endParaRPr lang="es-ES" sz="2800" dirty="0"/>
+          </a:p>
+          <a:p>
+            <a:pPr marL="457200" lvl="1" indent="0">
+              <a:buNone/>
+            </a:pPr>
+            <a:endParaRPr lang="es-ES" i="1" dirty="0"/>
+          </a:p>
+          <a:p>
+            <a:pPr lvl="1"/>
+            <a:endParaRPr lang="es-ES" i="1" dirty="0"/>
+          </a:p>
+        </p:txBody>
+      </p:sp>
+    </p:spTree>
+    <p:extLst>
+      <p:ext uri="{BB962C8B-B14F-4D97-AF65-F5344CB8AC3E}">
+        <p14:creationId xmlns:p14="http://schemas.microsoft.com/office/powerpoint/2010/main" val="1525357811"/>
+      </p:ext>
+    </p:extLst>
+  </p:cSld>
+  <p:clrMapOvr>
+    <a:masterClrMapping/>
+  </p:clrMapOvr>
+</p:sld>
+</file>
+
 <file path=ppt/slides/slide4.xml><?xml version="1.0" encoding="utf-8"?>
 <p:sld xmlns:a="http://schemas.openxmlformats.org/drawingml/2006/main" xmlns:r="http://schemas.openxmlformats.org/officeDocument/2006/relationships" xmlns:p="http://schemas.openxmlformats.org/presentationml/2006/main">
   <p:cSld>
@@ -8572,7 +11303,7 @@
           <a:p>
             <a:r>
               <a:rPr lang="es-ES" dirty="0"/>
-              <a:t>1. Introducción: proceso KDD</a:t>
+              <a:t>2. Proceso KDD</a:t>
             </a:r>
           </a:p>
         </p:txBody>
@@ -8693,6 +11424,905 @@
 </p:sld>
 </file>
 
+<file path=ppt/slides/slide40.xml><?xml version="1.0" encoding="utf-8"?>
+<p:sld xmlns:a="http://schemas.openxmlformats.org/drawingml/2006/main" xmlns:r="http://schemas.openxmlformats.org/officeDocument/2006/relationships" xmlns:p="http://schemas.openxmlformats.org/presentationml/2006/main">
+  <p:cSld>
+    <p:spTree>
+      <p:nvGrpSpPr>
+        <p:cNvPr id="1" name=""/>
+        <p:cNvGrpSpPr/>
+        <p:nvPr/>
+      </p:nvGrpSpPr>
+      <p:grpSpPr>
+        <a:xfrm>
+          <a:off x="0" y="0"/>
+          <a:ext cx="0" cy="0"/>
+          <a:chOff x="0" y="0"/>
+          <a:chExt cx="0" cy="0"/>
+        </a:xfrm>
+      </p:grpSpPr>
+      <p:sp>
+        <p:nvSpPr>
+          <p:cNvPr id="2" name="Título 1">
+            <a:extLst>
+              <a:ext uri="{FF2B5EF4-FFF2-40B4-BE49-F238E27FC236}">
+                <a16:creationId xmlns:a16="http://schemas.microsoft.com/office/drawing/2014/main" id="{8E9E77AC-1263-47E0-B404-50B7E866533C}"/>
+              </a:ext>
+            </a:extLst>
+          </p:cNvPr>
+          <p:cNvSpPr>
+            <a:spLocks noGrp="1"/>
+          </p:cNvSpPr>
+          <p:nvPr>
+            <p:ph type="title"/>
+          </p:nvPr>
+        </p:nvSpPr>
+        <p:spPr/>
+        <p:txBody>
+          <a:bodyPr/>
+          <a:lstStyle/>
+          <a:p>
+            <a:r>
+              <a:rPr lang="es-ES" dirty="0"/>
+              <a:t>3. Conclusiones generales</a:t>
+            </a:r>
+          </a:p>
+        </p:txBody>
+      </p:sp>
+      <p:sp>
+        <p:nvSpPr>
+          <p:cNvPr id="3" name="Marcador de contenido 2">
+            <a:extLst>
+              <a:ext uri="{FF2B5EF4-FFF2-40B4-BE49-F238E27FC236}">
+                <a16:creationId xmlns:a16="http://schemas.microsoft.com/office/drawing/2014/main" id="{0B51FE8A-E64A-4D8F-BB06-5696712B92FE}"/>
+              </a:ext>
+            </a:extLst>
+          </p:cNvPr>
+          <p:cNvSpPr>
+            <a:spLocks noGrp="1"/>
+          </p:cNvSpPr>
+          <p:nvPr>
+            <p:ph idx="1"/>
+          </p:nvPr>
+        </p:nvSpPr>
+        <p:spPr>
+          <a:xfrm>
+            <a:off x="677334" y="1930400"/>
+            <a:ext cx="8596668" cy="3880773"/>
+          </a:xfrm>
+        </p:spPr>
+        <p:txBody>
+          <a:bodyPr/>
+          <a:lstStyle/>
+          <a:p>
+            <a:r>
+              <a:rPr lang="es-ES" dirty="0"/>
+              <a:t>Dos acercamientos al problema</a:t>
+            </a:r>
+          </a:p>
+          <a:p>
+            <a:pPr lvl="1"/>
+            <a:r>
+              <a:rPr lang="en-US" dirty="0" err="1"/>
+              <a:t>Clasificar</a:t>
+            </a:r>
+            <a:r>
+              <a:rPr lang="en-US" dirty="0"/>
+              <a:t> por “</a:t>
+            </a:r>
+            <a:r>
+              <a:rPr lang="en-US" i="1" dirty="0"/>
+              <a:t>Do you currently have a mental disorder?”</a:t>
+            </a:r>
+            <a:endParaRPr lang="es-ES" dirty="0"/>
+          </a:p>
+          <a:p>
+            <a:pPr lvl="1"/>
+            <a:r>
+              <a:rPr lang="en-US" dirty="0" err="1"/>
+              <a:t>Clasificar</a:t>
+            </a:r>
+            <a:r>
+              <a:rPr lang="en-US" dirty="0"/>
+              <a:t> </a:t>
+            </a:r>
+            <a:r>
+              <a:rPr lang="en-US" dirty="0" err="1"/>
+              <a:t>juntando</a:t>
+            </a:r>
+            <a:r>
+              <a:rPr lang="en-US" dirty="0"/>
+              <a:t> las dos </a:t>
+            </a:r>
+            <a:r>
+              <a:rPr lang="en-US" dirty="0" err="1"/>
+              <a:t>columnas</a:t>
+            </a:r>
+            <a:r>
+              <a:rPr lang="en-US" dirty="0"/>
+              <a:t> “</a:t>
+            </a:r>
+            <a:r>
+              <a:rPr lang="en-US" i="1" dirty="0"/>
+              <a:t>If yes, what condition(s) have you been diagnosed with?” </a:t>
+            </a:r>
+            <a:r>
+              <a:rPr lang="en-US" dirty="0"/>
+              <a:t>y </a:t>
+            </a:r>
+            <a:r>
+              <a:rPr lang="en-US" i="1" dirty="0"/>
+              <a:t>“If maybe, what condition(s) have you been diagnosed with?”</a:t>
+            </a:r>
+            <a:endParaRPr lang="es-ES" dirty="0"/>
+          </a:p>
+          <a:p>
+            <a:pPr lvl="1"/>
+            <a:endParaRPr lang="es-ES" dirty="0"/>
+          </a:p>
+          <a:p>
+            <a:pPr marL="457200" lvl="1" indent="0">
+              <a:buNone/>
+            </a:pPr>
+            <a:endParaRPr lang="es-ES" i="1" dirty="0"/>
+          </a:p>
+          <a:p>
+            <a:pPr lvl="1"/>
+            <a:endParaRPr lang="es-ES" i="1" dirty="0"/>
+          </a:p>
+        </p:txBody>
+      </p:sp>
+    </p:spTree>
+    <p:extLst>
+      <p:ext uri="{BB962C8B-B14F-4D97-AF65-F5344CB8AC3E}">
+        <p14:creationId xmlns:p14="http://schemas.microsoft.com/office/powerpoint/2010/main" val="1660074570"/>
+      </p:ext>
+    </p:extLst>
+  </p:cSld>
+  <p:clrMapOvr>
+    <a:masterClrMapping/>
+  </p:clrMapOvr>
+</p:sld>
+</file>
+
+<file path=ppt/slides/slide41.xml><?xml version="1.0" encoding="utf-8"?>
+<p:sld xmlns:a="http://schemas.openxmlformats.org/drawingml/2006/main" xmlns:r="http://schemas.openxmlformats.org/officeDocument/2006/relationships" xmlns:p="http://schemas.openxmlformats.org/presentationml/2006/main">
+  <p:cSld>
+    <p:spTree>
+      <p:nvGrpSpPr>
+        <p:cNvPr id="1" name=""/>
+        <p:cNvGrpSpPr/>
+        <p:nvPr/>
+      </p:nvGrpSpPr>
+      <p:grpSpPr>
+        <a:xfrm>
+          <a:off x="0" y="0"/>
+          <a:ext cx="0" cy="0"/>
+          <a:chOff x="0" y="0"/>
+          <a:chExt cx="0" cy="0"/>
+        </a:xfrm>
+      </p:grpSpPr>
+      <p:sp>
+        <p:nvSpPr>
+          <p:cNvPr id="2" name="Título 1">
+            <a:extLst>
+              <a:ext uri="{FF2B5EF4-FFF2-40B4-BE49-F238E27FC236}">
+                <a16:creationId xmlns:a16="http://schemas.microsoft.com/office/drawing/2014/main" id="{8E9E77AC-1263-47E0-B404-50B7E866533C}"/>
+              </a:ext>
+            </a:extLst>
+          </p:cNvPr>
+          <p:cNvSpPr>
+            <a:spLocks noGrp="1"/>
+          </p:cNvSpPr>
+          <p:nvPr>
+            <p:ph type="title"/>
+          </p:nvPr>
+        </p:nvSpPr>
+        <p:spPr/>
+        <p:txBody>
+          <a:bodyPr/>
+          <a:lstStyle/>
+          <a:p>
+            <a:r>
+              <a:rPr lang="es-ES" dirty="0"/>
+              <a:t>3. Conclusiones generales</a:t>
+            </a:r>
+          </a:p>
+        </p:txBody>
+      </p:sp>
+      <p:sp>
+        <p:nvSpPr>
+          <p:cNvPr id="3" name="Marcador de contenido 2">
+            <a:extLst>
+              <a:ext uri="{FF2B5EF4-FFF2-40B4-BE49-F238E27FC236}">
+                <a16:creationId xmlns:a16="http://schemas.microsoft.com/office/drawing/2014/main" id="{0B51FE8A-E64A-4D8F-BB06-5696712B92FE}"/>
+              </a:ext>
+            </a:extLst>
+          </p:cNvPr>
+          <p:cNvSpPr>
+            <a:spLocks noGrp="1"/>
+          </p:cNvSpPr>
+          <p:nvPr>
+            <p:ph idx="1"/>
+          </p:nvPr>
+        </p:nvSpPr>
+        <p:spPr>
+          <a:xfrm>
+            <a:off x="677334" y="1930400"/>
+            <a:ext cx="8596668" cy="3880773"/>
+          </a:xfrm>
+        </p:spPr>
+        <p:txBody>
+          <a:bodyPr/>
+          <a:lstStyle/>
+          <a:p>
+            <a:r>
+              <a:rPr lang="es-ES" dirty="0"/>
+              <a:t>Dos acercamientos al problema</a:t>
+            </a:r>
+          </a:p>
+          <a:p>
+            <a:pPr lvl="1"/>
+            <a:r>
+              <a:rPr lang="en-US" dirty="0" err="1"/>
+              <a:t>Clasificar</a:t>
+            </a:r>
+            <a:r>
+              <a:rPr lang="en-US" dirty="0"/>
+              <a:t> por “</a:t>
+            </a:r>
+            <a:r>
+              <a:rPr lang="en-US" i="1" dirty="0"/>
+              <a:t>Do you currently have a mental disorder?”</a:t>
+            </a:r>
+            <a:endParaRPr lang="es-ES" dirty="0"/>
+          </a:p>
+          <a:p>
+            <a:pPr lvl="1"/>
+            <a:r>
+              <a:rPr lang="en-US" dirty="0" err="1"/>
+              <a:t>Clasificar</a:t>
+            </a:r>
+            <a:r>
+              <a:rPr lang="en-US" dirty="0"/>
+              <a:t> </a:t>
+            </a:r>
+            <a:r>
+              <a:rPr lang="en-US" dirty="0" err="1"/>
+              <a:t>juntando</a:t>
+            </a:r>
+            <a:r>
+              <a:rPr lang="en-US" dirty="0"/>
+              <a:t> las dos </a:t>
+            </a:r>
+            <a:r>
+              <a:rPr lang="en-US" dirty="0" err="1"/>
+              <a:t>columnas</a:t>
+            </a:r>
+            <a:r>
+              <a:rPr lang="en-US" dirty="0"/>
+              <a:t> “</a:t>
+            </a:r>
+            <a:r>
+              <a:rPr lang="en-US" i="1" dirty="0"/>
+              <a:t>If yes, what condition(s) have you been diagnosed with?” </a:t>
+            </a:r>
+            <a:r>
+              <a:rPr lang="en-US" dirty="0"/>
+              <a:t>y </a:t>
+            </a:r>
+            <a:r>
+              <a:rPr lang="en-US" i="1" dirty="0"/>
+              <a:t>“If maybe, what condition(s) have you been diagnosed with?”</a:t>
+            </a:r>
+          </a:p>
+          <a:p>
+            <a:pPr lvl="1"/>
+            <a:endParaRPr lang="en-US" i="1" dirty="0"/>
+          </a:p>
+          <a:p>
+            <a:r>
+              <a:rPr lang="es-ES" dirty="0"/>
+              <a:t>El primero…</a:t>
+            </a:r>
+          </a:p>
+          <a:p>
+            <a:pPr lvl="1"/>
+            <a:r>
+              <a:rPr lang="es-ES" dirty="0"/>
+              <a:t>Fue la principal idea del proyecto</a:t>
+            </a:r>
+          </a:p>
+          <a:p>
+            <a:pPr lvl="1"/>
+            <a:r>
+              <a:rPr lang="es-ES" dirty="0"/>
+              <a:t>Dio una </a:t>
+            </a:r>
+            <a:r>
+              <a:rPr lang="es-ES" i="1" dirty="0" err="1"/>
+              <a:t>accuracy</a:t>
+            </a:r>
+            <a:r>
+              <a:rPr lang="es-ES" dirty="0"/>
+              <a:t> final de 77.4%</a:t>
+            </a:r>
+          </a:p>
+          <a:p>
+            <a:pPr lvl="1"/>
+            <a:endParaRPr lang="es-ES" dirty="0"/>
+          </a:p>
+          <a:p>
+            <a:pPr marL="457200" lvl="1" indent="0">
+              <a:buNone/>
+            </a:pPr>
+            <a:endParaRPr lang="es-ES" i="1" dirty="0"/>
+          </a:p>
+          <a:p>
+            <a:pPr lvl="1"/>
+            <a:endParaRPr lang="es-ES" i="1" dirty="0"/>
+          </a:p>
+        </p:txBody>
+      </p:sp>
+      <p:pic>
+        <p:nvPicPr>
+          <p:cNvPr id="4" name="Imagen 3">
+            <a:extLst>
+              <a:ext uri="{FF2B5EF4-FFF2-40B4-BE49-F238E27FC236}">
+                <a16:creationId xmlns:a16="http://schemas.microsoft.com/office/drawing/2014/main" id="{0C724683-5DE0-498A-9149-8E57A89ABF13}"/>
+              </a:ext>
+            </a:extLst>
+          </p:cNvPr>
+          <p:cNvPicPr/>
+          <p:nvPr/>
+        </p:nvPicPr>
+        <p:blipFill>
+          <a:blip r:embed="rId2"/>
+          <a:stretch>
+            <a:fillRect/>
+          </a:stretch>
+        </p:blipFill>
+        <p:spPr>
+          <a:xfrm>
+            <a:off x="4827870" y="4446739"/>
+            <a:ext cx="6686796" cy="1889781"/>
+          </a:xfrm>
+          <a:prstGeom prst="rect">
+            <a:avLst/>
+          </a:prstGeom>
+        </p:spPr>
+      </p:pic>
+    </p:spTree>
+    <p:extLst>
+      <p:ext uri="{BB962C8B-B14F-4D97-AF65-F5344CB8AC3E}">
+        <p14:creationId xmlns:p14="http://schemas.microsoft.com/office/powerpoint/2010/main" val="2627573844"/>
+      </p:ext>
+    </p:extLst>
+  </p:cSld>
+  <p:clrMapOvr>
+    <a:masterClrMapping/>
+  </p:clrMapOvr>
+</p:sld>
+</file>
+
+<file path=ppt/slides/slide42.xml><?xml version="1.0" encoding="utf-8"?>
+<p:sld xmlns:a="http://schemas.openxmlformats.org/drawingml/2006/main" xmlns:r="http://schemas.openxmlformats.org/officeDocument/2006/relationships" xmlns:p="http://schemas.openxmlformats.org/presentationml/2006/main">
+  <p:cSld>
+    <p:spTree>
+      <p:nvGrpSpPr>
+        <p:cNvPr id="1" name=""/>
+        <p:cNvGrpSpPr/>
+        <p:nvPr/>
+      </p:nvGrpSpPr>
+      <p:grpSpPr>
+        <a:xfrm>
+          <a:off x="0" y="0"/>
+          <a:ext cx="0" cy="0"/>
+          <a:chOff x="0" y="0"/>
+          <a:chExt cx="0" cy="0"/>
+        </a:xfrm>
+      </p:grpSpPr>
+      <p:sp>
+        <p:nvSpPr>
+          <p:cNvPr id="2" name="Título 1">
+            <a:extLst>
+              <a:ext uri="{FF2B5EF4-FFF2-40B4-BE49-F238E27FC236}">
+                <a16:creationId xmlns:a16="http://schemas.microsoft.com/office/drawing/2014/main" id="{8E9E77AC-1263-47E0-B404-50B7E866533C}"/>
+              </a:ext>
+            </a:extLst>
+          </p:cNvPr>
+          <p:cNvSpPr>
+            <a:spLocks noGrp="1"/>
+          </p:cNvSpPr>
+          <p:nvPr>
+            <p:ph type="title"/>
+          </p:nvPr>
+        </p:nvSpPr>
+        <p:spPr/>
+        <p:txBody>
+          <a:bodyPr/>
+          <a:lstStyle/>
+          <a:p>
+            <a:r>
+              <a:rPr lang="es-ES" dirty="0"/>
+              <a:t>3. Conclusiones generales</a:t>
+            </a:r>
+          </a:p>
+        </p:txBody>
+      </p:sp>
+      <p:sp>
+        <p:nvSpPr>
+          <p:cNvPr id="3" name="Marcador de contenido 2">
+            <a:extLst>
+              <a:ext uri="{FF2B5EF4-FFF2-40B4-BE49-F238E27FC236}">
+                <a16:creationId xmlns:a16="http://schemas.microsoft.com/office/drawing/2014/main" id="{0B51FE8A-E64A-4D8F-BB06-5696712B92FE}"/>
+              </a:ext>
+            </a:extLst>
+          </p:cNvPr>
+          <p:cNvSpPr>
+            <a:spLocks noGrp="1"/>
+          </p:cNvSpPr>
+          <p:nvPr>
+            <p:ph idx="1"/>
+          </p:nvPr>
+        </p:nvSpPr>
+        <p:spPr>
+          <a:xfrm>
+            <a:off x="677334" y="1930400"/>
+            <a:ext cx="8596668" cy="3880773"/>
+          </a:xfrm>
+        </p:spPr>
+        <p:txBody>
+          <a:bodyPr/>
+          <a:lstStyle/>
+          <a:p>
+            <a:r>
+              <a:rPr lang="es-ES" dirty="0"/>
+              <a:t>El segundo…</a:t>
+            </a:r>
+          </a:p>
+          <a:p>
+            <a:pPr lvl="1"/>
+            <a:r>
+              <a:rPr lang="es-ES" dirty="0"/>
+              <a:t>Resultado de querer mejorar los resultados del primero</a:t>
+            </a:r>
+          </a:p>
+          <a:p>
+            <a:pPr lvl="1"/>
+            <a:r>
+              <a:rPr lang="es-ES" dirty="0"/>
+              <a:t>Dio una </a:t>
+            </a:r>
+            <a:r>
+              <a:rPr lang="es-ES" i="1" dirty="0" err="1"/>
+              <a:t>accuracy</a:t>
+            </a:r>
+            <a:r>
+              <a:rPr lang="es-ES" dirty="0"/>
+              <a:t> final de 82.6%</a:t>
+            </a:r>
+          </a:p>
+          <a:p>
+            <a:pPr lvl="1"/>
+            <a:endParaRPr lang="es-ES" dirty="0"/>
+          </a:p>
+          <a:p>
+            <a:pPr marL="457200" lvl="1" indent="0">
+              <a:buNone/>
+            </a:pPr>
+            <a:endParaRPr lang="es-ES" i="1" dirty="0"/>
+          </a:p>
+          <a:p>
+            <a:pPr lvl="1"/>
+            <a:endParaRPr lang="es-ES" i="1" dirty="0"/>
+          </a:p>
+        </p:txBody>
+      </p:sp>
+      <p:pic>
+        <p:nvPicPr>
+          <p:cNvPr id="6" name="Imagen 5">
+            <a:extLst>
+              <a:ext uri="{FF2B5EF4-FFF2-40B4-BE49-F238E27FC236}">
+                <a16:creationId xmlns:a16="http://schemas.microsoft.com/office/drawing/2014/main" id="{51EFAD8F-D3C5-430F-9939-B75BEB094E4F}"/>
+              </a:ext>
+            </a:extLst>
+          </p:cNvPr>
+          <p:cNvPicPr>
+            <a:picLocks noChangeAspect="1"/>
+          </p:cNvPicPr>
+          <p:nvPr/>
+        </p:nvPicPr>
+        <p:blipFill>
+          <a:blip r:embed="rId2"/>
+          <a:stretch>
+            <a:fillRect/>
+          </a:stretch>
+        </p:blipFill>
+        <p:spPr>
+          <a:xfrm>
+            <a:off x="4886781" y="2791616"/>
+            <a:ext cx="6953874" cy="1865977"/>
+          </a:xfrm>
+          <a:prstGeom prst="rect">
+            <a:avLst/>
+          </a:prstGeom>
+        </p:spPr>
+      </p:pic>
+      <p:pic>
+        <p:nvPicPr>
+          <p:cNvPr id="7" name="Imagen 6">
+            <a:extLst>
+              <a:ext uri="{FF2B5EF4-FFF2-40B4-BE49-F238E27FC236}">
+                <a16:creationId xmlns:a16="http://schemas.microsoft.com/office/drawing/2014/main" id="{4E3E5C92-14C2-454D-9ECC-589C03777142}"/>
+              </a:ext>
+            </a:extLst>
+          </p:cNvPr>
+          <p:cNvPicPr/>
+          <p:nvPr/>
+        </p:nvPicPr>
+        <p:blipFill>
+          <a:blip r:embed="rId3" cstate="print">
+            <a:extLst>
+              <a:ext uri="{28A0092B-C50C-407E-A947-70E740481C1C}">
+                <a14:useLocalDpi xmlns:a14="http://schemas.microsoft.com/office/drawing/2010/main" val="0"/>
+              </a:ext>
+            </a:extLst>
+          </a:blip>
+          <a:srcRect/>
+          <a:stretch>
+            <a:fillRect/>
+          </a:stretch>
+        </p:blipFill>
+        <p:spPr bwMode="auto">
+          <a:xfrm>
+            <a:off x="1066962" y="3506166"/>
+            <a:ext cx="4019934" cy="2732709"/>
+          </a:xfrm>
+          <a:prstGeom prst="rect">
+            <a:avLst/>
+          </a:prstGeom>
+          <a:noFill/>
+          <a:ln>
+            <a:noFill/>
+          </a:ln>
+        </p:spPr>
+      </p:pic>
+      <p:pic>
+        <p:nvPicPr>
+          <p:cNvPr id="8" name="Imagen 7">
+            <a:extLst>
+              <a:ext uri="{FF2B5EF4-FFF2-40B4-BE49-F238E27FC236}">
+                <a16:creationId xmlns:a16="http://schemas.microsoft.com/office/drawing/2014/main" id="{7D71ED0B-4267-4600-BE9E-3379464E5A17}"/>
+              </a:ext>
+            </a:extLst>
+          </p:cNvPr>
+          <p:cNvPicPr/>
+          <p:nvPr/>
+        </p:nvPicPr>
+        <p:blipFill>
+          <a:blip r:embed="rId4" cstate="print">
+            <a:extLst>
+              <a:ext uri="{28A0092B-C50C-407E-A947-70E740481C1C}">
+                <a14:useLocalDpi xmlns:a14="http://schemas.microsoft.com/office/drawing/2010/main" val="0"/>
+              </a:ext>
+            </a:extLst>
+          </a:blip>
+          <a:srcRect/>
+          <a:stretch>
+            <a:fillRect/>
+          </a:stretch>
+        </p:blipFill>
+        <p:spPr bwMode="auto">
+          <a:xfrm>
+            <a:off x="5220072" y="3467582"/>
+            <a:ext cx="4098322" cy="2809875"/>
+          </a:xfrm>
+          <a:prstGeom prst="rect">
+            <a:avLst/>
+          </a:prstGeom>
+          <a:noFill/>
+          <a:ln>
+            <a:noFill/>
+          </a:ln>
+        </p:spPr>
+      </p:pic>
+    </p:spTree>
+    <p:extLst>
+      <p:ext uri="{BB962C8B-B14F-4D97-AF65-F5344CB8AC3E}">
+        <p14:creationId xmlns:p14="http://schemas.microsoft.com/office/powerpoint/2010/main" val="2782852812"/>
+      </p:ext>
+    </p:extLst>
+  </p:cSld>
+  <p:clrMapOvr>
+    <a:masterClrMapping/>
+  </p:clrMapOvr>
+</p:sld>
+</file>
+
+<file path=ppt/slides/slide43.xml><?xml version="1.0" encoding="utf-8"?>
+<p:sld xmlns:a="http://schemas.openxmlformats.org/drawingml/2006/main" xmlns:r="http://schemas.openxmlformats.org/officeDocument/2006/relationships" xmlns:p="http://schemas.openxmlformats.org/presentationml/2006/main">
+  <p:cSld>
+    <p:spTree>
+      <p:nvGrpSpPr>
+        <p:cNvPr id="1" name=""/>
+        <p:cNvGrpSpPr/>
+        <p:nvPr/>
+      </p:nvGrpSpPr>
+      <p:grpSpPr>
+        <a:xfrm>
+          <a:off x="0" y="0"/>
+          <a:ext cx="0" cy="0"/>
+          <a:chOff x="0" y="0"/>
+          <a:chExt cx="0" cy="0"/>
+        </a:xfrm>
+      </p:grpSpPr>
+      <p:sp>
+        <p:nvSpPr>
+          <p:cNvPr id="2" name="Título 1">
+            <a:extLst>
+              <a:ext uri="{FF2B5EF4-FFF2-40B4-BE49-F238E27FC236}">
+                <a16:creationId xmlns:a16="http://schemas.microsoft.com/office/drawing/2014/main" id="{8E9E77AC-1263-47E0-B404-50B7E866533C}"/>
+              </a:ext>
+            </a:extLst>
+          </p:cNvPr>
+          <p:cNvSpPr>
+            <a:spLocks noGrp="1"/>
+          </p:cNvSpPr>
+          <p:nvPr>
+            <p:ph type="title"/>
+          </p:nvPr>
+        </p:nvSpPr>
+        <p:spPr/>
+        <p:txBody>
+          <a:bodyPr/>
+          <a:lstStyle/>
+          <a:p>
+            <a:r>
+              <a:rPr lang="es-ES" dirty="0"/>
+              <a:t>3. Conclusiones generales</a:t>
+            </a:r>
+          </a:p>
+        </p:txBody>
+      </p:sp>
+      <p:sp>
+        <p:nvSpPr>
+          <p:cNvPr id="3" name="Marcador de contenido 2">
+            <a:extLst>
+              <a:ext uri="{FF2B5EF4-FFF2-40B4-BE49-F238E27FC236}">
+                <a16:creationId xmlns:a16="http://schemas.microsoft.com/office/drawing/2014/main" id="{0B51FE8A-E64A-4D8F-BB06-5696712B92FE}"/>
+              </a:ext>
+            </a:extLst>
+          </p:cNvPr>
+          <p:cNvSpPr>
+            <a:spLocks noGrp="1"/>
+          </p:cNvSpPr>
+          <p:nvPr>
+            <p:ph idx="1"/>
+          </p:nvPr>
+        </p:nvSpPr>
+        <p:spPr>
+          <a:xfrm>
+            <a:off x="677334" y="1930400"/>
+            <a:ext cx="8596668" cy="3880773"/>
+          </a:xfrm>
+        </p:spPr>
+        <p:txBody>
+          <a:bodyPr/>
+          <a:lstStyle/>
+          <a:p>
+            <a:r>
+              <a:rPr lang="es-ES" dirty="0"/>
+              <a:t>Me hubiera gustado tener una </a:t>
+            </a:r>
+            <a:r>
+              <a:rPr lang="es-ES" dirty="0" err="1"/>
+              <a:t>accuracy</a:t>
+            </a:r>
+            <a:r>
+              <a:rPr lang="es-ES" dirty="0"/>
+              <a:t> &gt; 90%</a:t>
+            </a:r>
+          </a:p>
+          <a:p>
+            <a:pPr lvl="1"/>
+            <a:r>
+              <a:rPr lang="es-ES" dirty="0"/>
+              <a:t>Es una encuesta…</a:t>
+            </a:r>
+          </a:p>
+          <a:p>
+            <a:pPr lvl="1"/>
+            <a:r>
+              <a:rPr lang="es-ES" dirty="0"/>
+              <a:t>… Faltan bastantes datos</a:t>
+            </a:r>
+          </a:p>
+          <a:p>
+            <a:pPr lvl="1"/>
+            <a:endParaRPr lang="es-ES" dirty="0"/>
+          </a:p>
+          <a:p>
+            <a:pPr marL="457200" lvl="1" indent="0">
+              <a:buNone/>
+            </a:pPr>
+            <a:endParaRPr lang="es-ES" i="1" dirty="0"/>
+          </a:p>
+          <a:p>
+            <a:pPr lvl="1"/>
+            <a:endParaRPr lang="es-ES" i="1" dirty="0"/>
+          </a:p>
+        </p:txBody>
+      </p:sp>
+    </p:spTree>
+    <p:extLst>
+      <p:ext uri="{BB962C8B-B14F-4D97-AF65-F5344CB8AC3E}">
+        <p14:creationId xmlns:p14="http://schemas.microsoft.com/office/powerpoint/2010/main" val="288374479"/>
+      </p:ext>
+    </p:extLst>
+  </p:cSld>
+  <p:clrMapOvr>
+    <a:masterClrMapping/>
+  </p:clrMapOvr>
+</p:sld>
+</file>
+
+<file path=ppt/slides/slide44.xml><?xml version="1.0" encoding="utf-8"?>
+<p:sld xmlns:a="http://schemas.openxmlformats.org/drawingml/2006/main" xmlns:r="http://schemas.openxmlformats.org/officeDocument/2006/relationships" xmlns:p="http://schemas.openxmlformats.org/presentationml/2006/main">
+  <p:cSld>
+    <p:spTree>
+      <p:nvGrpSpPr>
+        <p:cNvPr id="1" name=""/>
+        <p:cNvGrpSpPr/>
+        <p:nvPr/>
+      </p:nvGrpSpPr>
+      <p:grpSpPr>
+        <a:xfrm>
+          <a:off x="0" y="0"/>
+          <a:ext cx="0" cy="0"/>
+          <a:chOff x="0" y="0"/>
+          <a:chExt cx="0" cy="0"/>
+        </a:xfrm>
+      </p:grpSpPr>
+      <p:sp>
+        <p:nvSpPr>
+          <p:cNvPr id="2" name="Título 1">
+            <a:extLst>
+              <a:ext uri="{FF2B5EF4-FFF2-40B4-BE49-F238E27FC236}">
+                <a16:creationId xmlns:a16="http://schemas.microsoft.com/office/drawing/2014/main" id="{18F746AF-7F83-4AC2-BDC1-76EC23E2C28D}"/>
+              </a:ext>
+            </a:extLst>
+          </p:cNvPr>
+          <p:cNvSpPr>
+            <a:spLocks noGrp="1"/>
+          </p:cNvSpPr>
+          <p:nvPr>
+            <p:ph type="title"/>
+          </p:nvPr>
+        </p:nvSpPr>
+        <p:spPr/>
+        <p:txBody>
+          <a:bodyPr/>
+          <a:lstStyle/>
+          <a:p>
+            <a:r>
+              <a:rPr lang="es-ES" dirty="0"/>
+              <a:t>4. Propuestas para trabajo futuro</a:t>
+            </a:r>
+          </a:p>
+        </p:txBody>
+      </p:sp>
+      <p:sp>
+        <p:nvSpPr>
+          <p:cNvPr id="3" name="Marcador de contenido 2">
+            <a:extLst>
+              <a:ext uri="{FF2B5EF4-FFF2-40B4-BE49-F238E27FC236}">
+                <a16:creationId xmlns:a16="http://schemas.microsoft.com/office/drawing/2014/main" id="{B282B6D4-73A6-4FDD-A090-CA4BF8C76813}"/>
+              </a:ext>
+            </a:extLst>
+          </p:cNvPr>
+          <p:cNvSpPr>
+            <a:spLocks noGrp="1"/>
+          </p:cNvSpPr>
+          <p:nvPr>
+            <p:ph idx="1"/>
+          </p:nvPr>
+        </p:nvSpPr>
+        <p:spPr>
+          <a:xfrm>
+            <a:off x="677334" y="1930400"/>
+            <a:ext cx="8596668" cy="4318000"/>
+          </a:xfrm>
+        </p:spPr>
+        <p:txBody>
+          <a:bodyPr>
+            <a:normAutofit/>
+          </a:bodyPr>
+          <a:lstStyle/>
+          <a:p>
+            <a:r>
+              <a:rPr lang="es-ES" dirty="0"/>
+              <a:t>Aumentar el tamaño de la base de datos</a:t>
+            </a:r>
+          </a:p>
+          <a:p>
+            <a:pPr lvl="1"/>
+            <a:r>
+              <a:rPr lang="es-ES" dirty="0"/>
+              <a:t>Clases desbalanceadas</a:t>
+            </a:r>
+          </a:p>
+          <a:p>
+            <a:pPr marL="457200" lvl="1" indent="0">
+              <a:buNone/>
+            </a:pPr>
+            <a:endParaRPr lang="es-ES" dirty="0"/>
+          </a:p>
+          <a:p>
+            <a:pPr indent="-285750"/>
+            <a:r>
+              <a:rPr lang="es-ES" dirty="0"/>
+              <a:t>Hacer más iteraciones</a:t>
+            </a:r>
+          </a:p>
+          <a:p>
+            <a:pPr lvl="1"/>
+            <a:r>
+              <a:rPr lang="es-ES" dirty="0"/>
+              <a:t>Cambiando las </a:t>
+            </a:r>
+            <a:r>
+              <a:rPr lang="es-ES" dirty="0" err="1"/>
+              <a:t>label</a:t>
+            </a:r>
+            <a:endParaRPr lang="es-ES" dirty="0"/>
+          </a:p>
+          <a:p>
+            <a:pPr lvl="1"/>
+            <a:r>
+              <a:rPr lang="es-ES" dirty="0"/>
+              <a:t>Haciendo nuevos grupos con la última propuesta, que es la que mejor resultados ha dado</a:t>
+            </a:r>
+            <a:br>
+              <a:rPr lang="es-ES" dirty="0"/>
+            </a:br>
+            <a:endParaRPr lang="es-ES" dirty="0"/>
+          </a:p>
+          <a:p>
+            <a:r>
+              <a:rPr lang="es-ES" dirty="0"/>
+              <a:t>Clasificar mejor algunas columnas</a:t>
+            </a:r>
+          </a:p>
+          <a:p>
+            <a:pPr lvl="1"/>
+            <a:r>
+              <a:rPr lang="es-ES" dirty="0"/>
+              <a:t>Problema de las respuestas múltiples</a:t>
+            </a:r>
+          </a:p>
+          <a:p>
+            <a:pPr lvl="1"/>
+            <a:r>
+              <a:rPr lang="es-ES" dirty="0"/>
+              <a:t>Algunas columnas se han quedado fuera por este problema</a:t>
+            </a:r>
+          </a:p>
+        </p:txBody>
+      </p:sp>
+    </p:spTree>
+    <p:extLst>
+      <p:ext uri="{BB962C8B-B14F-4D97-AF65-F5344CB8AC3E}">
+        <p14:creationId xmlns:p14="http://schemas.microsoft.com/office/powerpoint/2010/main" val="2547785993"/>
+      </p:ext>
+    </p:extLst>
+  </p:cSld>
+  <p:clrMapOvr>
+    <a:masterClrMapping/>
+  </p:clrMapOvr>
+</p:sld>
+</file>
+
 <file path=ppt/slides/slide5.xml><?xml version="1.0" encoding="utf-8"?>
 <p:sld xmlns:a="http://schemas.openxmlformats.org/drawingml/2006/main" xmlns:r="http://schemas.openxmlformats.org/officeDocument/2006/relationships" xmlns:p="http://schemas.openxmlformats.org/presentationml/2006/main">
   <p:cSld>
@@ -8733,7 +12363,7 @@
           <a:p>
             <a:r>
               <a:rPr lang="es-ES" dirty="0"/>
-              <a:t>2. Primera iteración: selección del conjunto de datos</a:t>
+              <a:t>2.1. Primera iteración: selección del conjunto de datos</a:t>
             </a:r>
           </a:p>
         </p:txBody>
@@ -8880,7 +12510,7 @@
           <a:p>
             <a:r>
               <a:rPr lang="es-ES" dirty="0"/>
-              <a:t>2. Primera iteración: adecuación de la base de datos</a:t>
+              <a:t>2.1. Primera iteración: adecuación de la base de datos</a:t>
             </a:r>
           </a:p>
         </p:txBody>
@@ -8993,7 +12623,7 @@
           <a:p>
             <a:r>
               <a:rPr lang="es-ES" dirty="0"/>
-              <a:t>2. Primera iteración: </a:t>
+              <a:t>2.1. Primera iteración: </a:t>
             </a:r>
             <a:r>
               <a:rPr lang="es-ES" dirty="0" err="1"/>
@@ -9130,7 +12760,7 @@
           <a:p>
             <a:r>
               <a:rPr lang="es-ES" dirty="0"/>
-              <a:t>2. Primera iteración: </a:t>
+              <a:t>2.1. Primera iteración: </a:t>
             </a:r>
             <a:r>
               <a:rPr lang="es-ES" dirty="0" err="1"/>
@@ -9246,7 +12876,7 @@
           <a:p>
             <a:r>
               <a:rPr lang="es-ES" dirty="0"/>
-              <a:t>2. Primera iteración: </a:t>
+              <a:t>2.1. Primera iteración: </a:t>
             </a:r>
             <a:r>
               <a:rPr lang="es-ES" dirty="0" err="1"/>

</xml_diff>

<commit_message>
final commit -at least I hope
</commit_message>
<xml_diff>
--- a/Presentación DataMiningHealth.pptx
+++ b/Presentación DataMiningHealth.pptx
@@ -5,7 +5,7 @@
     <p:sldMasterId id="2147483711" r:id="rId1"/>
   </p:sldMasterIdLst>
   <p:notesMasterIdLst>
-    <p:notesMasterId r:id="rId46"/>
+    <p:notesMasterId r:id="rId42"/>
   </p:notesMasterIdLst>
   <p:sldIdLst>
     <p:sldId id="256" r:id="rId2"/>
@@ -21,37 +21,33 @@
     <p:sldId id="275" r:id="rId12"/>
     <p:sldId id="266" r:id="rId13"/>
     <p:sldId id="267" r:id="rId14"/>
-    <p:sldId id="268" r:id="rId15"/>
-    <p:sldId id="269" r:id="rId16"/>
-    <p:sldId id="270" r:id="rId17"/>
-    <p:sldId id="271" r:id="rId18"/>
-    <p:sldId id="272" r:id="rId19"/>
-    <p:sldId id="273" r:id="rId20"/>
-    <p:sldId id="274" r:id="rId21"/>
-    <p:sldId id="276" r:id="rId22"/>
-    <p:sldId id="277" r:id="rId23"/>
-    <p:sldId id="278" r:id="rId24"/>
-    <p:sldId id="279" r:id="rId25"/>
-    <p:sldId id="280" r:id="rId26"/>
-    <p:sldId id="281" r:id="rId27"/>
-    <p:sldId id="282" r:id="rId28"/>
-    <p:sldId id="283" r:id="rId29"/>
-    <p:sldId id="284" r:id="rId30"/>
-    <p:sldId id="285" r:id="rId31"/>
-    <p:sldId id="286" r:id="rId32"/>
-    <p:sldId id="287" r:id="rId33"/>
-    <p:sldId id="288" r:id="rId34"/>
-    <p:sldId id="289" r:id="rId35"/>
-    <p:sldId id="290" r:id="rId36"/>
-    <p:sldId id="291" r:id="rId37"/>
-    <p:sldId id="292" r:id="rId38"/>
-    <p:sldId id="293" r:id="rId39"/>
-    <p:sldId id="294" r:id="rId40"/>
-    <p:sldId id="295" r:id="rId41"/>
-    <p:sldId id="296" r:id="rId42"/>
-    <p:sldId id="297" r:id="rId43"/>
-    <p:sldId id="298" r:id="rId44"/>
-    <p:sldId id="299" r:id="rId45"/>
+    <p:sldId id="269" r:id="rId15"/>
+    <p:sldId id="270" r:id="rId16"/>
+    <p:sldId id="271" r:id="rId17"/>
+    <p:sldId id="274" r:id="rId18"/>
+    <p:sldId id="276" r:id="rId19"/>
+    <p:sldId id="277" r:id="rId20"/>
+    <p:sldId id="278" r:id="rId21"/>
+    <p:sldId id="279" r:id="rId22"/>
+    <p:sldId id="280" r:id="rId23"/>
+    <p:sldId id="281" r:id="rId24"/>
+    <p:sldId id="282" r:id="rId25"/>
+    <p:sldId id="284" r:id="rId26"/>
+    <p:sldId id="285" r:id="rId27"/>
+    <p:sldId id="286" r:id="rId28"/>
+    <p:sldId id="287" r:id="rId29"/>
+    <p:sldId id="288" r:id="rId30"/>
+    <p:sldId id="289" r:id="rId31"/>
+    <p:sldId id="290" r:id="rId32"/>
+    <p:sldId id="292" r:id="rId33"/>
+    <p:sldId id="293" r:id="rId34"/>
+    <p:sldId id="294" r:id="rId35"/>
+    <p:sldId id="295" r:id="rId36"/>
+    <p:sldId id="296" r:id="rId37"/>
+    <p:sldId id="297" r:id="rId38"/>
+    <p:sldId id="300" r:id="rId39"/>
+    <p:sldId id="298" r:id="rId40"/>
+    <p:sldId id="299" r:id="rId41"/>
   </p:sldIdLst>
   <p:sldSz cx="12192000" cy="6858000"/>
   <p:notesSz cx="6858000" cy="9144000"/>
@@ -7056,7 +7052,10 @@
               <a:rPr lang="es-ES" dirty="0" err="1"/>
               <a:t>pre-procesado</a:t>
             </a:r>
-            <a:endParaRPr lang="es-ES" dirty="0"/>
+            <a:r>
+              <a:rPr lang="es-ES" dirty="0"/>
+              <a:t> y transformación de los datos</a:t>
+            </a:r>
           </a:p>
         </p:txBody>
       </p:sp>
@@ -7304,136 +7303,6 @@
           </a:p>
         </p:txBody>
       </p:sp>
-    </p:spTree>
-    <p:extLst>
-      <p:ext uri="{BB962C8B-B14F-4D97-AF65-F5344CB8AC3E}">
-        <p14:creationId xmlns:p14="http://schemas.microsoft.com/office/powerpoint/2010/main" val="483155530"/>
-      </p:ext>
-    </p:extLst>
-  </p:cSld>
-  <p:clrMapOvr>
-    <a:masterClrMapping/>
-  </p:clrMapOvr>
-</p:sld>
-</file>
-
-<file path=ppt/slides/slide15.xml><?xml version="1.0" encoding="utf-8"?>
-<p:sld xmlns:a="http://schemas.openxmlformats.org/drawingml/2006/main" xmlns:r="http://schemas.openxmlformats.org/officeDocument/2006/relationships" xmlns:p="http://schemas.openxmlformats.org/presentationml/2006/main">
-  <p:cSld>
-    <p:spTree>
-      <p:nvGrpSpPr>
-        <p:cNvPr id="1" name=""/>
-        <p:cNvGrpSpPr/>
-        <p:nvPr/>
-      </p:nvGrpSpPr>
-      <p:grpSpPr>
-        <a:xfrm>
-          <a:off x="0" y="0"/>
-          <a:ext cx="0" cy="0"/>
-          <a:chOff x="0" y="0"/>
-          <a:chExt cx="0" cy="0"/>
-        </a:xfrm>
-      </p:grpSpPr>
-      <p:sp>
-        <p:nvSpPr>
-          <p:cNvPr id="2" name="Título 1">
-            <a:extLst>
-              <a:ext uri="{FF2B5EF4-FFF2-40B4-BE49-F238E27FC236}">
-                <a16:creationId xmlns:a16="http://schemas.microsoft.com/office/drawing/2014/main" id="{0F08129C-58B4-45D6-9BA0-96204C339F83}"/>
-              </a:ext>
-            </a:extLst>
-          </p:cNvPr>
-          <p:cNvSpPr>
-            <a:spLocks noGrp="1"/>
-          </p:cNvSpPr>
-          <p:nvPr>
-            <p:ph type="title"/>
-          </p:nvPr>
-        </p:nvSpPr>
-        <p:spPr/>
-        <p:txBody>
-          <a:bodyPr/>
-          <a:lstStyle/>
-          <a:p>
-            <a:r>
-              <a:rPr lang="es-ES" dirty="0"/>
-              <a:t>2.1. Primera iteración: </a:t>
-            </a:r>
-            <a:r>
-              <a:rPr lang="es-ES" dirty="0" err="1"/>
-              <a:t>pre-procesado</a:t>
-            </a:r>
-            <a:endParaRPr lang="es-ES" dirty="0"/>
-          </a:p>
-        </p:txBody>
-      </p:sp>
-      <p:sp>
-        <p:nvSpPr>
-          <p:cNvPr id="3" name="Marcador de contenido 2">
-            <a:extLst>
-              <a:ext uri="{FF2B5EF4-FFF2-40B4-BE49-F238E27FC236}">
-                <a16:creationId xmlns:a16="http://schemas.microsoft.com/office/drawing/2014/main" id="{6F100738-AC81-45FA-83D4-4F15CC57FA8A}"/>
-              </a:ext>
-            </a:extLst>
-          </p:cNvPr>
-          <p:cNvSpPr>
-            <a:spLocks noGrp="1"/>
-          </p:cNvSpPr>
-          <p:nvPr>
-            <p:ph idx="1"/>
-          </p:nvPr>
-        </p:nvSpPr>
-        <p:spPr>
-          <a:xfrm>
-            <a:off x="677334" y="1930400"/>
-            <a:ext cx="8596668" cy="3880773"/>
-          </a:xfrm>
-        </p:spPr>
-        <p:txBody>
-          <a:bodyPr/>
-          <a:lstStyle/>
-          <a:p>
-            <a:r>
-              <a:rPr lang="es-ES" dirty="0"/>
-              <a:t>Tras el </a:t>
-            </a:r>
-            <a:r>
-              <a:rPr lang="es-ES" dirty="0" err="1"/>
-              <a:t>pre-procesado</a:t>
-            </a:r>
-            <a:r>
-              <a:rPr lang="es-ES" dirty="0"/>
-              <a:t>…</a:t>
-            </a:r>
-          </a:p>
-          <a:p>
-            <a:pPr lvl="1"/>
-            <a:r>
-              <a:rPr lang="es-ES" dirty="0"/>
-              <a:t>25 columnas</a:t>
-            </a:r>
-          </a:p>
-          <a:p>
-            <a:pPr lvl="1"/>
-            <a:r>
-              <a:rPr lang="es-ES" dirty="0"/>
-              <a:t>1146 filas</a:t>
-            </a:r>
-          </a:p>
-          <a:p>
-            <a:endParaRPr lang="es-ES" dirty="0"/>
-          </a:p>
-          <a:p>
-            <a:endParaRPr lang="es-ES" dirty="0"/>
-          </a:p>
-          <a:p>
-            <a:pPr marL="0" indent="0">
-              <a:buNone/>
-            </a:pPr>
-            <a:endParaRPr lang="es-ES" dirty="0"/>
-          </a:p>
-        </p:txBody>
-      </p:sp>
       <p:pic>
         <p:nvPicPr>
           <p:cNvPr id="4" name="Imagen 3">
@@ -7486,7 +7355,7 @@
 </p:sld>
 </file>
 
-<file path=ppt/slides/slide16.xml><?xml version="1.0" encoding="utf-8"?>
+<file path=ppt/slides/slide15.xml><?xml version="1.0" encoding="utf-8"?>
 <p:sld xmlns:a="http://schemas.openxmlformats.org/drawingml/2006/main" xmlns:r="http://schemas.openxmlformats.org/officeDocument/2006/relationships" xmlns:p="http://schemas.openxmlformats.org/presentationml/2006/main">
   <p:cSld>
     <p:spTree>
@@ -7623,7 +7492,7 @@
 </p:sld>
 </file>
 
-<file path=ppt/slides/slide17.xml><?xml version="1.0" encoding="utf-8"?>
+<file path=ppt/slides/slide16.xml><?xml version="1.0" encoding="utf-8"?>
 <p:sld xmlns:a="http://schemas.openxmlformats.org/drawingml/2006/main" xmlns:r="http://schemas.openxmlformats.org/officeDocument/2006/relationships" xmlns:p="http://schemas.openxmlformats.org/presentationml/2006/main">
   <p:cSld>
     <p:spTree>
@@ -7753,435 +7622,7 @@
 </p:sld>
 </file>
 
-<file path=ppt/slides/slide18.xml><?xml version="1.0" encoding="utf-8"?>
-<p:sld xmlns:a="http://schemas.openxmlformats.org/drawingml/2006/main" xmlns:r="http://schemas.openxmlformats.org/officeDocument/2006/relationships" xmlns:p="http://schemas.openxmlformats.org/presentationml/2006/main">
-  <p:cSld>
-    <p:spTree>
-      <p:nvGrpSpPr>
-        <p:cNvPr id="1" name=""/>
-        <p:cNvGrpSpPr/>
-        <p:nvPr/>
-      </p:nvGrpSpPr>
-      <p:grpSpPr>
-        <a:xfrm>
-          <a:off x="0" y="0"/>
-          <a:ext cx="0" cy="0"/>
-          <a:chOff x="0" y="0"/>
-          <a:chExt cx="0" cy="0"/>
-        </a:xfrm>
-      </p:grpSpPr>
-      <p:sp>
-        <p:nvSpPr>
-          <p:cNvPr id="2" name="Título 1">
-            <a:extLst>
-              <a:ext uri="{FF2B5EF4-FFF2-40B4-BE49-F238E27FC236}">
-                <a16:creationId xmlns:a16="http://schemas.microsoft.com/office/drawing/2014/main" id="{8939D2C4-A087-47E9-940A-6C87293FE2B8}"/>
-              </a:ext>
-            </a:extLst>
-          </p:cNvPr>
-          <p:cNvSpPr>
-            <a:spLocks noGrp="1"/>
-          </p:cNvSpPr>
-          <p:nvPr>
-            <p:ph type="title"/>
-          </p:nvPr>
-        </p:nvSpPr>
-        <p:spPr/>
-        <p:txBody>
-          <a:bodyPr/>
-          <a:lstStyle/>
-          <a:p>
-            <a:r>
-              <a:rPr lang="es-ES" dirty="0"/>
-              <a:t>2.1. Primera iteración: data </a:t>
-            </a:r>
-            <a:r>
-              <a:rPr lang="es-ES" dirty="0" err="1"/>
-              <a:t>mining</a:t>
-            </a:r>
-            <a:endParaRPr lang="es-ES" dirty="0"/>
-          </a:p>
-        </p:txBody>
-      </p:sp>
-      <p:sp>
-        <p:nvSpPr>
-          <p:cNvPr id="3" name="Marcador de contenido 2">
-            <a:extLst>
-              <a:ext uri="{FF2B5EF4-FFF2-40B4-BE49-F238E27FC236}">
-                <a16:creationId xmlns:a16="http://schemas.microsoft.com/office/drawing/2014/main" id="{78F7A0E2-4927-4C37-B289-5EE2C9B6DD3E}"/>
-              </a:ext>
-            </a:extLst>
-          </p:cNvPr>
-          <p:cNvSpPr>
-            <a:spLocks noGrp="1"/>
-          </p:cNvSpPr>
-          <p:nvPr>
-            <p:ph idx="1"/>
-          </p:nvPr>
-        </p:nvSpPr>
-        <p:spPr>
-          <a:xfrm>
-            <a:off x="677334" y="1930400"/>
-            <a:ext cx="8596668" cy="3880773"/>
-          </a:xfrm>
-        </p:spPr>
-        <p:txBody>
-          <a:bodyPr/>
-          <a:lstStyle/>
-          <a:p>
-            <a:r>
-              <a:rPr lang="es-ES" dirty="0"/>
-              <a:t>Árbol de decisión</a:t>
-            </a:r>
-          </a:p>
-          <a:p>
-            <a:pPr lvl="1"/>
-            <a:r>
-              <a:rPr lang="es-ES" dirty="0"/>
-              <a:t>Pregunta más decisiva:</a:t>
-            </a:r>
-          </a:p>
-          <a:p>
-            <a:pPr marL="457200" lvl="1" indent="0">
-              <a:buNone/>
-            </a:pPr>
-            <a:endParaRPr lang="es-ES" dirty="0"/>
-          </a:p>
-          <a:p>
-            <a:pPr marL="457200" lvl="1" indent="0">
-              <a:buNone/>
-            </a:pPr>
-            <a:r>
-              <a:rPr lang="en-US" i="1" dirty="0"/>
-              <a:t>“If you have a mental health issue do you feel that it interferes with your work when NOT being treated effectively?”</a:t>
-            </a:r>
-            <a:endParaRPr lang="es-ES" dirty="0"/>
-          </a:p>
-          <a:p>
-            <a:pPr marL="0" indent="0">
-              <a:buNone/>
-            </a:pPr>
-            <a:endParaRPr lang="es-ES" dirty="0"/>
-          </a:p>
-        </p:txBody>
-      </p:sp>
-    </p:spTree>
-    <p:extLst>
-      <p:ext uri="{BB962C8B-B14F-4D97-AF65-F5344CB8AC3E}">
-        <p14:creationId xmlns:p14="http://schemas.microsoft.com/office/powerpoint/2010/main" val="935833901"/>
-      </p:ext>
-    </p:extLst>
-  </p:cSld>
-  <p:clrMapOvr>
-    <a:masterClrMapping/>
-  </p:clrMapOvr>
-</p:sld>
-</file>
-
-<file path=ppt/slides/slide19.xml><?xml version="1.0" encoding="utf-8"?>
-<p:sld xmlns:a="http://schemas.openxmlformats.org/drawingml/2006/main" xmlns:r="http://schemas.openxmlformats.org/officeDocument/2006/relationships" xmlns:p="http://schemas.openxmlformats.org/presentationml/2006/main">
-  <p:cSld>
-    <p:spTree>
-      <p:nvGrpSpPr>
-        <p:cNvPr id="1" name=""/>
-        <p:cNvGrpSpPr/>
-        <p:nvPr/>
-      </p:nvGrpSpPr>
-      <p:grpSpPr>
-        <a:xfrm>
-          <a:off x="0" y="0"/>
-          <a:ext cx="0" cy="0"/>
-          <a:chOff x="0" y="0"/>
-          <a:chExt cx="0" cy="0"/>
-        </a:xfrm>
-      </p:grpSpPr>
-      <p:sp>
-        <p:nvSpPr>
-          <p:cNvPr id="2" name="Título 1">
-            <a:extLst>
-              <a:ext uri="{FF2B5EF4-FFF2-40B4-BE49-F238E27FC236}">
-                <a16:creationId xmlns:a16="http://schemas.microsoft.com/office/drawing/2014/main" id="{8939D2C4-A087-47E9-940A-6C87293FE2B8}"/>
-              </a:ext>
-            </a:extLst>
-          </p:cNvPr>
-          <p:cNvSpPr>
-            <a:spLocks noGrp="1"/>
-          </p:cNvSpPr>
-          <p:nvPr>
-            <p:ph type="title"/>
-          </p:nvPr>
-        </p:nvSpPr>
-        <p:spPr/>
-        <p:txBody>
-          <a:bodyPr/>
-          <a:lstStyle/>
-          <a:p>
-            <a:r>
-              <a:rPr lang="es-ES" dirty="0"/>
-              <a:t>2.1. Primera iteración: data </a:t>
-            </a:r>
-            <a:r>
-              <a:rPr lang="es-ES" dirty="0" err="1"/>
-              <a:t>mining</a:t>
-            </a:r>
-            <a:endParaRPr lang="es-ES" dirty="0"/>
-          </a:p>
-        </p:txBody>
-      </p:sp>
-      <p:sp>
-        <p:nvSpPr>
-          <p:cNvPr id="3" name="Marcador de contenido 2">
-            <a:extLst>
-              <a:ext uri="{FF2B5EF4-FFF2-40B4-BE49-F238E27FC236}">
-                <a16:creationId xmlns:a16="http://schemas.microsoft.com/office/drawing/2014/main" id="{78F7A0E2-4927-4C37-B289-5EE2C9B6DD3E}"/>
-              </a:ext>
-            </a:extLst>
-          </p:cNvPr>
-          <p:cNvSpPr>
-            <a:spLocks noGrp="1"/>
-          </p:cNvSpPr>
-          <p:nvPr>
-            <p:ph idx="1"/>
-          </p:nvPr>
-        </p:nvSpPr>
-        <p:spPr>
-          <a:xfrm>
-            <a:off x="677334" y="1930400"/>
-            <a:ext cx="8596668" cy="3880773"/>
-          </a:xfrm>
-        </p:spPr>
-        <p:txBody>
-          <a:bodyPr/>
-          <a:lstStyle/>
-          <a:p>
-            <a:r>
-              <a:rPr lang="es-ES" dirty="0"/>
-              <a:t>Árbol de decisión</a:t>
-            </a:r>
-          </a:p>
-          <a:p>
-            <a:pPr lvl="1"/>
-            <a:r>
-              <a:rPr lang="es-ES" dirty="0"/>
-              <a:t>Pregunta más decisiva:</a:t>
-            </a:r>
-          </a:p>
-          <a:p>
-            <a:pPr marL="457200" lvl="1" indent="0">
-              <a:buNone/>
-            </a:pPr>
-            <a:endParaRPr lang="es-ES" dirty="0"/>
-          </a:p>
-          <a:p>
-            <a:pPr marL="457200" lvl="1" indent="0">
-              <a:buNone/>
-            </a:pPr>
-            <a:r>
-              <a:rPr lang="en-US" i="1" dirty="0"/>
-              <a:t>“If you have a mental health issue do you feel that it interferes with your work when NOT being treated effectively?”</a:t>
-            </a:r>
-          </a:p>
-          <a:p>
-            <a:pPr marL="457200" lvl="1" indent="0">
-              <a:buNone/>
-            </a:pPr>
-            <a:endParaRPr lang="en-US" i="1" dirty="0"/>
-          </a:p>
-          <a:p>
-            <a:pPr lvl="1"/>
-            <a:r>
-              <a:rPr lang="en-US" dirty="0" err="1"/>
-              <a:t>Seguida</a:t>
-            </a:r>
-            <a:r>
-              <a:rPr lang="en-US" dirty="0"/>
-              <a:t> por…</a:t>
-            </a:r>
-          </a:p>
-          <a:p>
-            <a:pPr marL="457200" lvl="1" indent="0">
-              <a:buNone/>
-            </a:pPr>
-            <a:r>
-              <a:rPr lang="en-US" i="1" dirty="0"/>
-              <a:t>“If you have a mental health issue do you feel that it interferes with your work when being treated effectively?”.</a:t>
-            </a:r>
-            <a:r>
-              <a:rPr lang="en-US" dirty="0"/>
-              <a:t> </a:t>
-            </a:r>
-            <a:endParaRPr lang="es-ES" dirty="0"/>
-          </a:p>
-          <a:p>
-            <a:pPr marL="0" indent="0">
-              <a:buNone/>
-            </a:pPr>
-            <a:endParaRPr lang="es-ES" dirty="0"/>
-          </a:p>
-        </p:txBody>
-      </p:sp>
-    </p:spTree>
-    <p:extLst>
-      <p:ext uri="{BB962C8B-B14F-4D97-AF65-F5344CB8AC3E}">
-        <p14:creationId xmlns:p14="http://schemas.microsoft.com/office/powerpoint/2010/main" val="2153251069"/>
-      </p:ext>
-    </p:extLst>
-  </p:cSld>
-  <p:clrMapOvr>
-    <a:masterClrMapping/>
-  </p:clrMapOvr>
-</p:sld>
-</file>
-
-<file path=ppt/slides/slide2.xml><?xml version="1.0" encoding="utf-8"?>
-<p:sld xmlns:a="http://schemas.openxmlformats.org/drawingml/2006/main" xmlns:r="http://schemas.openxmlformats.org/officeDocument/2006/relationships" xmlns:p="http://schemas.openxmlformats.org/presentationml/2006/main">
-  <p:cSld>
-    <p:spTree>
-      <p:nvGrpSpPr>
-        <p:cNvPr id="1" name=""/>
-        <p:cNvGrpSpPr/>
-        <p:nvPr/>
-      </p:nvGrpSpPr>
-      <p:grpSpPr>
-        <a:xfrm>
-          <a:off x="0" y="0"/>
-          <a:ext cx="0" cy="0"/>
-          <a:chOff x="0" y="0"/>
-          <a:chExt cx="0" cy="0"/>
-        </a:xfrm>
-      </p:grpSpPr>
-      <p:sp>
-        <p:nvSpPr>
-          <p:cNvPr id="2" name="Título 1">
-            <a:extLst>
-              <a:ext uri="{FF2B5EF4-FFF2-40B4-BE49-F238E27FC236}">
-                <a16:creationId xmlns:a16="http://schemas.microsoft.com/office/drawing/2014/main" id="{63EE6A20-43E5-4825-9AC2-07CC709D2D97}"/>
-              </a:ext>
-            </a:extLst>
-          </p:cNvPr>
-          <p:cNvSpPr>
-            <a:spLocks noGrp="1"/>
-          </p:cNvSpPr>
-          <p:nvPr>
-            <p:ph type="title"/>
-          </p:nvPr>
-        </p:nvSpPr>
-        <p:spPr/>
-        <p:txBody>
-          <a:bodyPr/>
-          <a:lstStyle/>
-          <a:p>
-            <a:r>
-              <a:rPr lang="es-ES" dirty="0"/>
-              <a:t>Índice</a:t>
-            </a:r>
-          </a:p>
-        </p:txBody>
-      </p:sp>
-      <p:sp>
-        <p:nvSpPr>
-          <p:cNvPr id="3" name="Marcador de contenido 2">
-            <a:extLst>
-              <a:ext uri="{FF2B5EF4-FFF2-40B4-BE49-F238E27FC236}">
-                <a16:creationId xmlns:a16="http://schemas.microsoft.com/office/drawing/2014/main" id="{EBF9DA2F-D14E-4E26-8BCE-278CBD52D6DB}"/>
-              </a:ext>
-            </a:extLst>
-          </p:cNvPr>
-          <p:cNvSpPr>
-            <a:spLocks noGrp="1"/>
-          </p:cNvSpPr>
-          <p:nvPr>
-            <p:ph idx="1"/>
-          </p:nvPr>
-        </p:nvSpPr>
-        <p:spPr>
-          <a:xfrm>
-            <a:off x="677334" y="1930400"/>
-            <a:ext cx="8596668" cy="3880773"/>
-          </a:xfrm>
-        </p:spPr>
-        <p:txBody>
-          <a:bodyPr/>
-          <a:lstStyle/>
-          <a:p>
-            <a:pPr marL="514350" indent="-514350">
-              <a:buAutoNum type="arabicPeriod"/>
-            </a:pPr>
-            <a:r>
-              <a:rPr lang="es-ES" dirty="0"/>
-              <a:t>Introducción</a:t>
-            </a:r>
-          </a:p>
-          <a:p>
-            <a:pPr marL="514350" indent="-514350">
-              <a:buAutoNum type="arabicPeriod"/>
-            </a:pPr>
-            <a:r>
-              <a:rPr lang="es-ES" dirty="0"/>
-              <a:t>Proceso KDD</a:t>
-            </a:r>
-          </a:p>
-          <a:p>
-            <a:pPr marL="971550" lvl="1" indent="-514350">
-              <a:buAutoNum type="arabicPeriod"/>
-            </a:pPr>
-            <a:r>
-              <a:rPr lang="es-ES" dirty="0"/>
-              <a:t>Primera iteración</a:t>
-            </a:r>
-          </a:p>
-          <a:p>
-            <a:pPr marL="971550" lvl="1" indent="-514350">
-              <a:buAutoNum type="arabicPeriod"/>
-            </a:pPr>
-            <a:r>
-              <a:rPr lang="es-ES" dirty="0"/>
-              <a:t>Segunda iteración</a:t>
-            </a:r>
-          </a:p>
-          <a:p>
-            <a:pPr marL="971550" lvl="1" indent="-514350">
-              <a:buAutoNum type="arabicPeriod"/>
-            </a:pPr>
-            <a:r>
-              <a:rPr lang="es-ES" dirty="0"/>
-              <a:t>Tercera iteración</a:t>
-            </a:r>
-          </a:p>
-          <a:p>
-            <a:pPr marL="971550" lvl="1" indent="-514350">
-              <a:buAutoNum type="arabicPeriod"/>
-            </a:pPr>
-            <a:r>
-              <a:rPr lang="es-ES" dirty="0"/>
-              <a:t>Cuarta iteración</a:t>
-            </a:r>
-          </a:p>
-          <a:p>
-            <a:pPr marL="514350" indent="-514350">
-              <a:buAutoNum type="arabicPeriod"/>
-            </a:pPr>
-            <a:r>
-              <a:rPr lang="es-ES" dirty="0"/>
-              <a:t>Propuestas para trabajo futuro</a:t>
-            </a:r>
-          </a:p>
-        </p:txBody>
-      </p:sp>
-    </p:spTree>
-    <p:extLst>
-      <p:ext uri="{BB962C8B-B14F-4D97-AF65-F5344CB8AC3E}">
-        <p14:creationId xmlns:p14="http://schemas.microsoft.com/office/powerpoint/2010/main" val="165222934"/>
-      </p:ext>
-    </p:extLst>
-  </p:cSld>
-  <p:clrMapOvr>
-    <a:masterClrMapping/>
-  </p:clrMapOvr>
-</p:sld>
-</file>
-
-<file path=ppt/slides/slide20.xml><?xml version="1.0" encoding="utf-8"?>
+<file path=ppt/slides/slide17.xml><?xml version="1.0" encoding="utf-8"?>
 <p:sld xmlns:a="http://schemas.openxmlformats.org/drawingml/2006/main" xmlns:r="http://schemas.openxmlformats.org/officeDocument/2006/relationships" xmlns:p="http://schemas.openxmlformats.org/presentationml/2006/main">
   <p:cSld>
     <p:spTree>
@@ -8344,7 +7785,7 @@
 </p:sld>
 </file>
 
-<file path=ppt/slides/slide21.xml><?xml version="1.0" encoding="utf-8"?>
+<file path=ppt/slides/slide18.xml><?xml version="1.0" encoding="utf-8"?>
 <p:sld xmlns:a="http://schemas.openxmlformats.org/drawingml/2006/main" xmlns:r="http://schemas.openxmlformats.org/officeDocument/2006/relationships" xmlns:p="http://schemas.openxmlformats.org/presentationml/2006/main">
   <p:cSld>
     <p:spTree>
@@ -8455,7 +7896,7 @@
 </p:sld>
 </file>
 
-<file path=ppt/slides/slide22.xml><?xml version="1.0" encoding="utf-8"?>
+<file path=ppt/slides/slide19.xml><?xml version="1.0" encoding="utf-8"?>
 <p:sld xmlns:a="http://schemas.openxmlformats.org/drawingml/2006/main" xmlns:r="http://schemas.openxmlformats.org/officeDocument/2006/relationships" xmlns:p="http://schemas.openxmlformats.org/presentationml/2006/main">
   <p:cSld>
     <p:spTree>
@@ -8598,7 +8039,155 @@
 </p:sld>
 </file>
 
-<file path=ppt/slides/slide23.xml><?xml version="1.0" encoding="utf-8"?>
+<file path=ppt/slides/slide2.xml><?xml version="1.0" encoding="utf-8"?>
+<p:sld xmlns:a="http://schemas.openxmlformats.org/drawingml/2006/main" xmlns:r="http://schemas.openxmlformats.org/officeDocument/2006/relationships" xmlns:p="http://schemas.openxmlformats.org/presentationml/2006/main">
+  <p:cSld>
+    <p:spTree>
+      <p:nvGrpSpPr>
+        <p:cNvPr id="1" name=""/>
+        <p:cNvGrpSpPr/>
+        <p:nvPr/>
+      </p:nvGrpSpPr>
+      <p:grpSpPr>
+        <a:xfrm>
+          <a:off x="0" y="0"/>
+          <a:ext cx="0" cy="0"/>
+          <a:chOff x="0" y="0"/>
+          <a:chExt cx="0" cy="0"/>
+        </a:xfrm>
+      </p:grpSpPr>
+      <p:sp>
+        <p:nvSpPr>
+          <p:cNvPr id="2" name="Título 1">
+            <a:extLst>
+              <a:ext uri="{FF2B5EF4-FFF2-40B4-BE49-F238E27FC236}">
+                <a16:creationId xmlns:a16="http://schemas.microsoft.com/office/drawing/2014/main" id="{63EE6A20-43E5-4825-9AC2-07CC709D2D97}"/>
+              </a:ext>
+            </a:extLst>
+          </p:cNvPr>
+          <p:cNvSpPr>
+            <a:spLocks noGrp="1"/>
+          </p:cNvSpPr>
+          <p:nvPr>
+            <p:ph type="title"/>
+          </p:nvPr>
+        </p:nvSpPr>
+        <p:spPr/>
+        <p:txBody>
+          <a:bodyPr/>
+          <a:lstStyle/>
+          <a:p>
+            <a:r>
+              <a:rPr lang="es-ES" dirty="0"/>
+              <a:t>Índice</a:t>
+            </a:r>
+          </a:p>
+        </p:txBody>
+      </p:sp>
+      <p:sp>
+        <p:nvSpPr>
+          <p:cNvPr id="3" name="Marcador de contenido 2">
+            <a:extLst>
+              <a:ext uri="{FF2B5EF4-FFF2-40B4-BE49-F238E27FC236}">
+                <a16:creationId xmlns:a16="http://schemas.microsoft.com/office/drawing/2014/main" id="{EBF9DA2F-D14E-4E26-8BCE-278CBD52D6DB}"/>
+              </a:ext>
+            </a:extLst>
+          </p:cNvPr>
+          <p:cNvSpPr>
+            <a:spLocks noGrp="1"/>
+          </p:cNvSpPr>
+          <p:nvPr>
+            <p:ph idx="1"/>
+          </p:nvPr>
+        </p:nvSpPr>
+        <p:spPr>
+          <a:xfrm>
+            <a:off x="677334" y="1930400"/>
+            <a:ext cx="8596668" cy="3880773"/>
+          </a:xfrm>
+        </p:spPr>
+        <p:txBody>
+          <a:bodyPr/>
+          <a:lstStyle/>
+          <a:p>
+            <a:pPr marL="514350" indent="-514350">
+              <a:buAutoNum type="arabicPeriod"/>
+            </a:pPr>
+            <a:r>
+              <a:rPr lang="es-ES" dirty="0"/>
+              <a:t>Introducción</a:t>
+            </a:r>
+          </a:p>
+          <a:p>
+            <a:pPr marL="514350" indent="-514350">
+              <a:buAutoNum type="arabicPeriod"/>
+            </a:pPr>
+            <a:r>
+              <a:rPr lang="es-ES" dirty="0"/>
+              <a:t>Proceso KDD</a:t>
+            </a:r>
+          </a:p>
+          <a:p>
+            <a:pPr marL="971550" lvl="1" indent="-514350">
+              <a:buAutoNum type="arabicPeriod"/>
+            </a:pPr>
+            <a:r>
+              <a:rPr lang="es-ES" dirty="0"/>
+              <a:t>Primera iteración</a:t>
+            </a:r>
+          </a:p>
+          <a:p>
+            <a:pPr marL="971550" lvl="1" indent="-514350">
+              <a:buAutoNum type="arabicPeriod"/>
+            </a:pPr>
+            <a:r>
+              <a:rPr lang="es-ES" dirty="0"/>
+              <a:t>Segunda iteración</a:t>
+            </a:r>
+          </a:p>
+          <a:p>
+            <a:pPr marL="971550" lvl="1" indent="-514350">
+              <a:buAutoNum type="arabicPeriod"/>
+            </a:pPr>
+            <a:r>
+              <a:rPr lang="es-ES" dirty="0"/>
+              <a:t>Tercera iteración</a:t>
+            </a:r>
+          </a:p>
+          <a:p>
+            <a:pPr marL="971550" lvl="1" indent="-514350">
+              <a:buAutoNum type="arabicPeriod"/>
+            </a:pPr>
+            <a:r>
+              <a:rPr lang="es-ES" dirty="0"/>
+              <a:t>Cuarta iteración</a:t>
+            </a:r>
+          </a:p>
+          <a:p>
+            <a:pPr marL="514350" indent="-514350">
+              <a:buAutoNum type="arabicPeriod"/>
+            </a:pPr>
+            <a:r>
+              <a:rPr lang="es-ES" dirty="0"/>
+              <a:t>Propuestas para trabajo futuro</a:t>
+            </a:r>
+          </a:p>
+        </p:txBody>
+      </p:sp>
+    </p:spTree>
+    <p:extLst>
+      <p:ext uri="{BB962C8B-B14F-4D97-AF65-F5344CB8AC3E}">
+        <p14:creationId xmlns:p14="http://schemas.microsoft.com/office/powerpoint/2010/main" val="165222934"/>
+      </p:ext>
+    </p:extLst>
+  </p:cSld>
+  <p:clrMapOvr>
+    <a:masterClrMapping/>
+  </p:clrMapOvr>
+</p:sld>
+</file>
+
+<file path=ppt/slides/slide20.xml><?xml version="1.0" encoding="utf-8"?>
 <p:sld xmlns:a="http://schemas.openxmlformats.org/drawingml/2006/main" xmlns:r="http://schemas.openxmlformats.org/officeDocument/2006/relationships" xmlns:p="http://schemas.openxmlformats.org/presentationml/2006/main">
   <p:cSld>
     <p:spTree>
@@ -8742,7 +8331,7 @@
 </p:sld>
 </file>
 
-<file path=ppt/slides/slide24.xml><?xml version="1.0" encoding="utf-8"?>
+<file path=ppt/slides/slide21.xml><?xml version="1.0" encoding="utf-8"?>
 <p:sld xmlns:a="http://schemas.openxmlformats.org/drawingml/2006/main" xmlns:r="http://schemas.openxmlformats.org/officeDocument/2006/relationships" xmlns:p="http://schemas.openxmlformats.org/presentationml/2006/main">
   <p:cSld>
     <p:spTree>
@@ -8890,7 +8479,7 @@
 </p:sld>
 </file>
 
-<file path=ppt/slides/slide25.xml><?xml version="1.0" encoding="utf-8"?>
+<file path=ppt/slides/slide22.xml><?xml version="1.0" encoding="utf-8"?>
 <p:sld xmlns:a="http://schemas.openxmlformats.org/drawingml/2006/main" xmlns:r="http://schemas.openxmlformats.org/officeDocument/2006/relationships" xmlns:p="http://schemas.openxmlformats.org/presentationml/2006/main">
   <p:cSld>
     <p:spTree>
@@ -9029,7 +8618,7 @@
 </p:sld>
 </file>
 
-<file path=ppt/slides/slide26.xml><?xml version="1.0" encoding="utf-8"?>
+<file path=ppt/slides/slide23.xml><?xml version="1.0" encoding="utf-8"?>
 <p:sld xmlns:a="http://schemas.openxmlformats.org/drawingml/2006/main" xmlns:r="http://schemas.openxmlformats.org/officeDocument/2006/relationships" xmlns:p="http://schemas.openxmlformats.org/presentationml/2006/main">
   <p:cSld>
     <p:spTree>
@@ -9140,7 +8729,7 @@
 </p:sld>
 </file>
 
-<file path=ppt/slides/slide27.xml><?xml version="1.0" encoding="utf-8"?>
+<file path=ppt/slides/slide24.xml><?xml version="1.0" encoding="utf-8"?>
 <p:sld xmlns:a="http://schemas.openxmlformats.org/drawingml/2006/main" xmlns:r="http://schemas.openxmlformats.org/officeDocument/2006/relationships" xmlns:p="http://schemas.openxmlformats.org/presentationml/2006/main">
   <p:cSld>
     <p:spTree>
@@ -9310,142 +8899,7 @@
 </p:sld>
 </file>
 
-<file path=ppt/slides/slide28.xml><?xml version="1.0" encoding="utf-8"?>
-<p:sld xmlns:a="http://schemas.openxmlformats.org/drawingml/2006/main" xmlns:r="http://schemas.openxmlformats.org/officeDocument/2006/relationships" xmlns:p="http://schemas.openxmlformats.org/presentationml/2006/main">
-  <p:cSld>
-    <p:spTree>
-      <p:nvGrpSpPr>
-        <p:cNvPr id="1" name=""/>
-        <p:cNvGrpSpPr/>
-        <p:nvPr/>
-      </p:nvGrpSpPr>
-      <p:grpSpPr>
-        <a:xfrm>
-          <a:off x="0" y="0"/>
-          <a:ext cx="0" cy="0"/>
-          <a:chOff x="0" y="0"/>
-          <a:chExt cx="0" cy="0"/>
-        </a:xfrm>
-      </p:grpSpPr>
-      <p:sp>
-        <p:nvSpPr>
-          <p:cNvPr id="2" name="Título 1">
-            <a:extLst>
-              <a:ext uri="{FF2B5EF4-FFF2-40B4-BE49-F238E27FC236}">
-                <a16:creationId xmlns:a16="http://schemas.microsoft.com/office/drawing/2014/main" id="{713C02B5-CD52-4C57-A973-686529F05156}"/>
-              </a:ext>
-            </a:extLst>
-          </p:cNvPr>
-          <p:cNvSpPr>
-            <a:spLocks noGrp="1"/>
-          </p:cNvSpPr>
-          <p:nvPr>
-            <p:ph type="title"/>
-          </p:nvPr>
-        </p:nvSpPr>
-        <p:spPr/>
-        <p:txBody>
-          <a:bodyPr/>
-          <a:lstStyle/>
-          <a:p>
-            <a:r>
-              <a:rPr lang="es-ES" dirty="0"/>
-              <a:t>2.3. Tercera iteración: </a:t>
-            </a:r>
-            <a:r>
-              <a:rPr lang="es-ES" dirty="0" err="1"/>
-              <a:t>pre-procesado</a:t>
-            </a:r>
-            <a:endParaRPr lang="es-ES" dirty="0"/>
-          </a:p>
-        </p:txBody>
-      </p:sp>
-      <p:sp>
-        <p:nvSpPr>
-          <p:cNvPr id="3" name="Marcador de contenido 2">
-            <a:extLst>
-              <a:ext uri="{FF2B5EF4-FFF2-40B4-BE49-F238E27FC236}">
-                <a16:creationId xmlns:a16="http://schemas.microsoft.com/office/drawing/2014/main" id="{C04CABB0-F69E-47FE-82C9-C9022F4AE937}"/>
-              </a:ext>
-            </a:extLst>
-          </p:cNvPr>
-          <p:cNvSpPr>
-            <a:spLocks noGrp="1"/>
-          </p:cNvSpPr>
-          <p:nvPr>
-            <p:ph idx="1"/>
-          </p:nvPr>
-        </p:nvSpPr>
-        <p:spPr>
-          <a:xfrm>
-            <a:off x="838200" y="1815783"/>
-            <a:ext cx="10515600" cy="4351338"/>
-          </a:xfrm>
-        </p:spPr>
-        <p:txBody>
-          <a:bodyPr/>
-          <a:lstStyle/>
-          <a:p>
-            <a:r>
-              <a:rPr lang="es-ES" dirty="0"/>
-              <a:t>Cambiar de columna </a:t>
-            </a:r>
-            <a:r>
-              <a:rPr lang="es-ES" dirty="0" err="1"/>
-              <a:t>label</a:t>
-            </a:r>
-            <a:r>
-              <a:rPr lang="es-ES" dirty="0"/>
-              <a:t> </a:t>
-            </a:r>
-            <a:r>
-              <a:rPr lang="es-ES" dirty="0">
-                <a:sym typeface="Wingdings" panose="05000000000000000000" pitchFamily="2" charset="2"/>
-              </a:rPr>
-              <a:t> Juntar dos columnas</a:t>
-            </a:r>
-          </a:p>
-          <a:p>
-            <a:pPr lvl="1"/>
-            <a:r>
-              <a:rPr lang="en-US" i="1" dirty="0"/>
-              <a:t>If yes, what condition(s) have you been diagnosed with?</a:t>
-            </a:r>
-            <a:endParaRPr lang="es-ES" dirty="0"/>
-          </a:p>
-          <a:p>
-            <a:pPr lvl="1"/>
-            <a:r>
-              <a:rPr lang="en-US" i="1" dirty="0"/>
-              <a:t>If maybe, what condition(s) do you believe you have?</a:t>
-            </a:r>
-            <a:endParaRPr lang="es-ES" dirty="0"/>
-          </a:p>
-          <a:p>
-            <a:endParaRPr lang="es-ES" dirty="0"/>
-          </a:p>
-          <a:p>
-            <a:endParaRPr lang="es-ES" dirty="0"/>
-          </a:p>
-          <a:p>
-            <a:endParaRPr lang="es-ES" dirty="0"/>
-          </a:p>
-        </p:txBody>
-      </p:sp>
-    </p:spTree>
-    <p:extLst>
-      <p:ext uri="{BB962C8B-B14F-4D97-AF65-F5344CB8AC3E}">
-        <p14:creationId xmlns:p14="http://schemas.microsoft.com/office/powerpoint/2010/main" val="2281107628"/>
-      </p:ext>
-    </p:extLst>
-  </p:cSld>
-  <p:clrMapOvr>
-    <a:masterClrMapping/>
-  </p:clrMapOvr>
-</p:sld>
-</file>
-
-<file path=ppt/slides/slide29.xml><?xml version="1.0" encoding="utf-8"?>
+<file path=ppt/slides/slide25.xml><?xml version="1.0" encoding="utf-8"?>
 <p:sld xmlns:a="http://schemas.openxmlformats.org/drawingml/2006/main" xmlns:r="http://schemas.openxmlformats.org/officeDocument/2006/relationships" xmlns:p="http://schemas.openxmlformats.org/presentationml/2006/main">
   <p:cSld>
     <p:spTree>
@@ -9610,6 +9064,588 @@
     <p:extLst>
       <p:ext uri="{BB962C8B-B14F-4D97-AF65-F5344CB8AC3E}">
         <p14:creationId xmlns:p14="http://schemas.microsoft.com/office/powerpoint/2010/main" val="77169741"/>
+      </p:ext>
+    </p:extLst>
+  </p:cSld>
+  <p:clrMapOvr>
+    <a:masterClrMapping/>
+  </p:clrMapOvr>
+</p:sld>
+</file>
+
+<file path=ppt/slides/slide26.xml><?xml version="1.0" encoding="utf-8"?>
+<p:sld xmlns:a="http://schemas.openxmlformats.org/drawingml/2006/main" xmlns:r="http://schemas.openxmlformats.org/officeDocument/2006/relationships" xmlns:p="http://schemas.openxmlformats.org/presentationml/2006/main">
+  <p:cSld>
+    <p:spTree>
+      <p:nvGrpSpPr>
+        <p:cNvPr id="1" name=""/>
+        <p:cNvGrpSpPr/>
+        <p:nvPr/>
+      </p:nvGrpSpPr>
+      <p:grpSpPr>
+        <a:xfrm>
+          <a:off x="0" y="0"/>
+          <a:ext cx="0" cy="0"/>
+          <a:chOff x="0" y="0"/>
+          <a:chExt cx="0" cy="0"/>
+        </a:xfrm>
+      </p:grpSpPr>
+      <p:sp>
+        <p:nvSpPr>
+          <p:cNvPr id="2" name="Título 1">
+            <a:extLst>
+              <a:ext uri="{FF2B5EF4-FFF2-40B4-BE49-F238E27FC236}">
+                <a16:creationId xmlns:a16="http://schemas.microsoft.com/office/drawing/2014/main" id="{713C02B5-CD52-4C57-A973-686529F05156}"/>
+              </a:ext>
+            </a:extLst>
+          </p:cNvPr>
+          <p:cNvSpPr>
+            <a:spLocks noGrp="1"/>
+          </p:cNvSpPr>
+          <p:nvPr>
+            <p:ph type="title"/>
+          </p:nvPr>
+        </p:nvSpPr>
+        <p:spPr/>
+        <p:txBody>
+          <a:bodyPr/>
+          <a:lstStyle/>
+          <a:p>
+            <a:r>
+              <a:rPr lang="es-ES" dirty="0"/>
+              <a:t>2.3. Tercera iteración: data </a:t>
+            </a:r>
+            <a:r>
+              <a:rPr lang="es-ES" dirty="0" err="1"/>
+              <a:t>mining</a:t>
+            </a:r>
+            <a:endParaRPr lang="es-ES" dirty="0"/>
+          </a:p>
+        </p:txBody>
+      </p:sp>
+      <p:sp>
+        <p:nvSpPr>
+          <p:cNvPr id="3" name="Marcador de contenido 2">
+            <a:extLst>
+              <a:ext uri="{FF2B5EF4-FFF2-40B4-BE49-F238E27FC236}">
+                <a16:creationId xmlns:a16="http://schemas.microsoft.com/office/drawing/2014/main" id="{C04CABB0-F69E-47FE-82C9-C9022F4AE937}"/>
+              </a:ext>
+            </a:extLst>
+          </p:cNvPr>
+          <p:cNvSpPr>
+            <a:spLocks noGrp="1"/>
+          </p:cNvSpPr>
+          <p:nvPr>
+            <p:ph idx="1"/>
+          </p:nvPr>
+        </p:nvSpPr>
+        <p:spPr>
+          <a:xfrm>
+            <a:off x="838200" y="1815783"/>
+            <a:ext cx="10515600" cy="4351338"/>
+          </a:xfrm>
+        </p:spPr>
+        <p:txBody>
+          <a:bodyPr/>
+          <a:lstStyle/>
+          <a:p>
+            <a:r>
+              <a:rPr lang="es-ES" dirty="0"/>
+              <a:t>Árbol de decisión</a:t>
+            </a:r>
+          </a:p>
+        </p:txBody>
+      </p:sp>
+      <p:pic>
+        <p:nvPicPr>
+          <p:cNvPr id="6" name="Imagen 5">
+            <a:extLst>
+              <a:ext uri="{FF2B5EF4-FFF2-40B4-BE49-F238E27FC236}">
+                <a16:creationId xmlns:a16="http://schemas.microsoft.com/office/drawing/2014/main" id="{638835D7-2F54-45BA-B24E-5D9FFD175457}"/>
+              </a:ext>
+            </a:extLst>
+          </p:cNvPr>
+          <p:cNvPicPr/>
+          <p:nvPr/>
+        </p:nvPicPr>
+        <p:blipFill>
+          <a:blip r:embed="rId2"/>
+          <a:stretch>
+            <a:fillRect/>
+          </a:stretch>
+        </p:blipFill>
+        <p:spPr>
+          <a:xfrm>
+            <a:off x="1596971" y="2267628"/>
+            <a:ext cx="8048069" cy="4351337"/>
+          </a:xfrm>
+          <a:prstGeom prst="rect">
+            <a:avLst/>
+          </a:prstGeom>
+        </p:spPr>
+      </p:pic>
+    </p:spTree>
+    <p:extLst>
+      <p:ext uri="{BB962C8B-B14F-4D97-AF65-F5344CB8AC3E}">
+        <p14:creationId xmlns:p14="http://schemas.microsoft.com/office/powerpoint/2010/main" val="2580939046"/>
+      </p:ext>
+    </p:extLst>
+  </p:cSld>
+  <p:clrMapOvr>
+    <a:masterClrMapping/>
+  </p:clrMapOvr>
+</p:sld>
+</file>
+
+<file path=ppt/slides/slide27.xml><?xml version="1.0" encoding="utf-8"?>
+<p:sld xmlns:a="http://schemas.openxmlformats.org/drawingml/2006/main" xmlns:r="http://schemas.openxmlformats.org/officeDocument/2006/relationships" xmlns:p="http://schemas.openxmlformats.org/presentationml/2006/main">
+  <p:cSld>
+    <p:spTree>
+      <p:nvGrpSpPr>
+        <p:cNvPr id="1" name=""/>
+        <p:cNvGrpSpPr/>
+        <p:nvPr/>
+      </p:nvGrpSpPr>
+      <p:grpSpPr>
+        <a:xfrm>
+          <a:off x="0" y="0"/>
+          <a:ext cx="0" cy="0"/>
+          <a:chOff x="0" y="0"/>
+          <a:chExt cx="0" cy="0"/>
+        </a:xfrm>
+      </p:grpSpPr>
+      <p:sp>
+        <p:nvSpPr>
+          <p:cNvPr id="2" name="Título 1">
+            <a:extLst>
+              <a:ext uri="{FF2B5EF4-FFF2-40B4-BE49-F238E27FC236}">
+                <a16:creationId xmlns:a16="http://schemas.microsoft.com/office/drawing/2014/main" id="{713C02B5-CD52-4C57-A973-686529F05156}"/>
+              </a:ext>
+            </a:extLst>
+          </p:cNvPr>
+          <p:cNvSpPr>
+            <a:spLocks noGrp="1"/>
+          </p:cNvSpPr>
+          <p:nvPr>
+            <p:ph type="title"/>
+          </p:nvPr>
+        </p:nvSpPr>
+        <p:spPr/>
+        <p:txBody>
+          <a:bodyPr/>
+          <a:lstStyle/>
+          <a:p>
+            <a:r>
+              <a:rPr lang="es-ES" dirty="0"/>
+              <a:t>2.3. Tercera iteración: data </a:t>
+            </a:r>
+            <a:r>
+              <a:rPr lang="es-ES" dirty="0" err="1"/>
+              <a:t>mining</a:t>
+            </a:r>
+            <a:endParaRPr lang="es-ES" dirty="0"/>
+          </a:p>
+        </p:txBody>
+      </p:sp>
+      <p:sp>
+        <p:nvSpPr>
+          <p:cNvPr id="3" name="Marcador de contenido 2">
+            <a:extLst>
+              <a:ext uri="{FF2B5EF4-FFF2-40B4-BE49-F238E27FC236}">
+                <a16:creationId xmlns:a16="http://schemas.microsoft.com/office/drawing/2014/main" id="{C04CABB0-F69E-47FE-82C9-C9022F4AE937}"/>
+              </a:ext>
+            </a:extLst>
+          </p:cNvPr>
+          <p:cNvSpPr>
+            <a:spLocks noGrp="1"/>
+          </p:cNvSpPr>
+          <p:nvPr>
+            <p:ph idx="1"/>
+          </p:nvPr>
+        </p:nvSpPr>
+        <p:spPr>
+          <a:xfrm>
+            <a:off x="838200" y="1815783"/>
+            <a:ext cx="10515600" cy="4351338"/>
+          </a:xfrm>
+        </p:spPr>
+        <p:txBody>
+          <a:bodyPr/>
+          <a:lstStyle/>
+          <a:p>
+            <a:pPr marL="0" indent="0">
+              <a:buNone/>
+            </a:pPr>
+            <a:r>
+              <a:rPr lang="es-ES" sz="2000" dirty="0"/>
+              <a:t>CONCLUSIONES</a:t>
+            </a:r>
+          </a:p>
+          <a:p>
+            <a:r>
+              <a:rPr lang="es-ES" dirty="0"/>
+              <a:t>“Mala” iteración: las clases estaban muy desbalanceadas</a:t>
+            </a:r>
+          </a:p>
+          <a:p>
+            <a:endParaRPr lang="es-ES" dirty="0"/>
+          </a:p>
+          <a:p>
+            <a:endParaRPr lang="es-ES" dirty="0"/>
+          </a:p>
+          <a:p>
+            <a:endParaRPr lang="es-ES" dirty="0"/>
+          </a:p>
+          <a:p>
+            <a:endParaRPr lang="es-ES" dirty="0"/>
+          </a:p>
+          <a:p>
+            <a:endParaRPr lang="es-ES" dirty="0"/>
+          </a:p>
+          <a:p>
+            <a:endParaRPr lang="es-ES" dirty="0"/>
+          </a:p>
+          <a:p>
+            <a:pPr marL="0" indent="0">
+              <a:buNone/>
+            </a:pPr>
+            <a:r>
+              <a:rPr lang="es-ES" sz="3600" dirty="0"/>
+              <a:t>							¡Otra iteración!</a:t>
+            </a:r>
+          </a:p>
+        </p:txBody>
+      </p:sp>
+    </p:spTree>
+    <p:extLst>
+      <p:ext uri="{BB962C8B-B14F-4D97-AF65-F5344CB8AC3E}">
+        <p14:creationId xmlns:p14="http://schemas.microsoft.com/office/powerpoint/2010/main" val="976396462"/>
+      </p:ext>
+    </p:extLst>
+  </p:cSld>
+  <p:clrMapOvr>
+    <a:masterClrMapping/>
+  </p:clrMapOvr>
+</p:sld>
+</file>
+
+<file path=ppt/slides/slide28.xml><?xml version="1.0" encoding="utf-8"?>
+<p:sld xmlns:a="http://schemas.openxmlformats.org/drawingml/2006/main" xmlns:r="http://schemas.openxmlformats.org/officeDocument/2006/relationships" xmlns:p="http://schemas.openxmlformats.org/presentationml/2006/main">
+  <p:cSld>
+    <p:spTree>
+      <p:nvGrpSpPr>
+        <p:cNvPr id="1" name=""/>
+        <p:cNvGrpSpPr/>
+        <p:nvPr/>
+      </p:nvGrpSpPr>
+      <p:grpSpPr>
+        <a:xfrm>
+          <a:off x="0" y="0"/>
+          <a:ext cx="0" cy="0"/>
+          <a:chOff x="0" y="0"/>
+          <a:chExt cx="0" cy="0"/>
+        </a:xfrm>
+      </p:grpSpPr>
+      <p:sp>
+        <p:nvSpPr>
+          <p:cNvPr id="2" name="Título 1">
+            <a:extLst>
+              <a:ext uri="{FF2B5EF4-FFF2-40B4-BE49-F238E27FC236}">
+                <a16:creationId xmlns:a16="http://schemas.microsoft.com/office/drawing/2014/main" id="{1AEF56AF-E1B2-403A-BB67-76874287F5FF}"/>
+              </a:ext>
+            </a:extLst>
+          </p:cNvPr>
+          <p:cNvSpPr>
+            <a:spLocks noGrp="1"/>
+          </p:cNvSpPr>
+          <p:nvPr>
+            <p:ph type="title"/>
+          </p:nvPr>
+        </p:nvSpPr>
+        <p:spPr/>
+        <p:txBody>
+          <a:bodyPr/>
+          <a:lstStyle/>
+          <a:p>
+            <a:r>
+              <a:rPr lang="es-ES" dirty="0"/>
+              <a:t>2.4. Cuarta iteración: </a:t>
+            </a:r>
+            <a:r>
+              <a:rPr lang="es-ES" dirty="0" err="1"/>
+              <a:t>pre-procesado</a:t>
+            </a:r>
+            <a:endParaRPr lang="es-ES" dirty="0"/>
+          </a:p>
+        </p:txBody>
+      </p:sp>
+      <p:sp>
+        <p:nvSpPr>
+          <p:cNvPr id="3" name="Marcador de contenido 2">
+            <a:extLst>
+              <a:ext uri="{FF2B5EF4-FFF2-40B4-BE49-F238E27FC236}">
+                <a16:creationId xmlns:a16="http://schemas.microsoft.com/office/drawing/2014/main" id="{AF23C72D-2C99-4330-BBEF-3DEA75D32DF6}"/>
+              </a:ext>
+            </a:extLst>
+          </p:cNvPr>
+          <p:cNvSpPr>
+            <a:spLocks noGrp="1"/>
+          </p:cNvSpPr>
+          <p:nvPr>
+            <p:ph idx="1"/>
+          </p:nvPr>
+        </p:nvSpPr>
+        <p:spPr>
+          <a:xfrm>
+            <a:off x="677334" y="1930400"/>
+            <a:ext cx="8596668" cy="3880773"/>
+          </a:xfrm>
+        </p:spPr>
+        <p:txBody>
+          <a:bodyPr/>
+          <a:lstStyle/>
+          <a:p>
+            <a:r>
+              <a:rPr lang="es-ES" dirty="0"/>
+              <a:t>Agrupación en 3 clases</a:t>
+            </a:r>
+          </a:p>
+          <a:p>
+            <a:endParaRPr lang="es-ES" dirty="0"/>
+          </a:p>
+          <a:p>
+            <a:endParaRPr lang="es-ES" dirty="0"/>
+          </a:p>
+          <a:p>
+            <a:endParaRPr lang="es-ES" dirty="0"/>
+          </a:p>
+        </p:txBody>
+      </p:sp>
+      <p:pic>
+        <p:nvPicPr>
+          <p:cNvPr id="4" name="Imagen 3">
+            <a:extLst>
+              <a:ext uri="{FF2B5EF4-FFF2-40B4-BE49-F238E27FC236}">
+                <a16:creationId xmlns:a16="http://schemas.microsoft.com/office/drawing/2014/main" id="{165A76E8-7D65-44E4-B8B4-90246A6723CA}"/>
+              </a:ext>
+            </a:extLst>
+          </p:cNvPr>
+          <p:cNvPicPr/>
+          <p:nvPr/>
+        </p:nvPicPr>
+        <p:blipFill>
+          <a:blip r:embed="rId2">
+            <a:extLst>
+              <a:ext uri="{28A0092B-C50C-407E-A947-70E740481C1C}">
+                <a14:useLocalDpi xmlns:a14="http://schemas.microsoft.com/office/drawing/2010/main" val="0"/>
+              </a:ext>
+            </a:extLst>
+          </a:blip>
+          <a:srcRect/>
+          <a:stretch>
+            <a:fillRect/>
+          </a:stretch>
+        </p:blipFill>
+        <p:spPr bwMode="auto">
+          <a:xfrm>
+            <a:off x="2219935" y="2397429"/>
+            <a:ext cx="6953859" cy="4372889"/>
+          </a:xfrm>
+          <a:prstGeom prst="rect">
+            <a:avLst/>
+          </a:prstGeom>
+          <a:noFill/>
+          <a:ln>
+            <a:noFill/>
+          </a:ln>
+        </p:spPr>
+      </p:pic>
+    </p:spTree>
+    <p:extLst>
+      <p:ext uri="{BB962C8B-B14F-4D97-AF65-F5344CB8AC3E}">
+        <p14:creationId xmlns:p14="http://schemas.microsoft.com/office/powerpoint/2010/main" val="2341559564"/>
+      </p:ext>
+    </p:extLst>
+  </p:cSld>
+  <p:clrMapOvr>
+    <a:masterClrMapping/>
+  </p:clrMapOvr>
+</p:sld>
+</file>
+
+<file path=ppt/slides/slide29.xml><?xml version="1.0" encoding="utf-8"?>
+<p:sld xmlns:a="http://schemas.openxmlformats.org/drawingml/2006/main" xmlns:r="http://schemas.openxmlformats.org/officeDocument/2006/relationships" xmlns:p="http://schemas.openxmlformats.org/presentationml/2006/main">
+  <p:cSld>
+    <p:spTree>
+      <p:nvGrpSpPr>
+        <p:cNvPr id="1" name=""/>
+        <p:cNvGrpSpPr/>
+        <p:nvPr/>
+      </p:nvGrpSpPr>
+      <p:grpSpPr>
+        <a:xfrm>
+          <a:off x="0" y="0"/>
+          <a:ext cx="0" cy="0"/>
+          <a:chOff x="0" y="0"/>
+          <a:chExt cx="0" cy="0"/>
+        </a:xfrm>
+      </p:grpSpPr>
+      <p:sp>
+        <p:nvSpPr>
+          <p:cNvPr id="2" name="Título 1">
+            <a:extLst>
+              <a:ext uri="{FF2B5EF4-FFF2-40B4-BE49-F238E27FC236}">
+                <a16:creationId xmlns:a16="http://schemas.microsoft.com/office/drawing/2014/main" id="{1AEF56AF-E1B2-403A-BB67-76874287F5FF}"/>
+              </a:ext>
+            </a:extLst>
+          </p:cNvPr>
+          <p:cNvSpPr>
+            <a:spLocks noGrp="1"/>
+          </p:cNvSpPr>
+          <p:nvPr>
+            <p:ph type="title"/>
+          </p:nvPr>
+        </p:nvSpPr>
+        <p:spPr/>
+        <p:txBody>
+          <a:bodyPr/>
+          <a:lstStyle/>
+          <a:p>
+            <a:r>
+              <a:rPr lang="es-ES" dirty="0"/>
+              <a:t>2.4. Cuarta iteración: data </a:t>
+            </a:r>
+            <a:r>
+              <a:rPr lang="es-ES" dirty="0" err="1"/>
+              <a:t>mining</a:t>
+            </a:r>
+            <a:endParaRPr lang="es-ES" dirty="0"/>
+          </a:p>
+        </p:txBody>
+      </p:sp>
+      <p:sp>
+        <p:nvSpPr>
+          <p:cNvPr id="3" name="Marcador de contenido 2">
+            <a:extLst>
+              <a:ext uri="{FF2B5EF4-FFF2-40B4-BE49-F238E27FC236}">
+                <a16:creationId xmlns:a16="http://schemas.microsoft.com/office/drawing/2014/main" id="{AF23C72D-2C99-4330-BBEF-3DEA75D32DF6}"/>
+              </a:ext>
+            </a:extLst>
+          </p:cNvPr>
+          <p:cNvSpPr>
+            <a:spLocks noGrp="1"/>
+          </p:cNvSpPr>
+          <p:nvPr>
+            <p:ph idx="1"/>
+          </p:nvPr>
+        </p:nvSpPr>
+        <p:spPr>
+          <a:xfrm>
+            <a:off x="677334" y="1930400"/>
+            <a:ext cx="8596668" cy="3880773"/>
+          </a:xfrm>
+        </p:spPr>
+        <p:txBody>
+          <a:bodyPr/>
+          <a:lstStyle/>
+          <a:p>
+            <a:r>
+              <a:rPr lang="es-ES" dirty="0"/>
+              <a:t>Algoritmo KNN</a:t>
+            </a:r>
+          </a:p>
+          <a:p>
+            <a:endParaRPr lang="es-ES" dirty="0"/>
+          </a:p>
+          <a:p>
+            <a:pPr marL="0" indent="0">
+              <a:buNone/>
+            </a:pPr>
+            <a:endParaRPr lang="es-ES" dirty="0"/>
+          </a:p>
+          <a:p>
+            <a:endParaRPr lang="es-ES" dirty="0"/>
+          </a:p>
+          <a:p>
+            <a:endParaRPr lang="es-ES" dirty="0"/>
+          </a:p>
+          <a:p>
+            <a:endParaRPr lang="es-ES" dirty="0"/>
+          </a:p>
+        </p:txBody>
+      </p:sp>
+      <p:pic>
+        <p:nvPicPr>
+          <p:cNvPr id="5" name="Imagen 4">
+            <a:extLst>
+              <a:ext uri="{FF2B5EF4-FFF2-40B4-BE49-F238E27FC236}">
+                <a16:creationId xmlns:a16="http://schemas.microsoft.com/office/drawing/2014/main" id="{13EA131C-C5F0-4B63-8AE8-E57BD1FB42DE}"/>
+              </a:ext>
+            </a:extLst>
+          </p:cNvPr>
+          <p:cNvPicPr/>
+          <p:nvPr/>
+        </p:nvPicPr>
+        <p:blipFill>
+          <a:blip r:embed="rId2">
+            <a:extLst>
+              <a:ext uri="{28A0092B-C50C-407E-A947-70E740481C1C}">
+                <a14:useLocalDpi xmlns:a14="http://schemas.microsoft.com/office/drawing/2010/main" val="0"/>
+              </a:ext>
+            </a:extLst>
+          </a:blip>
+          <a:stretch>
+            <a:fillRect/>
+          </a:stretch>
+        </p:blipFill>
+        <p:spPr>
+          <a:xfrm>
+            <a:off x="874964" y="2479860"/>
+            <a:ext cx="5651095" cy="3582737"/>
+          </a:xfrm>
+          <a:prstGeom prst="rect">
+            <a:avLst/>
+          </a:prstGeom>
+        </p:spPr>
+      </p:pic>
+      <p:pic>
+        <p:nvPicPr>
+          <p:cNvPr id="6" name="Imagen 5">
+            <a:extLst>
+              <a:ext uri="{FF2B5EF4-FFF2-40B4-BE49-F238E27FC236}">
+                <a16:creationId xmlns:a16="http://schemas.microsoft.com/office/drawing/2014/main" id="{5A6C7CE3-F0FD-4ED0-8A95-67D921A6CD97}"/>
+              </a:ext>
+            </a:extLst>
+          </p:cNvPr>
+          <p:cNvPicPr/>
+          <p:nvPr/>
+        </p:nvPicPr>
+        <p:blipFill>
+          <a:blip r:embed="rId3" cstate="print">
+            <a:extLst>
+              <a:ext uri="{28A0092B-C50C-407E-A947-70E740481C1C}">
+                <a14:useLocalDpi xmlns:a14="http://schemas.microsoft.com/office/drawing/2010/main" val="0"/>
+              </a:ext>
+            </a:extLst>
+          </a:blip>
+          <a:stretch>
+            <a:fillRect/>
+          </a:stretch>
+        </p:blipFill>
+        <p:spPr>
+          <a:xfrm>
+            <a:off x="6712014" y="3209098"/>
+            <a:ext cx="4605021" cy="1320800"/>
+          </a:xfrm>
+          <a:prstGeom prst="rect">
+            <a:avLst/>
+          </a:prstGeom>
+        </p:spPr>
+      </p:pic>
+    </p:spTree>
+    <p:extLst>
+      <p:ext uri="{BB962C8B-B14F-4D97-AF65-F5344CB8AC3E}">
+        <p14:creationId xmlns:p14="http://schemas.microsoft.com/office/powerpoint/2010/main" val="1088952648"/>
       </p:ext>
     </p:extLst>
   </p:cSld>
@@ -9863,588 +9899,6 @@
           <p:cNvPr id="2" name="Título 1">
             <a:extLst>
               <a:ext uri="{FF2B5EF4-FFF2-40B4-BE49-F238E27FC236}">
-                <a16:creationId xmlns:a16="http://schemas.microsoft.com/office/drawing/2014/main" id="{713C02B5-CD52-4C57-A973-686529F05156}"/>
-              </a:ext>
-            </a:extLst>
-          </p:cNvPr>
-          <p:cNvSpPr>
-            <a:spLocks noGrp="1"/>
-          </p:cNvSpPr>
-          <p:nvPr>
-            <p:ph type="title"/>
-          </p:nvPr>
-        </p:nvSpPr>
-        <p:spPr/>
-        <p:txBody>
-          <a:bodyPr/>
-          <a:lstStyle/>
-          <a:p>
-            <a:r>
-              <a:rPr lang="es-ES" dirty="0"/>
-              <a:t>2.3. Tercera iteración: data </a:t>
-            </a:r>
-            <a:r>
-              <a:rPr lang="es-ES" dirty="0" err="1"/>
-              <a:t>mining</a:t>
-            </a:r>
-            <a:endParaRPr lang="es-ES" dirty="0"/>
-          </a:p>
-        </p:txBody>
-      </p:sp>
-      <p:sp>
-        <p:nvSpPr>
-          <p:cNvPr id="3" name="Marcador de contenido 2">
-            <a:extLst>
-              <a:ext uri="{FF2B5EF4-FFF2-40B4-BE49-F238E27FC236}">
-                <a16:creationId xmlns:a16="http://schemas.microsoft.com/office/drawing/2014/main" id="{C04CABB0-F69E-47FE-82C9-C9022F4AE937}"/>
-              </a:ext>
-            </a:extLst>
-          </p:cNvPr>
-          <p:cNvSpPr>
-            <a:spLocks noGrp="1"/>
-          </p:cNvSpPr>
-          <p:nvPr>
-            <p:ph idx="1"/>
-          </p:nvPr>
-        </p:nvSpPr>
-        <p:spPr>
-          <a:xfrm>
-            <a:off x="838200" y="1815783"/>
-            <a:ext cx="10515600" cy="4351338"/>
-          </a:xfrm>
-        </p:spPr>
-        <p:txBody>
-          <a:bodyPr/>
-          <a:lstStyle/>
-          <a:p>
-            <a:r>
-              <a:rPr lang="es-ES" dirty="0"/>
-              <a:t>Árbol de decisión</a:t>
-            </a:r>
-          </a:p>
-        </p:txBody>
-      </p:sp>
-      <p:pic>
-        <p:nvPicPr>
-          <p:cNvPr id="6" name="Imagen 5">
-            <a:extLst>
-              <a:ext uri="{FF2B5EF4-FFF2-40B4-BE49-F238E27FC236}">
-                <a16:creationId xmlns:a16="http://schemas.microsoft.com/office/drawing/2014/main" id="{638835D7-2F54-45BA-B24E-5D9FFD175457}"/>
-              </a:ext>
-            </a:extLst>
-          </p:cNvPr>
-          <p:cNvPicPr/>
-          <p:nvPr/>
-        </p:nvPicPr>
-        <p:blipFill>
-          <a:blip r:embed="rId2"/>
-          <a:stretch>
-            <a:fillRect/>
-          </a:stretch>
-        </p:blipFill>
-        <p:spPr>
-          <a:xfrm>
-            <a:off x="1596971" y="2267628"/>
-            <a:ext cx="8048069" cy="4351337"/>
-          </a:xfrm>
-          <a:prstGeom prst="rect">
-            <a:avLst/>
-          </a:prstGeom>
-        </p:spPr>
-      </p:pic>
-    </p:spTree>
-    <p:extLst>
-      <p:ext uri="{BB962C8B-B14F-4D97-AF65-F5344CB8AC3E}">
-        <p14:creationId xmlns:p14="http://schemas.microsoft.com/office/powerpoint/2010/main" val="2580939046"/>
-      </p:ext>
-    </p:extLst>
-  </p:cSld>
-  <p:clrMapOvr>
-    <a:masterClrMapping/>
-  </p:clrMapOvr>
-</p:sld>
-</file>
-
-<file path=ppt/slides/slide31.xml><?xml version="1.0" encoding="utf-8"?>
-<p:sld xmlns:a="http://schemas.openxmlformats.org/drawingml/2006/main" xmlns:r="http://schemas.openxmlformats.org/officeDocument/2006/relationships" xmlns:p="http://schemas.openxmlformats.org/presentationml/2006/main">
-  <p:cSld>
-    <p:spTree>
-      <p:nvGrpSpPr>
-        <p:cNvPr id="1" name=""/>
-        <p:cNvGrpSpPr/>
-        <p:nvPr/>
-      </p:nvGrpSpPr>
-      <p:grpSpPr>
-        <a:xfrm>
-          <a:off x="0" y="0"/>
-          <a:ext cx="0" cy="0"/>
-          <a:chOff x="0" y="0"/>
-          <a:chExt cx="0" cy="0"/>
-        </a:xfrm>
-      </p:grpSpPr>
-      <p:sp>
-        <p:nvSpPr>
-          <p:cNvPr id="2" name="Título 1">
-            <a:extLst>
-              <a:ext uri="{FF2B5EF4-FFF2-40B4-BE49-F238E27FC236}">
-                <a16:creationId xmlns:a16="http://schemas.microsoft.com/office/drawing/2014/main" id="{713C02B5-CD52-4C57-A973-686529F05156}"/>
-              </a:ext>
-            </a:extLst>
-          </p:cNvPr>
-          <p:cNvSpPr>
-            <a:spLocks noGrp="1"/>
-          </p:cNvSpPr>
-          <p:nvPr>
-            <p:ph type="title"/>
-          </p:nvPr>
-        </p:nvSpPr>
-        <p:spPr/>
-        <p:txBody>
-          <a:bodyPr/>
-          <a:lstStyle/>
-          <a:p>
-            <a:r>
-              <a:rPr lang="es-ES" dirty="0"/>
-              <a:t>2.3. Tercera iteración: data </a:t>
-            </a:r>
-            <a:r>
-              <a:rPr lang="es-ES" dirty="0" err="1"/>
-              <a:t>mining</a:t>
-            </a:r>
-            <a:endParaRPr lang="es-ES" dirty="0"/>
-          </a:p>
-        </p:txBody>
-      </p:sp>
-      <p:sp>
-        <p:nvSpPr>
-          <p:cNvPr id="3" name="Marcador de contenido 2">
-            <a:extLst>
-              <a:ext uri="{FF2B5EF4-FFF2-40B4-BE49-F238E27FC236}">
-                <a16:creationId xmlns:a16="http://schemas.microsoft.com/office/drawing/2014/main" id="{C04CABB0-F69E-47FE-82C9-C9022F4AE937}"/>
-              </a:ext>
-            </a:extLst>
-          </p:cNvPr>
-          <p:cNvSpPr>
-            <a:spLocks noGrp="1"/>
-          </p:cNvSpPr>
-          <p:nvPr>
-            <p:ph idx="1"/>
-          </p:nvPr>
-        </p:nvSpPr>
-        <p:spPr>
-          <a:xfrm>
-            <a:off x="838200" y="1815783"/>
-            <a:ext cx="10515600" cy="4351338"/>
-          </a:xfrm>
-        </p:spPr>
-        <p:txBody>
-          <a:bodyPr/>
-          <a:lstStyle/>
-          <a:p>
-            <a:pPr marL="0" indent="0">
-              <a:buNone/>
-            </a:pPr>
-            <a:r>
-              <a:rPr lang="es-ES" sz="2000" dirty="0"/>
-              <a:t>CONCLUSIONES</a:t>
-            </a:r>
-          </a:p>
-          <a:p>
-            <a:r>
-              <a:rPr lang="es-ES" dirty="0"/>
-              <a:t>“Mala” iteración: las clases estaban muy desbalanceadas</a:t>
-            </a:r>
-          </a:p>
-          <a:p>
-            <a:endParaRPr lang="es-ES" dirty="0"/>
-          </a:p>
-          <a:p>
-            <a:endParaRPr lang="es-ES" dirty="0"/>
-          </a:p>
-          <a:p>
-            <a:endParaRPr lang="es-ES" dirty="0"/>
-          </a:p>
-          <a:p>
-            <a:endParaRPr lang="es-ES" dirty="0"/>
-          </a:p>
-          <a:p>
-            <a:endParaRPr lang="es-ES" dirty="0"/>
-          </a:p>
-          <a:p>
-            <a:endParaRPr lang="es-ES" dirty="0"/>
-          </a:p>
-          <a:p>
-            <a:pPr marL="0" indent="0">
-              <a:buNone/>
-            </a:pPr>
-            <a:r>
-              <a:rPr lang="es-ES" sz="3600" dirty="0"/>
-              <a:t>							¡Otra iteración!</a:t>
-            </a:r>
-          </a:p>
-        </p:txBody>
-      </p:sp>
-    </p:spTree>
-    <p:extLst>
-      <p:ext uri="{BB962C8B-B14F-4D97-AF65-F5344CB8AC3E}">
-        <p14:creationId xmlns:p14="http://schemas.microsoft.com/office/powerpoint/2010/main" val="976396462"/>
-      </p:ext>
-    </p:extLst>
-  </p:cSld>
-  <p:clrMapOvr>
-    <a:masterClrMapping/>
-  </p:clrMapOvr>
-</p:sld>
-</file>
-
-<file path=ppt/slides/slide32.xml><?xml version="1.0" encoding="utf-8"?>
-<p:sld xmlns:a="http://schemas.openxmlformats.org/drawingml/2006/main" xmlns:r="http://schemas.openxmlformats.org/officeDocument/2006/relationships" xmlns:p="http://schemas.openxmlformats.org/presentationml/2006/main">
-  <p:cSld>
-    <p:spTree>
-      <p:nvGrpSpPr>
-        <p:cNvPr id="1" name=""/>
-        <p:cNvGrpSpPr/>
-        <p:nvPr/>
-      </p:nvGrpSpPr>
-      <p:grpSpPr>
-        <a:xfrm>
-          <a:off x="0" y="0"/>
-          <a:ext cx="0" cy="0"/>
-          <a:chOff x="0" y="0"/>
-          <a:chExt cx="0" cy="0"/>
-        </a:xfrm>
-      </p:grpSpPr>
-      <p:sp>
-        <p:nvSpPr>
-          <p:cNvPr id="2" name="Título 1">
-            <a:extLst>
-              <a:ext uri="{FF2B5EF4-FFF2-40B4-BE49-F238E27FC236}">
-                <a16:creationId xmlns:a16="http://schemas.microsoft.com/office/drawing/2014/main" id="{1AEF56AF-E1B2-403A-BB67-76874287F5FF}"/>
-              </a:ext>
-            </a:extLst>
-          </p:cNvPr>
-          <p:cNvSpPr>
-            <a:spLocks noGrp="1"/>
-          </p:cNvSpPr>
-          <p:nvPr>
-            <p:ph type="title"/>
-          </p:nvPr>
-        </p:nvSpPr>
-        <p:spPr/>
-        <p:txBody>
-          <a:bodyPr/>
-          <a:lstStyle/>
-          <a:p>
-            <a:r>
-              <a:rPr lang="es-ES" dirty="0"/>
-              <a:t>2.4. Cuarta iteración: </a:t>
-            </a:r>
-            <a:r>
-              <a:rPr lang="es-ES" dirty="0" err="1"/>
-              <a:t>pre-procesado</a:t>
-            </a:r>
-            <a:endParaRPr lang="es-ES" dirty="0"/>
-          </a:p>
-        </p:txBody>
-      </p:sp>
-      <p:sp>
-        <p:nvSpPr>
-          <p:cNvPr id="3" name="Marcador de contenido 2">
-            <a:extLst>
-              <a:ext uri="{FF2B5EF4-FFF2-40B4-BE49-F238E27FC236}">
-                <a16:creationId xmlns:a16="http://schemas.microsoft.com/office/drawing/2014/main" id="{AF23C72D-2C99-4330-BBEF-3DEA75D32DF6}"/>
-              </a:ext>
-            </a:extLst>
-          </p:cNvPr>
-          <p:cNvSpPr>
-            <a:spLocks noGrp="1"/>
-          </p:cNvSpPr>
-          <p:nvPr>
-            <p:ph idx="1"/>
-          </p:nvPr>
-        </p:nvSpPr>
-        <p:spPr>
-          <a:xfrm>
-            <a:off x="677334" y="1930400"/>
-            <a:ext cx="8596668" cy="3880773"/>
-          </a:xfrm>
-        </p:spPr>
-        <p:txBody>
-          <a:bodyPr/>
-          <a:lstStyle/>
-          <a:p>
-            <a:r>
-              <a:rPr lang="es-ES" dirty="0"/>
-              <a:t>Agrupación en 3 clases</a:t>
-            </a:r>
-          </a:p>
-          <a:p>
-            <a:endParaRPr lang="es-ES" dirty="0"/>
-          </a:p>
-          <a:p>
-            <a:endParaRPr lang="es-ES" dirty="0"/>
-          </a:p>
-          <a:p>
-            <a:endParaRPr lang="es-ES" dirty="0"/>
-          </a:p>
-        </p:txBody>
-      </p:sp>
-      <p:pic>
-        <p:nvPicPr>
-          <p:cNvPr id="4" name="Imagen 3">
-            <a:extLst>
-              <a:ext uri="{FF2B5EF4-FFF2-40B4-BE49-F238E27FC236}">
-                <a16:creationId xmlns:a16="http://schemas.microsoft.com/office/drawing/2014/main" id="{165A76E8-7D65-44E4-B8B4-90246A6723CA}"/>
-              </a:ext>
-            </a:extLst>
-          </p:cNvPr>
-          <p:cNvPicPr/>
-          <p:nvPr/>
-        </p:nvPicPr>
-        <p:blipFill>
-          <a:blip r:embed="rId2">
-            <a:extLst>
-              <a:ext uri="{28A0092B-C50C-407E-A947-70E740481C1C}">
-                <a14:useLocalDpi xmlns:a14="http://schemas.microsoft.com/office/drawing/2010/main" val="0"/>
-              </a:ext>
-            </a:extLst>
-          </a:blip>
-          <a:srcRect/>
-          <a:stretch>
-            <a:fillRect/>
-          </a:stretch>
-        </p:blipFill>
-        <p:spPr bwMode="auto">
-          <a:xfrm>
-            <a:off x="2219935" y="2397429"/>
-            <a:ext cx="6953859" cy="4372889"/>
-          </a:xfrm>
-          <a:prstGeom prst="rect">
-            <a:avLst/>
-          </a:prstGeom>
-          <a:noFill/>
-          <a:ln>
-            <a:noFill/>
-          </a:ln>
-        </p:spPr>
-      </p:pic>
-    </p:spTree>
-    <p:extLst>
-      <p:ext uri="{BB962C8B-B14F-4D97-AF65-F5344CB8AC3E}">
-        <p14:creationId xmlns:p14="http://schemas.microsoft.com/office/powerpoint/2010/main" val="2341559564"/>
-      </p:ext>
-    </p:extLst>
-  </p:cSld>
-  <p:clrMapOvr>
-    <a:masterClrMapping/>
-  </p:clrMapOvr>
-</p:sld>
-</file>
-
-<file path=ppt/slides/slide33.xml><?xml version="1.0" encoding="utf-8"?>
-<p:sld xmlns:a="http://schemas.openxmlformats.org/drawingml/2006/main" xmlns:r="http://schemas.openxmlformats.org/officeDocument/2006/relationships" xmlns:p="http://schemas.openxmlformats.org/presentationml/2006/main">
-  <p:cSld>
-    <p:spTree>
-      <p:nvGrpSpPr>
-        <p:cNvPr id="1" name=""/>
-        <p:cNvGrpSpPr/>
-        <p:nvPr/>
-      </p:nvGrpSpPr>
-      <p:grpSpPr>
-        <a:xfrm>
-          <a:off x="0" y="0"/>
-          <a:ext cx="0" cy="0"/>
-          <a:chOff x="0" y="0"/>
-          <a:chExt cx="0" cy="0"/>
-        </a:xfrm>
-      </p:grpSpPr>
-      <p:sp>
-        <p:nvSpPr>
-          <p:cNvPr id="2" name="Título 1">
-            <a:extLst>
-              <a:ext uri="{FF2B5EF4-FFF2-40B4-BE49-F238E27FC236}">
-                <a16:creationId xmlns:a16="http://schemas.microsoft.com/office/drawing/2014/main" id="{1AEF56AF-E1B2-403A-BB67-76874287F5FF}"/>
-              </a:ext>
-            </a:extLst>
-          </p:cNvPr>
-          <p:cNvSpPr>
-            <a:spLocks noGrp="1"/>
-          </p:cNvSpPr>
-          <p:nvPr>
-            <p:ph type="title"/>
-          </p:nvPr>
-        </p:nvSpPr>
-        <p:spPr/>
-        <p:txBody>
-          <a:bodyPr/>
-          <a:lstStyle/>
-          <a:p>
-            <a:r>
-              <a:rPr lang="es-ES" dirty="0"/>
-              <a:t>2.4. Cuarta iteración: data </a:t>
-            </a:r>
-            <a:r>
-              <a:rPr lang="es-ES" dirty="0" err="1"/>
-              <a:t>mining</a:t>
-            </a:r>
-            <a:endParaRPr lang="es-ES" dirty="0"/>
-          </a:p>
-        </p:txBody>
-      </p:sp>
-      <p:sp>
-        <p:nvSpPr>
-          <p:cNvPr id="3" name="Marcador de contenido 2">
-            <a:extLst>
-              <a:ext uri="{FF2B5EF4-FFF2-40B4-BE49-F238E27FC236}">
-                <a16:creationId xmlns:a16="http://schemas.microsoft.com/office/drawing/2014/main" id="{AF23C72D-2C99-4330-BBEF-3DEA75D32DF6}"/>
-              </a:ext>
-            </a:extLst>
-          </p:cNvPr>
-          <p:cNvSpPr>
-            <a:spLocks noGrp="1"/>
-          </p:cNvSpPr>
-          <p:nvPr>
-            <p:ph idx="1"/>
-          </p:nvPr>
-        </p:nvSpPr>
-        <p:spPr>
-          <a:xfrm>
-            <a:off x="677334" y="1930400"/>
-            <a:ext cx="8596668" cy="3880773"/>
-          </a:xfrm>
-        </p:spPr>
-        <p:txBody>
-          <a:bodyPr/>
-          <a:lstStyle/>
-          <a:p>
-            <a:r>
-              <a:rPr lang="es-ES" dirty="0"/>
-              <a:t>Algoritmo KNN</a:t>
-            </a:r>
-          </a:p>
-          <a:p>
-            <a:endParaRPr lang="es-ES" dirty="0"/>
-          </a:p>
-          <a:p>
-            <a:pPr marL="0" indent="0">
-              <a:buNone/>
-            </a:pPr>
-            <a:endParaRPr lang="es-ES" dirty="0"/>
-          </a:p>
-          <a:p>
-            <a:endParaRPr lang="es-ES" dirty="0"/>
-          </a:p>
-          <a:p>
-            <a:endParaRPr lang="es-ES" dirty="0"/>
-          </a:p>
-          <a:p>
-            <a:endParaRPr lang="es-ES" dirty="0"/>
-          </a:p>
-        </p:txBody>
-      </p:sp>
-      <p:pic>
-        <p:nvPicPr>
-          <p:cNvPr id="5" name="Imagen 4">
-            <a:extLst>
-              <a:ext uri="{FF2B5EF4-FFF2-40B4-BE49-F238E27FC236}">
-                <a16:creationId xmlns:a16="http://schemas.microsoft.com/office/drawing/2014/main" id="{13EA131C-C5F0-4B63-8AE8-E57BD1FB42DE}"/>
-              </a:ext>
-            </a:extLst>
-          </p:cNvPr>
-          <p:cNvPicPr/>
-          <p:nvPr/>
-        </p:nvPicPr>
-        <p:blipFill>
-          <a:blip r:embed="rId2">
-            <a:extLst>
-              <a:ext uri="{28A0092B-C50C-407E-A947-70E740481C1C}">
-                <a14:useLocalDpi xmlns:a14="http://schemas.microsoft.com/office/drawing/2010/main" val="0"/>
-              </a:ext>
-            </a:extLst>
-          </a:blip>
-          <a:stretch>
-            <a:fillRect/>
-          </a:stretch>
-        </p:blipFill>
-        <p:spPr>
-          <a:xfrm>
-            <a:off x="874964" y="2479860"/>
-            <a:ext cx="5651095" cy="3582737"/>
-          </a:xfrm>
-          <a:prstGeom prst="rect">
-            <a:avLst/>
-          </a:prstGeom>
-        </p:spPr>
-      </p:pic>
-      <p:pic>
-        <p:nvPicPr>
-          <p:cNvPr id="6" name="Imagen 5">
-            <a:extLst>
-              <a:ext uri="{FF2B5EF4-FFF2-40B4-BE49-F238E27FC236}">
-                <a16:creationId xmlns:a16="http://schemas.microsoft.com/office/drawing/2014/main" id="{5A6C7CE3-F0FD-4ED0-8A95-67D921A6CD97}"/>
-              </a:ext>
-            </a:extLst>
-          </p:cNvPr>
-          <p:cNvPicPr/>
-          <p:nvPr/>
-        </p:nvPicPr>
-        <p:blipFill>
-          <a:blip r:embed="rId3" cstate="print">
-            <a:extLst>
-              <a:ext uri="{28A0092B-C50C-407E-A947-70E740481C1C}">
-                <a14:useLocalDpi xmlns:a14="http://schemas.microsoft.com/office/drawing/2010/main" val="0"/>
-              </a:ext>
-            </a:extLst>
-          </a:blip>
-          <a:stretch>
-            <a:fillRect/>
-          </a:stretch>
-        </p:blipFill>
-        <p:spPr>
-          <a:xfrm>
-            <a:off x="6712014" y="3209098"/>
-            <a:ext cx="4605021" cy="1320800"/>
-          </a:xfrm>
-          <a:prstGeom prst="rect">
-            <a:avLst/>
-          </a:prstGeom>
-        </p:spPr>
-      </p:pic>
-    </p:spTree>
-    <p:extLst>
-      <p:ext uri="{BB962C8B-B14F-4D97-AF65-F5344CB8AC3E}">
-        <p14:creationId xmlns:p14="http://schemas.microsoft.com/office/powerpoint/2010/main" val="1088952648"/>
-      </p:ext>
-    </p:extLst>
-  </p:cSld>
-  <p:clrMapOvr>
-    <a:masterClrMapping/>
-  </p:clrMapOvr>
-</p:sld>
-</file>
-
-<file path=ppt/slides/slide34.xml><?xml version="1.0" encoding="utf-8"?>
-<p:sld xmlns:a="http://schemas.openxmlformats.org/drawingml/2006/main" xmlns:r="http://schemas.openxmlformats.org/officeDocument/2006/relationships" xmlns:p="http://schemas.openxmlformats.org/presentationml/2006/main">
-  <p:cSld>
-    <p:spTree>
-      <p:nvGrpSpPr>
-        <p:cNvPr id="1" name=""/>
-        <p:cNvGrpSpPr/>
-        <p:nvPr/>
-      </p:nvGrpSpPr>
-      <p:grpSpPr>
-        <a:xfrm>
-          <a:off x="0" y="0"/>
-          <a:ext cx="0" cy="0"/>
-          <a:chOff x="0" y="0"/>
-          <a:chExt cx="0" cy="0"/>
-        </a:xfrm>
-      </p:grpSpPr>
-      <p:sp>
-        <p:nvSpPr>
-          <p:cNvPr id="2" name="Título 1">
-            <a:extLst>
-              <a:ext uri="{FF2B5EF4-FFF2-40B4-BE49-F238E27FC236}">
                 <a16:creationId xmlns:a16="http://schemas.microsoft.com/office/drawing/2014/main" id="{1AEF56AF-E1B2-403A-BB67-76874287F5FF}"/>
               </a:ext>
             </a:extLst>
@@ -10574,6 +10028,563 @@
 </p:sld>
 </file>
 
+<file path=ppt/slides/slide31.xml><?xml version="1.0" encoding="utf-8"?>
+<p:sld xmlns:a="http://schemas.openxmlformats.org/drawingml/2006/main" xmlns:r="http://schemas.openxmlformats.org/officeDocument/2006/relationships" xmlns:p="http://schemas.openxmlformats.org/presentationml/2006/main">
+  <p:cSld>
+    <p:spTree>
+      <p:nvGrpSpPr>
+        <p:cNvPr id="1" name=""/>
+        <p:cNvGrpSpPr/>
+        <p:nvPr/>
+      </p:nvGrpSpPr>
+      <p:grpSpPr>
+        <a:xfrm>
+          <a:off x="0" y="0"/>
+          <a:ext cx="0" cy="0"/>
+          <a:chOff x="0" y="0"/>
+          <a:chExt cx="0" cy="0"/>
+        </a:xfrm>
+      </p:grpSpPr>
+      <p:sp>
+        <p:nvSpPr>
+          <p:cNvPr id="2" name="Título 1">
+            <a:extLst>
+              <a:ext uri="{FF2B5EF4-FFF2-40B4-BE49-F238E27FC236}">
+                <a16:creationId xmlns:a16="http://schemas.microsoft.com/office/drawing/2014/main" id="{278991C6-B626-48DD-9042-FB1F7ECED3CF}"/>
+              </a:ext>
+            </a:extLst>
+          </p:cNvPr>
+          <p:cNvSpPr>
+            <a:spLocks noGrp="1"/>
+          </p:cNvSpPr>
+          <p:nvPr>
+            <p:ph type="title"/>
+          </p:nvPr>
+        </p:nvSpPr>
+        <p:spPr/>
+        <p:txBody>
+          <a:bodyPr/>
+          <a:lstStyle/>
+          <a:p>
+            <a:r>
+              <a:rPr lang="es-ES" dirty="0"/>
+              <a:t>2.4. Cuarta iteración: conclusiones</a:t>
+            </a:r>
+          </a:p>
+        </p:txBody>
+      </p:sp>
+      <p:sp>
+        <p:nvSpPr>
+          <p:cNvPr id="3" name="Marcador de contenido 2">
+            <a:extLst>
+              <a:ext uri="{FF2B5EF4-FFF2-40B4-BE49-F238E27FC236}">
+                <a16:creationId xmlns:a16="http://schemas.microsoft.com/office/drawing/2014/main" id="{F11EB9E3-5565-4D5C-B2A4-2E390E46425F}"/>
+              </a:ext>
+            </a:extLst>
+          </p:cNvPr>
+          <p:cNvSpPr>
+            <a:spLocks noGrp="1"/>
+          </p:cNvSpPr>
+          <p:nvPr>
+            <p:ph idx="1"/>
+          </p:nvPr>
+        </p:nvSpPr>
+        <p:spPr>
+          <a:xfrm>
+            <a:off x="677334" y="1930400"/>
+            <a:ext cx="8596668" cy="3880773"/>
+          </a:xfrm>
+        </p:spPr>
+        <p:txBody>
+          <a:bodyPr/>
+          <a:lstStyle/>
+          <a:p>
+            <a:r>
+              <a:rPr lang="es-ES" dirty="0"/>
+              <a:t>Es la iteración que mejores resultados ha conseguido:</a:t>
+            </a:r>
+          </a:p>
+          <a:p>
+            <a:endParaRPr lang="es-ES" dirty="0"/>
+          </a:p>
+          <a:p>
+            <a:endParaRPr lang="es-ES" dirty="0"/>
+          </a:p>
+          <a:p>
+            <a:pPr marL="0" indent="0" algn="ctr">
+              <a:buNone/>
+            </a:pPr>
+            <a:r>
+              <a:rPr lang="es-ES" sz="2800" dirty="0"/>
+              <a:t>¡83.5% </a:t>
+            </a:r>
+            <a:r>
+              <a:rPr lang="es-ES" sz="2800" i="1" dirty="0" err="1"/>
+              <a:t>accuracy</a:t>
+            </a:r>
+            <a:r>
+              <a:rPr lang="es-ES" sz="2800" i="1" dirty="0"/>
+              <a:t>!</a:t>
+            </a:r>
+          </a:p>
+          <a:p>
+            <a:pPr marL="0" indent="0" algn="ctr">
+              <a:buNone/>
+            </a:pPr>
+            <a:endParaRPr lang="es-ES" sz="2800" i="1" dirty="0"/>
+          </a:p>
+          <a:p>
+            <a:pPr marL="0" indent="0">
+              <a:buNone/>
+            </a:pPr>
+            <a:endParaRPr lang="es-ES" sz="2800" i="1" dirty="0"/>
+          </a:p>
+        </p:txBody>
+      </p:sp>
+    </p:spTree>
+    <p:extLst>
+      <p:ext uri="{BB962C8B-B14F-4D97-AF65-F5344CB8AC3E}">
+        <p14:creationId xmlns:p14="http://schemas.microsoft.com/office/powerpoint/2010/main" val="166385472"/>
+      </p:ext>
+    </p:extLst>
+  </p:cSld>
+  <p:clrMapOvr>
+    <a:masterClrMapping/>
+  </p:clrMapOvr>
+</p:sld>
+</file>
+
+<file path=ppt/slides/slide32.xml><?xml version="1.0" encoding="utf-8"?>
+<p:sld xmlns:a="http://schemas.openxmlformats.org/drawingml/2006/main" xmlns:r="http://schemas.openxmlformats.org/officeDocument/2006/relationships" xmlns:p="http://schemas.openxmlformats.org/presentationml/2006/main">
+  <p:cSld>
+    <p:spTree>
+      <p:nvGrpSpPr>
+        <p:cNvPr id="1" name=""/>
+        <p:cNvGrpSpPr/>
+        <p:nvPr/>
+      </p:nvGrpSpPr>
+      <p:grpSpPr>
+        <a:xfrm>
+          <a:off x="0" y="0"/>
+          <a:ext cx="0" cy="0"/>
+          <a:chOff x="0" y="0"/>
+          <a:chExt cx="0" cy="0"/>
+        </a:xfrm>
+      </p:grpSpPr>
+      <p:sp>
+        <p:nvSpPr>
+          <p:cNvPr id="2" name="Título 1">
+            <a:extLst>
+              <a:ext uri="{FF2B5EF4-FFF2-40B4-BE49-F238E27FC236}">
+                <a16:creationId xmlns:a16="http://schemas.microsoft.com/office/drawing/2014/main" id="{8E9E77AC-1263-47E0-B404-50B7E866533C}"/>
+              </a:ext>
+            </a:extLst>
+          </p:cNvPr>
+          <p:cNvSpPr>
+            <a:spLocks noGrp="1"/>
+          </p:cNvSpPr>
+          <p:nvPr>
+            <p:ph type="title"/>
+          </p:nvPr>
+        </p:nvSpPr>
+        <p:spPr/>
+        <p:txBody>
+          <a:bodyPr/>
+          <a:lstStyle/>
+          <a:p>
+            <a:r>
+              <a:rPr lang="es-ES" dirty="0"/>
+              <a:t>3. Conclusiones generales</a:t>
+            </a:r>
+          </a:p>
+        </p:txBody>
+      </p:sp>
+      <p:sp>
+        <p:nvSpPr>
+          <p:cNvPr id="3" name="Marcador de contenido 2">
+            <a:extLst>
+              <a:ext uri="{FF2B5EF4-FFF2-40B4-BE49-F238E27FC236}">
+                <a16:creationId xmlns:a16="http://schemas.microsoft.com/office/drawing/2014/main" id="{0B51FE8A-E64A-4D8F-BB06-5696712B92FE}"/>
+              </a:ext>
+            </a:extLst>
+          </p:cNvPr>
+          <p:cNvSpPr>
+            <a:spLocks noGrp="1"/>
+          </p:cNvSpPr>
+          <p:nvPr>
+            <p:ph idx="1"/>
+          </p:nvPr>
+        </p:nvSpPr>
+        <p:spPr>
+          <a:xfrm>
+            <a:off x="677334" y="1930400"/>
+            <a:ext cx="8596668" cy="3880773"/>
+          </a:xfrm>
+        </p:spPr>
+        <p:txBody>
+          <a:bodyPr/>
+          <a:lstStyle/>
+          <a:p>
+            <a:r>
+              <a:rPr lang="es-ES" dirty="0"/>
+              <a:t>Curiosidad por saber el estado mental de una persona según su ambiente de trabajo</a:t>
+            </a:r>
+          </a:p>
+          <a:p>
+            <a:pPr lvl="1"/>
+            <a:r>
+              <a:rPr lang="es-ES" i="1" dirty="0"/>
+              <a:t>“</a:t>
+            </a:r>
+            <a:r>
+              <a:rPr lang="en-US" i="1" dirty="0"/>
+              <a:t>Do you think that discussing a mental health disorder with your employer would have negative consequences?”</a:t>
+            </a:r>
+            <a:endParaRPr lang="es-ES" i="1" dirty="0"/>
+          </a:p>
+          <a:p>
+            <a:pPr lvl="1"/>
+            <a:r>
+              <a:rPr lang="es-ES" i="1" dirty="0"/>
+              <a:t>“</a:t>
+            </a:r>
+            <a:r>
+              <a:rPr lang="en-US" i="1" dirty="0"/>
+              <a:t>Has your employer ever formally discussed mental health (for example, as part of a wellness campaign or other official communication)?”</a:t>
+            </a:r>
+            <a:endParaRPr lang="es-ES" i="1" dirty="0"/>
+          </a:p>
+          <a:p>
+            <a:pPr lvl="1"/>
+            <a:endParaRPr lang="es-ES" i="1" dirty="0"/>
+          </a:p>
+        </p:txBody>
+      </p:sp>
+    </p:spTree>
+    <p:extLst>
+      <p:ext uri="{BB962C8B-B14F-4D97-AF65-F5344CB8AC3E}">
+        <p14:creationId xmlns:p14="http://schemas.microsoft.com/office/powerpoint/2010/main" val="116903557"/>
+      </p:ext>
+    </p:extLst>
+  </p:cSld>
+  <p:clrMapOvr>
+    <a:masterClrMapping/>
+  </p:clrMapOvr>
+</p:sld>
+</file>
+
+<file path=ppt/slides/slide33.xml><?xml version="1.0" encoding="utf-8"?>
+<p:sld xmlns:a="http://schemas.openxmlformats.org/drawingml/2006/main" xmlns:r="http://schemas.openxmlformats.org/officeDocument/2006/relationships" xmlns:p="http://schemas.openxmlformats.org/presentationml/2006/main">
+  <p:cSld>
+    <p:spTree>
+      <p:nvGrpSpPr>
+        <p:cNvPr id="1" name=""/>
+        <p:cNvGrpSpPr/>
+        <p:nvPr/>
+      </p:nvGrpSpPr>
+      <p:grpSpPr>
+        <a:xfrm>
+          <a:off x="0" y="0"/>
+          <a:ext cx="0" cy="0"/>
+          <a:chOff x="0" y="0"/>
+          <a:chExt cx="0" cy="0"/>
+        </a:xfrm>
+      </p:grpSpPr>
+      <p:sp>
+        <p:nvSpPr>
+          <p:cNvPr id="2" name="Título 1">
+            <a:extLst>
+              <a:ext uri="{FF2B5EF4-FFF2-40B4-BE49-F238E27FC236}">
+                <a16:creationId xmlns:a16="http://schemas.microsoft.com/office/drawing/2014/main" id="{8E9E77AC-1263-47E0-B404-50B7E866533C}"/>
+              </a:ext>
+            </a:extLst>
+          </p:cNvPr>
+          <p:cNvSpPr>
+            <a:spLocks noGrp="1"/>
+          </p:cNvSpPr>
+          <p:nvPr>
+            <p:ph type="title"/>
+          </p:nvPr>
+        </p:nvSpPr>
+        <p:spPr/>
+        <p:txBody>
+          <a:bodyPr/>
+          <a:lstStyle/>
+          <a:p>
+            <a:r>
+              <a:rPr lang="es-ES" dirty="0"/>
+              <a:t>3. Conclusiones generales</a:t>
+            </a:r>
+          </a:p>
+        </p:txBody>
+      </p:sp>
+      <p:sp>
+        <p:nvSpPr>
+          <p:cNvPr id="3" name="Marcador de contenido 2">
+            <a:extLst>
+              <a:ext uri="{FF2B5EF4-FFF2-40B4-BE49-F238E27FC236}">
+                <a16:creationId xmlns:a16="http://schemas.microsoft.com/office/drawing/2014/main" id="{0B51FE8A-E64A-4D8F-BB06-5696712B92FE}"/>
+              </a:ext>
+            </a:extLst>
+          </p:cNvPr>
+          <p:cNvSpPr>
+            <a:spLocks noGrp="1"/>
+          </p:cNvSpPr>
+          <p:nvPr>
+            <p:ph idx="1"/>
+          </p:nvPr>
+        </p:nvSpPr>
+        <p:spPr>
+          <a:xfrm>
+            <a:off x="677334" y="1930400"/>
+            <a:ext cx="8596668" cy="3880773"/>
+          </a:xfrm>
+        </p:spPr>
+        <p:txBody>
+          <a:bodyPr/>
+          <a:lstStyle/>
+          <a:p>
+            <a:r>
+              <a:rPr lang="es-ES" dirty="0"/>
+              <a:t>Curiosidad por saber el estado mental de una persona según su ambiente de trabajo</a:t>
+            </a:r>
+            <a:endParaRPr lang="es-ES" i="1" dirty="0"/>
+          </a:p>
+          <a:p>
+            <a:pPr lvl="1"/>
+            <a:r>
+              <a:rPr lang="es-ES" i="1" dirty="0"/>
+              <a:t>“</a:t>
+            </a:r>
+            <a:r>
+              <a:rPr lang="en-US" i="1" dirty="0"/>
+              <a:t>Do you think that discussing a mental health disorder with your employer would have negative consequences?”</a:t>
+            </a:r>
+            <a:endParaRPr lang="es-ES" i="1" dirty="0"/>
+          </a:p>
+          <a:p>
+            <a:pPr lvl="1"/>
+            <a:r>
+              <a:rPr lang="es-ES" i="1" dirty="0"/>
+              <a:t>“</a:t>
+            </a:r>
+            <a:r>
+              <a:rPr lang="en-US" i="1" dirty="0"/>
+              <a:t>Has your employer ever formally discussed mental health (for example, as part of a wellness campaign or other official communication)?”</a:t>
+            </a:r>
+            <a:endParaRPr lang="es-ES" i="1" dirty="0"/>
+          </a:p>
+          <a:p>
+            <a:pPr lvl="1"/>
+            <a:endParaRPr lang="es-ES" i="1" dirty="0"/>
+          </a:p>
+          <a:p>
+            <a:r>
+              <a:rPr lang="es-ES" dirty="0"/>
+              <a:t>Preguntas más importantes que esas</a:t>
+            </a:r>
+          </a:p>
+          <a:p>
+            <a:pPr lvl="1"/>
+            <a:r>
+              <a:rPr lang="es-ES" dirty="0"/>
+              <a:t>“</a:t>
+            </a:r>
+            <a:r>
+              <a:rPr lang="en-US" i="1" dirty="0"/>
+              <a:t>If you have a mental health issue do you feel that it interferes with your work when NOT being treated effectively?”</a:t>
+            </a:r>
+            <a:endParaRPr lang="es-ES" dirty="0"/>
+          </a:p>
+          <a:p>
+            <a:pPr marL="457200" lvl="1" indent="0">
+              <a:buNone/>
+            </a:pPr>
+            <a:endParaRPr lang="es-ES" dirty="0"/>
+          </a:p>
+          <a:p>
+            <a:pPr lvl="1"/>
+            <a:endParaRPr lang="es-ES" i="1" dirty="0"/>
+          </a:p>
+          <a:p>
+            <a:pPr lvl="1"/>
+            <a:endParaRPr lang="es-ES" i="1" dirty="0"/>
+          </a:p>
+        </p:txBody>
+      </p:sp>
+    </p:spTree>
+    <p:extLst>
+      <p:ext uri="{BB962C8B-B14F-4D97-AF65-F5344CB8AC3E}">
+        <p14:creationId xmlns:p14="http://schemas.microsoft.com/office/powerpoint/2010/main" val="2710937869"/>
+      </p:ext>
+    </p:extLst>
+  </p:cSld>
+  <p:clrMapOvr>
+    <a:masterClrMapping/>
+  </p:clrMapOvr>
+</p:sld>
+</file>
+
+<file path=ppt/slides/slide34.xml><?xml version="1.0" encoding="utf-8"?>
+<p:sld xmlns:a="http://schemas.openxmlformats.org/drawingml/2006/main" xmlns:r="http://schemas.openxmlformats.org/officeDocument/2006/relationships" xmlns:p="http://schemas.openxmlformats.org/presentationml/2006/main">
+  <p:cSld>
+    <p:spTree>
+      <p:nvGrpSpPr>
+        <p:cNvPr id="1" name=""/>
+        <p:cNvGrpSpPr/>
+        <p:nvPr/>
+      </p:nvGrpSpPr>
+      <p:grpSpPr>
+        <a:xfrm>
+          <a:off x="0" y="0"/>
+          <a:ext cx="0" cy="0"/>
+          <a:chOff x="0" y="0"/>
+          <a:chExt cx="0" cy="0"/>
+        </a:xfrm>
+      </p:grpSpPr>
+      <p:sp>
+        <p:nvSpPr>
+          <p:cNvPr id="2" name="Título 1">
+            <a:extLst>
+              <a:ext uri="{FF2B5EF4-FFF2-40B4-BE49-F238E27FC236}">
+                <a16:creationId xmlns:a16="http://schemas.microsoft.com/office/drawing/2014/main" id="{8E9E77AC-1263-47E0-B404-50B7E866533C}"/>
+              </a:ext>
+            </a:extLst>
+          </p:cNvPr>
+          <p:cNvSpPr>
+            <a:spLocks noGrp="1"/>
+          </p:cNvSpPr>
+          <p:nvPr>
+            <p:ph type="title"/>
+          </p:nvPr>
+        </p:nvSpPr>
+        <p:spPr/>
+        <p:txBody>
+          <a:bodyPr/>
+          <a:lstStyle/>
+          <a:p>
+            <a:r>
+              <a:rPr lang="es-ES" dirty="0"/>
+              <a:t>3. Conclusiones generales</a:t>
+            </a:r>
+          </a:p>
+        </p:txBody>
+      </p:sp>
+      <p:sp>
+        <p:nvSpPr>
+          <p:cNvPr id="3" name="Marcador de contenido 2">
+            <a:extLst>
+              <a:ext uri="{FF2B5EF4-FFF2-40B4-BE49-F238E27FC236}">
+                <a16:creationId xmlns:a16="http://schemas.microsoft.com/office/drawing/2014/main" id="{0B51FE8A-E64A-4D8F-BB06-5696712B92FE}"/>
+              </a:ext>
+            </a:extLst>
+          </p:cNvPr>
+          <p:cNvSpPr>
+            <a:spLocks noGrp="1"/>
+          </p:cNvSpPr>
+          <p:nvPr>
+            <p:ph idx="1"/>
+          </p:nvPr>
+        </p:nvSpPr>
+        <p:spPr>
+          <a:xfrm>
+            <a:off x="677334" y="1930400"/>
+            <a:ext cx="8596668" cy="4620712"/>
+          </a:xfrm>
+        </p:spPr>
+        <p:txBody>
+          <a:bodyPr>
+            <a:normAutofit/>
+          </a:bodyPr>
+          <a:lstStyle/>
+          <a:p>
+            <a:r>
+              <a:rPr lang="es-ES" dirty="0"/>
+              <a:t>Curiosidad por saber el estado mental de una persona según su ambiente de trabajo</a:t>
+            </a:r>
+            <a:endParaRPr lang="es-ES" i="1" dirty="0"/>
+          </a:p>
+          <a:p>
+            <a:pPr lvl="1"/>
+            <a:r>
+              <a:rPr lang="es-ES" i="1" dirty="0"/>
+              <a:t>“</a:t>
+            </a:r>
+            <a:r>
+              <a:rPr lang="en-US" i="1" dirty="0"/>
+              <a:t>Do you think that discussing a mental health disorder with your employer would have negative consequences?”</a:t>
+            </a:r>
+            <a:endParaRPr lang="es-ES" i="1" dirty="0"/>
+          </a:p>
+          <a:p>
+            <a:pPr lvl="1"/>
+            <a:r>
+              <a:rPr lang="es-ES" i="1" dirty="0"/>
+              <a:t>“</a:t>
+            </a:r>
+            <a:r>
+              <a:rPr lang="en-US" i="1" dirty="0"/>
+              <a:t>Has your employer ever formally discussed mental health (for example, as part of a wellness campaign or other official communication)?”</a:t>
+            </a:r>
+            <a:endParaRPr lang="es-ES" i="1" dirty="0"/>
+          </a:p>
+          <a:p>
+            <a:pPr lvl="1"/>
+            <a:endParaRPr lang="es-ES" i="1" dirty="0"/>
+          </a:p>
+          <a:p>
+            <a:r>
+              <a:rPr lang="es-ES" dirty="0"/>
+              <a:t>Preguntas más importantes que esas</a:t>
+            </a:r>
+          </a:p>
+          <a:p>
+            <a:pPr lvl="1"/>
+            <a:r>
+              <a:rPr lang="en-US" i="1" dirty="0"/>
+              <a:t>“If you have a mental health issue do you feel that it interferes with your work when NOT being treated effectively?”</a:t>
+            </a:r>
+            <a:endParaRPr lang="es-ES" dirty="0"/>
+          </a:p>
+          <a:p>
+            <a:pPr lvl="1"/>
+            <a:endParaRPr lang="es-ES" i="1" dirty="0"/>
+          </a:p>
+          <a:p>
+            <a:pPr marL="457200" lvl="1" indent="0" algn="ctr">
+              <a:buNone/>
+            </a:pPr>
+            <a:r>
+              <a:rPr lang="es-ES" sz="2800" i="1" dirty="0"/>
+              <a:t>Experiencia</a:t>
+            </a:r>
+            <a:endParaRPr lang="es-ES" sz="2800" dirty="0"/>
+          </a:p>
+          <a:p>
+            <a:pPr marL="457200" lvl="1" indent="0">
+              <a:buNone/>
+            </a:pPr>
+            <a:endParaRPr lang="es-ES" i="1" dirty="0"/>
+          </a:p>
+          <a:p>
+            <a:pPr lvl="1"/>
+            <a:endParaRPr lang="es-ES" i="1" dirty="0"/>
+          </a:p>
+        </p:txBody>
+      </p:sp>
+    </p:spTree>
+    <p:extLst>
+      <p:ext uri="{BB962C8B-B14F-4D97-AF65-F5344CB8AC3E}">
+        <p14:creationId xmlns:p14="http://schemas.microsoft.com/office/powerpoint/2010/main" val="1525357811"/>
+      </p:ext>
+    </p:extLst>
+  </p:cSld>
+  <p:clrMapOvr>
+    <a:masterClrMapping/>
+  </p:clrMapOvr>
+</p:sld>
+</file>
+
 <file path=ppt/slides/slide35.xml><?xml version="1.0" encoding="utf-8"?>
 <p:sld xmlns:a="http://schemas.openxmlformats.org/drawingml/2006/main" xmlns:r="http://schemas.openxmlformats.org/officeDocument/2006/relationships" xmlns:p="http://schemas.openxmlformats.org/presentationml/2006/main">
   <p:cSld>
@@ -10596,7 +10607,7 @@
           <p:cNvPr id="2" name="Título 1">
             <a:extLst>
               <a:ext uri="{FF2B5EF4-FFF2-40B4-BE49-F238E27FC236}">
-                <a16:creationId xmlns:a16="http://schemas.microsoft.com/office/drawing/2014/main" id="{278991C6-B626-48DD-9042-FB1F7ECED3CF}"/>
+                <a16:creationId xmlns:a16="http://schemas.microsoft.com/office/drawing/2014/main" id="{8E9E77AC-1263-47E0-B404-50B7E866533C}"/>
               </a:ext>
             </a:extLst>
           </p:cNvPr>
@@ -10614,7 +10625,7 @@
           <a:p>
             <a:r>
               <a:rPr lang="es-ES" dirty="0"/>
-              <a:t>2.4. Cuarta iteración: conclusiones</a:t>
+              <a:t>3. Conclusiones generales</a:t>
             </a:r>
           </a:p>
         </p:txBody>
@@ -10624,7 +10635,7 @@
           <p:cNvPr id="3" name="Marcador de contenido 2">
             <a:extLst>
               <a:ext uri="{FF2B5EF4-FFF2-40B4-BE49-F238E27FC236}">
-                <a16:creationId xmlns:a16="http://schemas.microsoft.com/office/drawing/2014/main" id="{F11EB9E3-5565-4D5C-B2A4-2E390E46425F}"/>
+                <a16:creationId xmlns:a16="http://schemas.microsoft.com/office/drawing/2014/main" id="{0B51FE8A-E64A-4D8F-BB06-5696712B92FE}"/>
               </a:ext>
             </a:extLst>
           </p:cNvPr>
@@ -10647,50 +10658,85 @@
           <a:p>
             <a:r>
               <a:rPr lang="es-ES" dirty="0"/>
-              <a:t>Es la iteración que mejores resultados ha conseguido:</a:t>
-            </a:r>
-          </a:p>
-          <a:p>
+              <a:t>Dos acercamientos al problema</a:t>
+            </a:r>
+          </a:p>
+          <a:p>
+            <a:pPr lvl="1"/>
+            <a:r>
+              <a:rPr lang="en-US" dirty="0" err="1"/>
+              <a:t>Clasificar</a:t>
+            </a:r>
+            <a:r>
+              <a:rPr lang="en-US" dirty="0"/>
+              <a:t> por “</a:t>
+            </a:r>
+            <a:r>
+              <a:rPr lang="en-US" i="1" dirty="0"/>
+              <a:t>Do you currently have a mental disorder?”</a:t>
+            </a:r>
             <a:endParaRPr lang="es-ES" dirty="0"/>
           </a:p>
           <a:p>
+            <a:pPr lvl="1"/>
+            <a:r>
+              <a:rPr lang="en-US" dirty="0" err="1"/>
+              <a:t>Clasificar</a:t>
+            </a:r>
+            <a:r>
+              <a:rPr lang="en-US" dirty="0"/>
+              <a:t> </a:t>
+            </a:r>
+            <a:r>
+              <a:rPr lang="en-US" dirty="0" err="1"/>
+              <a:t>juntando</a:t>
+            </a:r>
+            <a:r>
+              <a:rPr lang="en-US" dirty="0"/>
+              <a:t> las dos </a:t>
+            </a:r>
+            <a:r>
+              <a:rPr lang="en-US" dirty="0" err="1"/>
+              <a:t>columnas</a:t>
+            </a:r>
+            <a:r>
+              <a:rPr lang="en-US" dirty="0"/>
+              <a:t> “</a:t>
+            </a:r>
+            <a:r>
+              <a:rPr lang="en-US" i="1" dirty="0"/>
+              <a:t>If yes, what condition(s) have you been diagnosed with?” </a:t>
+            </a:r>
+            <a:r>
+              <a:rPr lang="en-US" dirty="0"/>
+              <a:t>y </a:t>
+            </a:r>
+            <a:r>
+              <a:rPr lang="en-US" i="1" dirty="0"/>
+              <a:t>“If maybe, what condition(s) have you been diagnosed with?”</a:t>
+            </a:r>
             <a:endParaRPr lang="es-ES" dirty="0"/>
           </a:p>
           <a:p>
-            <a:pPr marL="0" indent="0" algn="ctr">
+            <a:pPr lvl="1"/>
+            <a:endParaRPr lang="es-ES" dirty="0"/>
+          </a:p>
+          <a:p>
+            <a:pPr marL="457200" lvl="1" indent="0">
               <a:buNone/>
             </a:pPr>
-            <a:r>
-              <a:rPr lang="es-ES" sz="2800" dirty="0"/>
-              <a:t>¡83.5% </a:t>
-            </a:r>
-            <a:r>
-              <a:rPr lang="es-ES" sz="2800" i="1" dirty="0" err="1"/>
-              <a:t>accuracy</a:t>
-            </a:r>
-            <a:r>
-              <a:rPr lang="es-ES" sz="2800" i="1" dirty="0"/>
-              <a:t>!</a:t>
-            </a:r>
-          </a:p>
-          <a:p>
-            <a:pPr marL="0" indent="0" algn="ctr">
-              <a:buNone/>
-            </a:pPr>
-            <a:endParaRPr lang="es-ES" sz="2800" i="1" dirty="0"/>
-          </a:p>
-          <a:p>
-            <a:pPr marL="0" indent="0">
-              <a:buNone/>
-            </a:pPr>
-            <a:endParaRPr lang="es-ES" sz="2800" i="1" dirty="0"/>
+            <a:endParaRPr lang="es-ES" i="1" dirty="0"/>
+          </a:p>
+          <a:p>
+            <a:pPr lvl="1"/>
+            <a:endParaRPr lang="es-ES" i="1" dirty="0"/>
           </a:p>
         </p:txBody>
       </p:sp>
     </p:spTree>
     <p:extLst>
       <p:ext uri="{BB962C8B-B14F-4D97-AF65-F5344CB8AC3E}">
-        <p14:creationId xmlns:p14="http://schemas.microsoft.com/office/powerpoint/2010/main" val="166385472"/>
+        <p14:creationId xmlns:p14="http://schemas.microsoft.com/office/powerpoint/2010/main" val="1660074570"/>
       </p:ext>
     </p:extLst>
   </p:cSld>
@@ -10722,7 +10768,7 @@
           <p:cNvPr id="2" name="Título 1">
             <a:extLst>
               <a:ext uri="{FF2B5EF4-FFF2-40B4-BE49-F238E27FC236}">
-                <a16:creationId xmlns:a16="http://schemas.microsoft.com/office/drawing/2014/main" id="{278991C6-B626-48DD-9042-FB1F7ECED3CF}"/>
+                <a16:creationId xmlns:a16="http://schemas.microsoft.com/office/drawing/2014/main" id="{8E9E77AC-1263-47E0-B404-50B7E866533C}"/>
               </a:ext>
             </a:extLst>
           </p:cNvPr>
@@ -10740,7 +10786,7 @@
           <a:p>
             <a:r>
               <a:rPr lang="es-ES" dirty="0"/>
-              <a:t>2.4. Cuarta iteración: conclusiones</a:t>
+              <a:t>3. Conclusiones generales</a:t>
             </a:r>
           </a:p>
         </p:txBody>
@@ -10750,7 +10796,7 @@
           <p:cNvPr id="3" name="Marcador de contenido 2">
             <a:extLst>
               <a:ext uri="{FF2B5EF4-FFF2-40B4-BE49-F238E27FC236}">
-                <a16:creationId xmlns:a16="http://schemas.microsoft.com/office/drawing/2014/main" id="{F11EB9E3-5565-4D5C-B2A4-2E390E46425F}"/>
+                <a16:creationId xmlns:a16="http://schemas.microsoft.com/office/drawing/2014/main" id="{0B51FE8A-E64A-4D8F-BB06-5696712B92FE}"/>
               </a:ext>
             </a:extLst>
           </p:cNvPr>
@@ -10773,56 +10819,144 @@
           <a:p>
             <a:r>
               <a:rPr lang="es-ES" dirty="0"/>
-              <a:t>Es la iteración que mejores resultados ha conseguido:</a:t>
-            </a:r>
-          </a:p>
-          <a:p>
+              <a:t>Dos acercamientos al problema</a:t>
+            </a:r>
+          </a:p>
+          <a:p>
+            <a:pPr lvl="1"/>
+            <a:r>
+              <a:rPr lang="en-US" dirty="0" err="1"/>
+              <a:t>Clasificar</a:t>
+            </a:r>
+            <a:r>
+              <a:rPr lang="en-US" dirty="0"/>
+              <a:t> por “</a:t>
+            </a:r>
+            <a:r>
+              <a:rPr lang="en-US" i="1" dirty="0"/>
+              <a:t>Do you currently have a mental disorder?”</a:t>
+            </a:r>
             <a:endParaRPr lang="es-ES" dirty="0"/>
           </a:p>
           <a:p>
+            <a:pPr lvl="1"/>
+            <a:r>
+              <a:rPr lang="en-US" dirty="0" err="1"/>
+              <a:t>Clasificar</a:t>
+            </a:r>
+            <a:r>
+              <a:rPr lang="en-US" dirty="0"/>
+              <a:t> </a:t>
+            </a:r>
+            <a:r>
+              <a:rPr lang="en-US" dirty="0" err="1"/>
+              <a:t>juntando</a:t>
+            </a:r>
+            <a:r>
+              <a:rPr lang="en-US" dirty="0"/>
+              <a:t> las dos </a:t>
+            </a:r>
+            <a:r>
+              <a:rPr lang="en-US" dirty="0" err="1"/>
+              <a:t>columnas</a:t>
+            </a:r>
+            <a:r>
+              <a:rPr lang="en-US" dirty="0"/>
+              <a:t> “</a:t>
+            </a:r>
+            <a:r>
+              <a:rPr lang="en-US" i="1" dirty="0"/>
+              <a:t>If yes, what condition(s) have you been diagnosed with?” </a:t>
+            </a:r>
+            <a:r>
+              <a:rPr lang="en-US" dirty="0"/>
+              <a:t>y </a:t>
+            </a:r>
+            <a:r>
+              <a:rPr lang="en-US" i="1" dirty="0"/>
+              <a:t>“If maybe, what condition(s) have you been diagnosed with?”</a:t>
+            </a:r>
+          </a:p>
+          <a:p>
+            <a:pPr lvl="1"/>
+            <a:endParaRPr lang="en-US" i="1" dirty="0"/>
+          </a:p>
+          <a:p>
+            <a:r>
+              <a:rPr lang="es-ES" dirty="0"/>
+              <a:t>El primero…</a:t>
+            </a:r>
+          </a:p>
+          <a:p>
+            <a:pPr lvl="1"/>
+            <a:r>
+              <a:rPr lang="es-ES" dirty="0"/>
+              <a:t>Fue la principal idea del proyecto</a:t>
+            </a:r>
+          </a:p>
+          <a:p>
+            <a:pPr lvl="1"/>
+            <a:r>
+              <a:rPr lang="es-ES" dirty="0"/>
+              <a:t>Dio una </a:t>
+            </a:r>
+            <a:r>
+              <a:rPr lang="es-ES" i="1" dirty="0" err="1"/>
+              <a:t>accuracy</a:t>
+            </a:r>
+            <a:r>
+              <a:rPr lang="es-ES" dirty="0"/>
+              <a:t> final de 77.4%</a:t>
+            </a:r>
+          </a:p>
+          <a:p>
+            <a:pPr lvl="1"/>
             <a:endParaRPr lang="es-ES" dirty="0"/>
           </a:p>
           <a:p>
-            <a:pPr marL="0" indent="0" algn="ctr">
+            <a:pPr marL="457200" lvl="1" indent="0">
               <a:buNone/>
             </a:pPr>
-            <a:r>
-              <a:rPr lang="es-ES" sz="2800" dirty="0"/>
-              <a:t>¡83.5% </a:t>
-            </a:r>
-            <a:r>
-              <a:rPr lang="es-ES" sz="2800" i="1" dirty="0" err="1"/>
-              <a:t>accuracy</a:t>
-            </a:r>
-            <a:r>
-              <a:rPr lang="es-ES" sz="2800" dirty="0"/>
-              <a:t>!...</a:t>
-            </a:r>
-          </a:p>
-          <a:p>
-            <a:pPr marL="0" indent="0" algn="ctr">
-              <a:buNone/>
-            </a:pPr>
-            <a:endParaRPr lang="es-ES" sz="2800" i="1" dirty="0"/>
-          </a:p>
-          <a:p>
-            <a:r>
-              <a:rPr lang="es-ES" dirty="0"/>
-              <a:t>No clasifica bien ningún dato de la clase 1 “Otras enfermedades mentales”</a:t>
-            </a:r>
-          </a:p>
-          <a:p>
-            <a:pPr marL="0" indent="0">
-              <a:buNone/>
-            </a:pPr>
-            <a:endParaRPr lang="es-ES" sz="2800" i="1" dirty="0"/>
-          </a:p>
-        </p:txBody>
-      </p:sp>
+            <a:endParaRPr lang="es-ES" i="1" dirty="0"/>
+          </a:p>
+          <a:p>
+            <a:pPr lvl="1"/>
+            <a:endParaRPr lang="es-ES" i="1" dirty="0"/>
+          </a:p>
+        </p:txBody>
+      </p:sp>
+      <p:pic>
+        <p:nvPicPr>
+          <p:cNvPr id="4" name="Imagen 3">
+            <a:extLst>
+              <a:ext uri="{FF2B5EF4-FFF2-40B4-BE49-F238E27FC236}">
+                <a16:creationId xmlns:a16="http://schemas.microsoft.com/office/drawing/2014/main" id="{0C724683-5DE0-498A-9149-8E57A89ABF13}"/>
+              </a:ext>
+            </a:extLst>
+          </p:cNvPr>
+          <p:cNvPicPr/>
+          <p:nvPr/>
+        </p:nvPicPr>
+        <p:blipFill>
+          <a:blip r:embed="rId2"/>
+          <a:stretch>
+            <a:fillRect/>
+          </a:stretch>
+        </p:blipFill>
+        <p:spPr>
+          <a:xfrm>
+            <a:off x="4827870" y="4446739"/>
+            <a:ext cx="6686796" cy="1889781"/>
+          </a:xfrm>
+          <a:prstGeom prst="rect">
+            <a:avLst/>
+          </a:prstGeom>
+        </p:spPr>
+      </p:pic>
     </p:spTree>
     <p:extLst>
       <p:ext uri="{BB962C8B-B14F-4D97-AF65-F5344CB8AC3E}">
-        <p14:creationId xmlns:p14="http://schemas.microsoft.com/office/powerpoint/2010/main" val="1710814961"/>
+        <p14:creationId xmlns:p14="http://schemas.microsoft.com/office/powerpoint/2010/main" val="2627573844"/>
       </p:ext>
     </p:extLst>
   </p:cSld>
@@ -10905,31 +11039,39 @@
           <a:p>
             <a:r>
               <a:rPr lang="es-ES" dirty="0"/>
-              <a:t>Curiosidad por saber el estado mental de una persona según su ambiente de trabajo</a:t>
+              <a:t>El segundo…</a:t>
             </a:r>
           </a:p>
           <a:p>
             <a:pPr lvl="1"/>
             <a:r>
-              <a:rPr lang="es-ES" i="1" dirty="0"/>
-              <a:t>“</a:t>
-            </a:r>
-            <a:r>
-              <a:rPr lang="en-US" i="1" dirty="0"/>
-              <a:t>Do you think that discussing a mental health disorder with your employer would have negative consequences?”</a:t>
-            </a:r>
-            <a:endParaRPr lang="es-ES" i="1" dirty="0"/>
+              <a:rPr lang="es-ES" dirty="0"/>
+              <a:t>Resultado de querer mejorar los resultados del primero</a:t>
+            </a:r>
           </a:p>
           <a:p>
             <a:pPr lvl="1"/>
             <a:r>
-              <a:rPr lang="es-ES" i="1" dirty="0"/>
-              <a:t>“</a:t>
-            </a:r>
-            <a:r>
-              <a:rPr lang="en-US" i="1" dirty="0"/>
-              <a:t>Has your employer ever formally discussed mental health (for example, as part of a wellness campaign or other official communication)?”</a:t>
-            </a:r>
+              <a:rPr lang="es-ES" dirty="0"/>
+              <a:t>Dio una </a:t>
+            </a:r>
+            <a:r>
+              <a:rPr lang="es-ES" i="1" dirty="0" err="1"/>
+              <a:t>accuracy</a:t>
+            </a:r>
+            <a:r>
+              <a:rPr lang="es-ES" dirty="0"/>
+              <a:t> final de 83.5%</a:t>
+            </a:r>
+          </a:p>
+          <a:p>
+            <a:pPr lvl="1"/>
+            <a:endParaRPr lang="es-ES" dirty="0"/>
+          </a:p>
+          <a:p>
+            <a:pPr marL="457200" lvl="1" indent="0">
+              <a:buNone/>
+            </a:pPr>
             <a:endParaRPr lang="es-ES" i="1" dirty="0"/>
           </a:p>
           <a:p>
@@ -10938,10 +11080,40 @@
           </a:p>
         </p:txBody>
       </p:sp>
+      <p:pic>
+        <p:nvPicPr>
+          <p:cNvPr id="6" name="Imagen 5">
+            <a:extLst>
+              <a:ext uri="{FF2B5EF4-FFF2-40B4-BE49-F238E27FC236}">
+                <a16:creationId xmlns:a16="http://schemas.microsoft.com/office/drawing/2014/main" id="{51EFAD8F-D3C5-430F-9939-B75BEB094E4F}"/>
+              </a:ext>
+            </a:extLst>
+          </p:cNvPr>
+          <p:cNvPicPr>
+            <a:picLocks noChangeAspect="1"/>
+          </p:cNvPicPr>
+          <p:nvPr/>
+        </p:nvPicPr>
+        <p:blipFill>
+          <a:blip r:embed="rId2"/>
+          <a:stretch>
+            <a:fillRect/>
+          </a:stretch>
+        </p:blipFill>
+        <p:spPr>
+          <a:xfrm>
+            <a:off x="5086896" y="3006542"/>
+            <a:ext cx="6953874" cy="1865977"/>
+          </a:xfrm>
+          <a:prstGeom prst="rect">
+            <a:avLst/>
+          </a:prstGeom>
+        </p:spPr>
+      </p:pic>
     </p:spTree>
     <p:extLst>
       <p:ext uri="{BB962C8B-B14F-4D97-AF65-F5344CB8AC3E}">
-        <p14:creationId xmlns:p14="http://schemas.microsoft.com/office/powerpoint/2010/main" val="116903557"/>
+        <p14:creationId xmlns:p14="http://schemas.microsoft.com/office/powerpoint/2010/main" val="2782852812"/>
       </p:ext>
     </p:extLst>
   </p:cSld>
@@ -11024,76 +11196,159 @@
           <a:p>
             <a:r>
               <a:rPr lang="es-ES" dirty="0"/>
-              <a:t>Curiosidad por saber el estado mental de una persona según su ambiente de trabajo</a:t>
-            </a:r>
-            <a:endParaRPr lang="es-ES" i="1" dirty="0"/>
+              <a:t>El segundo…</a:t>
+            </a:r>
           </a:p>
           <a:p>
             <a:pPr lvl="1"/>
             <a:r>
-              <a:rPr lang="es-ES" i="1" dirty="0"/>
-              <a:t>“</a:t>
-            </a:r>
-            <a:r>
-              <a:rPr lang="en-US" i="1" dirty="0"/>
-              <a:t>Do you think that discussing a mental health disorder with your employer would have negative consequences?”</a:t>
-            </a:r>
-            <a:endParaRPr lang="es-ES" i="1" dirty="0"/>
+              <a:rPr lang="es-ES" dirty="0"/>
+              <a:t>Resultado de querer mejorar los resultados del primero</a:t>
+            </a:r>
           </a:p>
           <a:p>
             <a:pPr lvl="1"/>
             <a:r>
-              <a:rPr lang="es-ES" i="1" dirty="0"/>
-              <a:t>“</a:t>
-            </a:r>
-            <a:r>
-              <a:rPr lang="en-US" i="1" dirty="0"/>
-              <a:t>Has your employer ever formally discussed mental health (for example, as part of a wellness campaign or other official communication)?”</a:t>
-            </a:r>
+              <a:rPr lang="es-ES" dirty="0"/>
+              <a:t>Dio una </a:t>
+            </a:r>
+            <a:r>
+              <a:rPr lang="es-ES" i="1" dirty="0" err="1"/>
+              <a:t>accuracy</a:t>
+            </a:r>
+            <a:r>
+              <a:rPr lang="es-ES" dirty="0"/>
+              <a:t> final de 83.5%</a:t>
+            </a:r>
+          </a:p>
+          <a:p>
+            <a:pPr lvl="1"/>
+            <a:endParaRPr lang="es-ES" dirty="0"/>
+          </a:p>
+          <a:p>
+            <a:pPr marL="457200" lvl="1" indent="0">
+              <a:buNone/>
+            </a:pPr>
             <a:endParaRPr lang="es-ES" i="1" dirty="0"/>
           </a:p>
           <a:p>
             <a:pPr lvl="1"/>
             <a:endParaRPr lang="es-ES" i="1" dirty="0"/>
           </a:p>
-          <a:p>
-            <a:r>
-              <a:rPr lang="es-ES" dirty="0"/>
-              <a:t>Preguntas más importantes que esas</a:t>
-            </a:r>
-          </a:p>
-          <a:p>
-            <a:pPr lvl="1"/>
-            <a:r>
-              <a:rPr lang="es-ES" dirty="0"/>
-              <a:t>“</a:t>
-            </a:r>
-            <a:r>
-              <a:rPr lang="en-US" i="1" dirty="0"/>
-              <a:t>If you have a mental health issue do you feel that it interferes with your work when NOT being treated effectively?”</a:t>
-            </a:r>
-            <a:endParaRPr lang="es-ES" dirty="0"/>
-          </a:p>
-          <a:p>
-            <a:pPr marL="457200" lvl="1" indent="0">
-              <a:buNone/>
-            </a:pPr>
-            <a:endParaRPr lang="es-ES" dirty="0"/>
-          </a:p>
-          <a:p>
-            <a:pPr lvl="1"/>
-            <a:endParaRPr lang="es-ES" i="1" dirty="0"/>
-          </a:p>
-          <a:p>
-            <a:pPr lvl="1"/>
-            <a:endParaRPr lang="es-ES" i="1" dirty="0"/>
-          </a:p>
-        </p:txBody>
-      </p:sp>
+        </p:txBody>
+      </p:sp>
+      <p:pic>
+        <p:nvPicPr>
+          <p:cNvPr id="6" name="Imagen 5">
+            <a:extLst>
+              <a:ext uri="{FF2B5EF4-FFF2-40B4-BE49-F238E27FC236}">
+                <a16:creationId xmlns:a16="http://schemas.microsoft.com/office/drawing/2014/main" id="{51EFAD8F-D3C5-430F-9939-B75BEB094E4F}"/>
+              </a:ext>
+            </a:extLst>
+          </p:cNvPr>
+          <p:cNvPicPr>
+            <a:picLocks noChangeAspect="1"/>
+          </p:cNvPicPr>
+          <p:nvPr/>
+        </p:nvPicPr>
+        <p:blipFill>
+          <a:blip r:embed="rId2"/>
+          <a:stretch>
+            <a:fillRect/>
+          </a:stretch>
+        </p:blipFill>
+        <p:spPr>
+          <a:xfrm>
+            <a:off x="5086896" y="3006542"/>
+            <a:ext cx="6953874" cy="1865977"/>
+          </a:xfrm>
+          <a:prstGeom prst="rect">
+            <a:avLst/>
+          </a:prstGeom>
+        </p:spPr>
+      </p:pic>
+      <p:pic>
+        <p:nvPicPr>
+          <p:cNvPr id="7" name="Imagen 6">
+            <a:extLst>
+              <a:ext uri="{FF2B5EF4-FFF2-40B4-BE49-F238E27FC236}">
+                <a16:creationId xmlns:a16="http://schemas.microsoft.com/office/drawing/2014/main" id="{4E3E5C92-14C2-454D-9ECC-589C03777142}"/>
+              </a:ext>
+            </a:extLst>
+          </p:cNvPr>
+          <p:cNvPicPr/>
+          <p:nvPr/>
+        </p:nvPicPr>
+        <p:blipFill>
+          <a:blip r:embed="rId3" cstate="print">
+            <a:extLst>
+              <a:ext uri="{28A0092B-C50C-407E-A947-70E740481C1C}">
+                <a14:useLocalDpi xmlns:a14="http://schemas.microsoft.com/office/drawing/2010/main" val="0"/>
+              </a:ext>
+            </a:extLst>
+          </a:blip>
+          <a:srcRect/>
+          <a:stretch>
+            <a:fillRect/>
+          </a:stretch>
+        </p:blipFill>
+        <p:spPr bwMode="auto">
+          <a:xfrm>
+            <a:off x="1066962" y="3506166"/>
+            <a:ext cx="4019934" cy="2732709"/>
+          </a:xfrm>
+          <a:prstGeom prst="rect">
+            <a:avLst/>
+          </a:prstGeom>
+          <a:noFill/>
+          <a:ln>
+            <a:noFill/>
+          </a:ln>
+        </p:spPr>
+      </p:pic>
+      <p:pic>
+        <p:nvPicPr>
+          <p:cNvPr id="8" name="Imagen 7">
+            <a:extLst>
+              <a:ext uri="{FF2B5EF4-FFF2-40B4-BE49-F238E27FC236}">
+                <a16:creationId xmlns:a16="http://schemas.microsoft.com/office/drawing/2014/main" id="{7D71ED0B-4267-4600-BE9E-3379464E5A17}"/>
+              </a:ext>
+            </a:extLst>
+          </p:cNvPr>
+          <p:cNvPicPr/>
+          <p:nvPr/>
+        </p:nvPicPr>
+        <p:blipFill>
+          <a:blip r:embed="rId4" cstate="print">
+            <a:extLst>
+              <a:ext uri="{28A0092B-C50C-407E-A947-70E740481C1C}">
+                <a14:useLocalDpi xmlns:a14="http://schemas.microsoft.com/office/drawing/2010/main" val="0"/>
+              </a:ext>
+            </a:extLst>
+          </a:blip>
+          <a:srcRect/>
+          <a:stretch>
+            <a:fillRect/>
+          </a:stretch>
+        </p:blipFill>
+        <p:spPr bwMode="auto">
+          <a:xfrm>
+            <a:off x="5220072" y="3467582"/>
+            <a:ext cx="4098322" cy="2809875"/>
+          </a:xfrm>
+          <a:prstGeom prst="rect">
+            <a:avLst/>
+          </a:prstGeom>
+          <a:noFill/>
+          <a:ln>
+            <a:noFill/>
+          </a:ln>
+        </p:spPr>
+      </p:pic>
     </p:spTree>
     <p:extLst>
       <p:ext uri="{BB962C8B-B14F-4D97-AF65-F5344CB8AC3E}">
-        <p14:creationId xmlns:p14="http://schemas.microsoft.com/office/powerpoint/2010/main" val="2710937869"/>
+        <p14:creationId xmlns:p14="http://schemas.microsoft.com/office/powerpoint/2010/main" val="1772135014"/>
       </p:ext>
     </p:extLst>
   </p:cSld>
@@ -11167,76 +11422,43 @@
         <p:spPr>
           <a:xfrm>
             <a:off x="677334" y="1930400"/>
-            <a:ext cx="8596668" cy="4620712"/>
+            <a:ext cx="8596668" cy="3880773"/>
           </a:xfrm>
         </p:spPr>
         <p:txBody>
-          <a:bodyPr>
-            <a:normAutofit/>
-          </a:bodyPr>
-          <a:lstStyle/>
-          <a:p>
-            <a:r>
-              <a:rPr lang="es-ES" dirty="0"/>
-              <a:t>Curiosidad por saber el estado mental de una persona según su ambiente de trabajo</a:t>
-            </a:r>
-            <a:endParaRPr lang="es-ES" i="1" dirty="0"/>
+          <a:bodyPr/>
+          <a:lstStyle/>
+          <a:p>
+            <a:r>
+              <a:rPr lang="es-ES" dirty="0"/>
+              <a:t>Me hubiera gustado tener una </a:t>
+            </a:r>
+            <a:r>
+              <a:rPr lang="es-ES" dirty="0" err="1"/>
+              <a:t>accuracy</a:t>
+            </a:r>
+            <a:r>
+              <a:rPr lang="es-ES" dirty="0"/>
+              <a:t> &gt; 90%</a:t>
+            </a:r>
           </a:p>
           <a:p>
             <a:pPr lvl="1"/>
             <a:r>
-              <a:rPr lang="es-ES" i="1" dirty="0"/>
-              <a:t>“</a:t>
-            </a:r>
-            <a:r>
-              <a:rPr lang="en-US" i="1" dirty="0"/>
-              <a:t>Do you think that discussing a mental health disorder with your employer would have negative consequences?”</a:t>
-            </a:r>
-            <a:endParaRPr lang="es-ES" i="1" dirty="0"/>
+              <a:rPr lang="es-ES" dirty="0"/>
+              <a:t>Es una encuesta…</a:t>
+            </a:r>
           </a:p>
           <a:p>
             <a:pPr lvl="1"/>
             <a:r>
-              <a:rPr lang="es-ES" i="1" dirty="0"/>
-              <a:t>“</a:t>
-            </a:r>
-            <a:r>
-              <a:rPr lang="en-US" i="1" dirty="0"/>
-              <a:t>Has your employer ever formally discussed mental health (for example, as part of a wellness campaign or other official communication)?”</a:t>
-            </a:r>
-            <a:endParaRPr lang="es-ES" i="1" dirty="0"/>
+              <a:rPr lang="es-ES" dirty="0"/>
+              <a:t>… Faltan bastantes datos</a:t>
+            </a:r>
           </a:p>
           <a:p>
             <a:pPr lvl="1"/>
-            <a:endParaRPr lang="es-ES" i="1" dirty="0"/>
-          </a:p>
-          <a:p>
-            <a:r>
-              <a:rPr lang="es-ES" dirty="0"/>
-              <a:t>Preguntas más importantes que esas</a:t>
-            </a:r>
-          </a:p>
-          <a:p>
-            <a:pPr lvl="1"/>
-            <a:r>
-              <a:rPr lang="en-US" i="1" dirty="0"/>
-              <a:t>“If you have a mental health issue do you feel that it interferes with your work when NOT being treated effectively?”</a:t>
-            </a:r>
             <a:endParaRPr lang="es-ES" dirty="0"/>
-          </a:p>
-          <a:p>
-            <a:pPr lvl="1"/>
-            <a:endParaRPr lang="es-ES" i="1" dirty="0"/>
-          </a:p>
-          <a:p>
-            <a:pPr marL="457200" lvl="1" indent="0" algn="ctr">
-              <a:buNone/>
-            </a:pPr>
-            <a:r>
-              <a:rPr lang="es-ES" sz="2800" i="1" dirty="0"/>
-              <a:t>Experiencia</a:t>
-            </a:r>
-            <a:endParaRPr lang="es-ES" sz="2800" dirty="0"/>
           </a:p>
           <a:p>
             <a:pPr marL="457200" lvl="1" indent="0">
@@ -11253,7 +11475,7 @@
     </p:spTree>
     <p:extLst>
       <p:ext uri="{BB962C8B-B14F-4D97-AF65-F5344CB8AC3E}">
-        <p14:creationId xmlns:p14="http://schemas.microsoft.com/office/powerpoint/2010/main" val="1525357811"/>
+        <p14:creationId xmlns:p14="http://schemas.microsoft.com/office/powerpoint/2010/main" val="288374479"/>
       </p:ext>
     </p:extLst>
   </p:cSld>
@@ -11446,749 +11668,6 @@
           <p:cNvPr id="2" name="Título 1">
             <a:extLst>
               <a:ext uri="{FF2B5EF4-FFF2-40B4-BE49-F238E27FC236}">
-                <a16:creationId xmlns:a16="http://schemas.microsoft.com/office/drawing/2014/main" id="{8E9E77AC-1263-47E0-B404-50B7E866533C}"/>
-              </a:ext>
-            </a:extLst>
-          </p:cNvPr>
-          <p:cNvSpPr>
-            <a:spLocks noGrp="1"/>
-          </p:cNvSpPr>
-          <p:nvPr>
-            <p:ph type="title"/>
-          </p:nvPr>
-        </p:nvSpPr>
-        <p:spPr/>
-        <p:txBody>
-          <a:bodyPr/>
-          <a:lstStyle/>
-          <a:p>
-            <a:r>
-              <a:rPr lang="es-ES" dirty="0"/>
-              <a:t>3. Conclusiones generales</a:t>
-            </a:r>
-          </a:p>
-        </p:txBody>
-      </p:sp>
-      <p:sp>
-        <p:nvSpPr>
-          <p:cNvPr id="3" name="Marcador de contenido 2">
-            <a:extLst>
-              <a:ext uri="{FF2B5EF4-FFF2-40B4-BE49-F238E27FC236}">
-                <a16:creationId xmlns:a16="http://schemas.microsoft.com/office/drawing/2014/main" id="{0B51FE8A-E64A-4D8F-BB06-5696712B92FE}"/>
-              </a:ext>
-            </a:extLst>
-          </p:cNvPr>
-          <p:cNvSpPr>
-            <a:spLocks noGrp="1"/>
-          </p:cNvSpPr>
-          <p:nvPr>
-            <p:ph idx="1"/>
-          </p:nvPr>
-        </p:nvSpPr>
-        <p:spPr>
-          <a:xfrm>
-            <a:off x="677334" y="1930400"/>
-            <a:ext cx="8596668" cy="3880773"/>
-          </a:xfrm>
-        </p:spPr>
-        <p:txBody>
-          <a:bodyPr/>
-          <a:lstStyle/>
-          <a:p>
-            <a:r>
-              <a:rPr lang="es-ES" dirty="0"/>
-              <a:t>Dos acercamientos al problema</a:t>
-            </a:r>
-          </a:p>
-          <a:p>
-            <a:pPr lvl="1"/>
-            <a:r>
-              <a:rPr lang="en-US" dirty="0" err="1"/>
-              <a:t>Clasificar</a:t>
-            </a:r>
-            <a:r>
-              <a:rPr lang="en-US" dirty="0"/>
-              <a:t> por “</a:t>
-            </a:r>
-            <a:r>
-              <a:rPr lang="en-US" i="1" dirty="0"/>
-              <a:t>Do you currently have a mental disorder?”</a:t>
-            </a:r>
-            <a:endParaRPr lang="es-ES" dirty="0"/>
-          </a:p>
-          <a:p>
-            <a:pPr lvl="1"/>
-            <a:r>
-              <a:rPr lang="en-US" dirty="0" err="1"/>
-              <a:t>Clasificar</a:t>
-            </a:r>
-            <a:r>
-              <a:rPr lang="en-US" dirty="0"/>
-              <a:t> </a:t>
-            </a:r>
-            <a:r>
-              <a:rPr lang="en-US" dirty="0" err="1"/>
-              <a:t>juntando</a:t>
-            </a:r>
-            <a:r>
-              <a:rPr lang="en-US" dirty="0"/>
-              <a:t> las dos </a:t>
-            </a:r>
-            <a:r>
-              <a:rPr lang="en-US" dirty="0" err="1"/>
-              <a:t>columnas</a:t>
-            </a:r>
-            <a:r>
-              <a:rPr lang="en-US" dirty="0"/>
-              <a:t> “</a:t>
-            </a:r>
-            <a:r>
-              <a:rPr lang="en-US" i="1" dirty="0"/>
-              <a:t>If yes, what condition(s) have you been diagnosed with?” </a:t>
-            </a:r>
-            <a:r>
-              <a:rPr lang="en-US" dirty="0"/>
-              <a:t>y </a:t>
-            </a:r>
-            <a:r>
-              <a:rPr lang="en-US" i="1" dirty="0"/>
-              <a:t>“If maybe, what condition(s) have you been diagnosed with?”</a:t>
-            </a:r>
-            <a:endParaRPr lang="es-ES" dirty="0"/>
-          </a:p>
-          <a:p>
-            <a:pPr lvl="1"/>
-            <a:endParaRPr lang="es-ES" dirty="0"/>
-          </a:p>
-          <a:p>
-            <a:pPr marL="457200" lvl="1" indent="0">
-              <a:buNone/>
-            </a:pPr>
-            <a:endParaRPr lang="es-ES" i="1" dirty="0"/>
-          </a:p>
-          <a:p>
-            <a:pPr lvl="1"/>
-            <a:endParaRPr lang="es-ES" i="1" dirty="0"/>
-          </a:p>
-        </p:txBody>
-      </p:sp>
-    </p:spTree>
-    <p:extLst>
-      <p:ext uri="{BB962C8B-B14F-4D97-AF65-F5344CB8AC3E}">
-        <p14:creationId xmlns:p14="http://schemas.microsoft.com/office/powerpoint/2010/main" val="1660074570"/>
-      </p:ext>
-    </p:extLst>
-  </p:cSld>
-  <p:clrMapOvr>
-    <a:masterClrMapping/>
-  </p:clrMapOvr>
-</p:sld>
-</file>
-
-<file path=ppt/slides/slide41.xml><?xml version="1.0" encoding="utf-8"?>
-<p:sld xmlns:a="http://schemas.openxmlformats.org/drawingml/2006/main" xmlns:r="http://schemas.openxmlformats.org/officeDocument/2006/relationships" xmlns:p="http://schemas.openxmlformats.org/presentationml/2006/main">
-  <p:cSld>
-    <p:spTree>
-      <p:nvGrpSpPr>
-        <p:cNvPr id="1" name=""/>
-        <p:cNvGrpSpPr/>
-        <p:nvPr/>
-      </p:nvGrpSpPr>
-      <p:grpSpPr>
-        <a:xfrm>
-          <a:off x="0" y="0"/>
-          <a:ext cx="0" cy="0"/>
-          <a:chOff x="0" y="0"/>
-          <a:chExt cx="0" cy="0"/>
-        </a:xfrm>
-      </p:grpSpPr>
-      <p:sp>
-        <p:nvSpPr>
-          <p:cNvPr id="2" name="Título 1">
-            <a:extLst>
-              <a:ext uri="{FF2B5EF4-FFF2-40B4-BE49-F238E27FC236}">
-                <a16:creationId xmlns:a16="http://schemas.microsoft.com/office/drawing/2014/main" id="{8E9E77AC-1263-47E0-B404-50B7E866533C}"/>
-              </a:ext>
-            </a:extLst>
-          </p:cNvPr>
-          <p:cNvSpPr>
-            <a:spLocks noGrp="1"/>
-          </p:cNvSpPr>
-          <p:nvPr>
-            <p:ph type="title"/>
-          </p:nvPr>
-        </p:nvSpPr>
-        <p:spPr/>
-        <p:txBody>
-          <a:bodyPr/>
-          <a:lstStyle/>
-          <a:p>
-            <a:r>
-              <a:rPr lang="es-ES" dirty="0"/>
-              <a:t>3. Conclusiones generales</a:t>
-            </a:r>
-          </a:p>
-        </p:txBody>
-      </p:sp>
-      <p:sp>
-        <p:nvSpPr>
-          <p:cNvPr id="3" name="Marcador de contenido 2">
-            <a:extLst>
-              <a:ext uri="{FF2B5EF4-FFF2-40B4-BE49-F238E27FC236}">
-                <a16:creationId xmlns:a16="http://schemas.microsoft.com/office/drawing/2014/main" id="{0B51FE8A-E64A-4D8F-BB06-5696712B92FE}"/>
-              </a:ext>
-            </a:extLst>
-          </p:cNvPr>
-          <p:cNvSpPr>
-            <a:spLocks noGrp="1"/>
-          </p:cNvSpPr>
-          <p:nvPr>
-            <p:ph idx="1"/>
-          </p:nvPr>
-        </p:nvSpPr>
-        <p:spPr>
-          <a:xfrm>
-            <a:off x="677334" y="1930400"/>
-            <a:ext cx="8596668" cy="3880773"/>
-          </a:xfrm>
-        </p:spPr>
-        <p:txBody>
-          <a:bodyPr/>
-          <a:lstStyle/>
-          <a:p>
-            <a:r>
-              <a:rPr lang="es-ES" dirty="0"/>
-              <a:t>Dos acercamientos al problema</a:t>
-            </a:r>
-          </a:p>
-          <a:p>
-            <a:pPr lvl="1"/>
-            <a:r>
-              <a:rPr lang="en-US" dirty="0" err="1"/>
-              <a:t>Clasificar</a:t>
-            </a:r>
-            <a:r>
-              <a:rPr lang="en-US" dirty="0"/>
-              <a:t> por “</a:t>
-            </a:r>
-            <a:r>
-              <a:rPr lang="en-US" i="1" dirty="0"/>
-              <a:t>Do you currently have a mental disorder?”</a:t>
-            </a:r>
-            <a:endParaRPr lang="es-ES" dirty="0"/>
-          </a:p>
-          <a:p>
-            <a:pPr lvl="1"/>
-            <a:r>
-              <a:rPr lang="en-US" dirty="0" err="1"/>
-              <a:t>Clasificar</a:t>
-            </a:r>
-            <a:r>
-              <a:rPr lang="en-US" dirty="0"/>
-              <a:t> </a:t>
-            </a:r>
-            <a:r>
-              <a:rPr lang="en-US" dirty="0" err="1"/>
-              <a:t>juntando</a:t>
-            </a:r>
-            <a:r>
-              <a:rPr lang="en-US" dirty="0"/>
-              <a:t> las dos </a:t>
-            </a:r>
-            <a:r>
-              <a:rPr lang="en-US" dirty="0" err="1"/>
-              <a:t>columnas</a:t>
-            </a:r>
-            <a:r>
-              <a:rPr lang="en-US" dirty="0"/>
-              <a:t> “</a:t>
-            </a:r>
-            <a:r>
-              <a:rPr lang="en-US" i="1" dirty="0"/>
-              <a:t>If yes, what condition(s) have you been diagnosed with?” </a:t>
-            </a:r>
-            <a:r>
-              <a:rPr lang="en-US" dirty="0"/>
-              <a:t>y </a:t>
-            </a:r>
-            <a:r>
-              <a:rPr lang="en-US" i="1" dirty="0"/>
-              <a:t>“If maybe, what condition(s) have you been diagnosed with?”</a:t>
-            </a:r>
-          </a:p>
-          <a:p>
-            <a:pPr lvl="1"/>
-            <a:endParaRPr lang="en-US" i="1" dirty="0"/>
-          </a:p>
-          <a:p>
-            <a:r>
-              <a:rPr lang="es-ES" dirty="0"/>
-              <a:t>El primero…</a:t>
-            </a:r>
-          </a:p>
-          <a:p>
-            <a:pPr lvl="1"/>
-            <a:r>
-              <a:rPr lang="es-ES" dirty="0"/>
-              <a:t>Fue la principal idea del proyecto</a:t>
-            </a:r>
-          </a:p>
-          <a:p>
-            <a:pPr lvl="1"/>
-            <a:r>
-              <a:rPr lang="es-ES" dirty="0"/>
-              <a:t>Dio una </a:t>
-            </a:r>
-            <a:r>
-              <a:rPr lang="es-ES" i="1" dirty="0" err="1"/>
-              <a:t>accuracy</a:t>
-            </a:r>
-            <a:r>
-              <a:rPr lang="es-ES" dirty="0"/>
-              <a:t> final de 77.4%</a:t>
-            </a:r>
-          </a:p>
-          <a:p>
-            <a:pPr lvl="1"/>
-            <a:endParaRPr lang="es-ES" dirty="0"/>
-          </a:p>
-          <a:p>
-            <a:pPr marL="457200" lvl="1" indent="0">
-              <a:buNone/>
-            </a:pPr>
-            <a:endParaRPr lang="es-ES" i="1" dirty="0"/>
-          </a:p>
-          <a:p>
-            <a:pPr lvl="1"/>
-            <a:endParaRPr lang="es-ES" i="1" dirty="0"/>
-          </a:p>
-        </p:txBody>
-      </p:sp>
-      <p:pic>
-        <p:nvPicPr>
-          <p:cNvPr id="4" name="Imagen 3">
-            <a:extLst>
-              <a:ext uri="{FF2B5EF4-FFF2-40B4-BE49-F238E27FC236}">
-                <a16:creationId xmlns:a16="http://schemas.microsoft.com/office/drawing/2014/main" id="{0C724683-5DE0-498A-9149-8E57A89ABF13}"/>
-              </a:ext>
-            </a:extLst>
-          </p:cNvPr>
-          <p:cNvPicPr/>
-          <p:nvPr/>
-        </p:nvPicPr>
-        <p:blipFill>
-          <a:blip r:embed="rId2"/>
-          <a:stretch>
-            <a:fillRect/>
-          </a:stretch>
-        </p:blipFill>
-        <p:spPr>
-          <a:xfrm>
-            <a:off x="4827870" y="4446739"/>
-            <a:ext cx="6686796" cy="1889781"/>
-          </a:xfrm>
-          <a:prstGeom prst="rect">
-            <a:avLst/>
-          </a:prstGeom>
-        </p:spPr>
-      </p:pic>
-    </p:spTree>
-    <p:extLst>
-      <p:ext uri="{BB962C8B-B14F-4D97-AF65-F5344CB8AC3E}">
-        <p14:creationId xmlns:p14="http://schemas.microsoft.com/office/powerpoint/2010/main" val="2627573844"/>
-      </p:ext>
-    </p:extLst>
-  </p:cSld>
-  <p:clrMapOvr>
-    <a:masterClrMapping/>
-  </p:clrMapOvr>
-</p:sld>
-</file>
-
-<file path=ppt/slides/slide42.xml><?xml version="1.0" encoding="utf-8"?>
-<p:sld xmlns:a="http://schemas.openxmlformats.org/drawingml/2006/main" xmlns:r="http://schemas.openxmlformats.org/officeDocument/2006/relationships" xmlns:p="http://schemas.openxmlformats.org/presentationml/2006/main">
-  <p:cSld>
-    <p:spTree>
-      <p:nvGrpSpPr>
-        <p:cNvPr id="1" name=""/>
-        <p:cNvGrpSpPr/>
-        <p:nvPr/>
-      </p:nvGrpSpPr>
-      <p:grpSpPr>
-        <a:xfrm>
-          <a:off x="0" y="0"/>
-          <a:ext cx="0" cy="0"/>
-          <a:chOff x="0" y="0"/>
-          <a:chExt cx="0" cy="0"/>
-        </a:xfrm>
-      </p:grpSpPr>
-      <p:sp>
-        <p:nvSpPr>
-          <p:cNvPr id="2" name="Título 1">
-            <a:extLst>
-              <a:ext uri="{FF2B5EF4-FFF2-40B4-BE49-F238E27FC236}">
-                <a16:creationId xmlns:a16="http://schemas.microsoft.com/office/drawing/2014/main" id="{8E9E77AC-1263-47E0-B404-50B7E866533C}"/>
-              </a:ext>
-            </a:extLst>
-          </p:cNvPr>
-          <p:cNvSpPr>
-            <a:spLocks noGrp="1"/>
-          </p:cNvSpPr>
-          <p:nvPr>
-            <p:ph type="title"/>
-          </p:nvPr>
-        </p:nvSpPr>
-        <p:spPr/>
-        <p:txBody>
-          <a:bodyPr/>
-          <a:lstStyle/>
-          <a:p>
-            <a:r>
-              <a:rPr lang="es-ES" dirty="0"/>
-              <a:t>3. Conclusiones generales</a:t>
-            </a:r>
-          </a:p>
-        </p:txBody>
-      </p:sp>
-      <p:sp>
-        <p:nvSpPr>
-          <p:cNvPr id="3" name="Marcador de contenido 2">
-            <a:extLst>
-              <a:ext uri="{FF2B5EF4-FFF2-40B4-BE49-F238E27FC236}">
-                <a16:creationId xmlns:a16="http://schemas.microsoft.com/office/drawing/2014/main" id="{0B51FE8A-E64A-4D8F-BB06-5696712B92FE}"/>
-              </a:ext>
-            </a:extLst>
-          </p:cNvPr>
-          <p:cNvSpPr>
-            <a:spLocks noGrp="1"/>
-          </p:cNvSpPr>
-          <p:nvPr>
-            <p:ph idx="1"/>
-          </p:nvPr>
-        </p:nvSpPr>
-        <p:spPr>
-          <a:xfrm>
-            <a:off x="677334" y="1930400"/>
-            <a:ext cx="8596668" cy="3880773"/>
-          </a:xfrm>
-        </p:spPr>
-        <p:txBody>
-          <a:bodyPr/>
-          <a:lstStyle/>
-          <a:p>
-            <a:r>
-              <a:rPr lang="es-ES" dirty="0"/>
-              <a:t>El segundo…</a:t>
-            </a:r>
-          </a:p>
-          <a:p>
-            <a:pPr lvl="1"/>
-            <a:r>
-              <a:rPr lang="es-ES" dirty="0"/>
-              <a:t>Resultado de querer mejorar los resultados del primero</a:t>
-            </a:r>
-          </a:p>
-          <a:p>
-            <a:pPr lvl="1"/>
-            <a:r>
-              <a:rPr lang="es-ES" dirty="0"/>
-              <a:t>Dio una </a:t>
-            </a:r>
-            <a:r>
-              <a:rPr lang="es-ES" i="1" dirty="0" err="1"/>
-              <a:t>accuracy</a:t>
-            </a:r>
-            <a:r>
-              <a:rPr lang="es-ES" dirty="0"/>
-              <a:t> final de 82.6%</a:t>
-            </a:r>
-          </a:p>
-          <a:p>
-            <a:pPr lvl="1"/>
-            <a:endParaRPr lang="es-ES" dirty="0"/>
-          </a:p>
-          <a:p>
-            <a:pPr marL="457200" lvl="1" indent="0">
-              <a:buNone/>
-            </a:pPr>
-            <a:endParaRPr lang="es-ES" i="1" dirty="0"/>
-          </a:p>
-          <a:p>
-            <a:pPr lvl="1"/>
-            <a:endParaRPr lang="es-ES" i="1" dirty="0"/>
-          </a:p>
-        </p:txBody>
-      </p:sp>
-      <p:pic>
-        <p:nvPicPr>
-          <p:cNvPr id="6" name="Imagen 5">
-            <a:extLst>
-              <a:ext uri="{FF2B5EF4-FFF2-40B4-BE49-F238E27FC236}">
-                <a16:creationId xmlns:a16="http://schemas.microsoft.com/office/drawing/2014/main" id="{51EFAD8F-D3C5-430F-9939-B75BEB094E4F}"/>
-              </a:ext>
-            </a:extLst>
-          </p:cNvPr>
-          <p:cNvPicPr>
-            <a:picLocks noChangeAspect="1"/>
-          </p:cNvPicPr>
-          <p:nvPr/>
-        </p:nvPicPr>
-        <p:blipFill>
-          <a:blip r:embed="rId2"/>
-          <a:stretch>
-            <a:fillRect/>
-          </a:stretch>
-        </p:blipFill>
-        <p:spPr>
-          <a:xfrm>
-            <a:off x="4886781" y="2791616"/>
-            <a:ext cx="6953874" cy="1865977"/>
-          </a:xfrm>
-          <a:prstGeom prst="rect">
-            <a:avLst/>
-          </a:prstGeom>
-        </p:spPr>
-      </p:pic>
-      <p:pic>
-        <p:nvPicPr>
-          <p:cNvPr id="7" name="Imagen 6">
-            <a:extLst>
-              <a:ext uri="{FF2B5EF4-FFF2-40B4-BE49-F238E27FC236}">
-                <a16:creationId xmlns:a16="http://schemas.microsoft.com/office/drawing/2014/main" id="{4E3E5C92-14C2-454D-9ECC-589C03777142}"/>
-              </a:ext>
-            </a:extLst>
-          </p:cNvPr>
-          <p:cNvPicPr/>
-          <p:nvPr/>
-        </p:nvPicPr>
-        <p:blipFill>
-          <a:blip r:embed="rId3" cstate="print">
-            <a:extLst>
-              <a:ext uri="{28A0092B-C50C-407E-A947-70E740481C1C}">
-                <a14:useLocalDpi xmlns:a14="http://schemas.microsoft.com/office/drawing/2010/main" val="0"/>
-              </a:ext>
-            </a:extLst>
-          </a:blip>
-          <a:srcRect/>
-          <a:stretch>
-            <a:fillRect/>
-          </a:stretch>
-        </p:blipFill>
-        <p:spPr bwMode="auto">
-          <a:xfrm>
-            <a:off x="1066962" y="3506166"/>
-            <a:ext cx="4019934" cy="2732709"/>
-          </a:xfrm>
-          <a:prstGeom prst="rect">
-            <a:avLst/>
-          </a:prstGeom>
-          <a:noFill/>
-          <a:ln>
-            <a:noFill/>
-          </a:ln>
-        </p:spPr>
-      </p:pic>
-      <p:pic>
-        <p:nvPicPr>
-          <p:cNvPr id="8" name="Imagen 7">
-            <a:extLst>
-              <a:ext uri="{FF2B5EF4-FFF2-40B4-BE49-F238E27FC236}">
-                <a16:creationId xmlns:a16="http://schemas.microsoft.com/office/drawing/2014/main" id="{7D71ED0B-4267-4600-BE9E-3379464E5A17}"/>
-              </a:ext>
-            </a:extLst>
-          </p:cNvPr>
-          <p:cNvPicPr/>
-          <p:nvPr/>
-        </p:nvPicPr>
-        <p:blipFill>
-          <a:blip r:embed="rId4" cstate="print">
-            <a:extLst>
-              <a:ext uri="{28A0092B-C50C-407E-A947-70E740481C1C}">
-                <a14:useLocalDpi xmlns:a14="http://schemas.microsoft.com/office/drawing/2010/main" val="0"/>
-              </a:ext>
-            </a:extLst>
-          </a:blip>
-          <a:srcRect/>
-          <a:stretch>
-            <a:fillRect/>
-          </a:stretch>
-        </p:blipFill>
-        <p:spPr bwMode="auto">
-          <a:xfrm>
-            <a:off x="5220072" y="3467582"/>
-            <a:ext cx="4098322" cy="2809875"/>
-          </a:xfrm>
-          <a:prstGeom prst="rect">
-            <a:avLst/>
-          </a:prstGeom>
-          <a:noFill/>
-          <a:ln>
-            <a:noFill/>
-          </a:ln>
-        </p:spPr>
-      </p:pic>
-    </p:spTree>
-    <p:extLst>
-      <p:ext uri="{BB962C8B-B14F-4D97-AF65-F5344CB8AC3E}">
-        <p14:creationId xmlns:p14="http://schemas.microsoft.com/office/powerpoint/2010/main" val="2782852812"/>
-      </p:ext>
-    </p:extLst>
-  </p:cSld>
-  <p:clrMapOvr>
-    <a:masterClrMapping/>
-  </p:clrMapOvr>
-</p:sld>
-</file>
-
-<file path=ppt/slides/slide43.xml><?xml version="1.0" encoding="utf-8"?>
-<p:sld xmlns:a="http://schemas.openxmlformats.org/drawingml/2006/main" xmlns:r="http://schemas.openxmlformats.org/officeDocument/2006/relationships" xmlns:p="http://schemas.openxmlformats.org/presentationml/2006/main">
-  <p:cSld>
-    <p:spTree>
-      <p:nvGrpSpPr>
-        <p:cNvPr id="1" name=""/>
-        <p:cNvGrpSpPr/>
-        <p:nvPr/>
-      </p:nvGrpSpPr>
-      <p:grpSpPr>
-        <a:xfrm>
-          <a:off x="0" y="0"/>
-          <a:ext cx="0" cy="0"/>
-          <a:chOff x="0" y="0"/>
-          <a:chExt cx="0" cy="0"/>
-        </a:xfrm>
-      </p:grpSpPr>
-      <p:sp>
-        <p:nvSpPr>
-          <p:cNvPr id="2" name="Título 1">
-            <a:extLst>
-              <a:ext uri="{FF2B5EF4-FFF2-40B4-BE49-F238E27FC236}">
-                <a16:creationId xmlns:a16="http://schemas.microsoft.com/office/drawing/2014/main" id="{8E9E77AC-1263-47E0-B404-50B7E866533C}"/>
-              </a:ext>
-            </a:extLst>
-          </p:cNvPr>
-          <p:cNvSpPr>
-            <a:spLocks noGrp="1"/>
-          </p:cNvSpPr>
-          <p:nvPr>
-            <p:ph type="title"/>
-          </p:nvPr>
-        </p:nvSpPr>
-        <p:spPr/>
-        <p:txBody>
-          <a:bodyPr/>
-          <a:lstStyle/>
-          <a:p>
-            <a:r>
-              <a:rPr lang="es-ES" dirty="0"/>
-              <a:t>3. Conclusiones generales</a:t>
-            </a:r>
-          </a:p>
-        </p:txBody>
-      </p:sp>
-      <p:sp>
-        <p:nvSpPr>
-          <p:cNvPr id="3" name="Marcador de contenido 2">
-            <a:extLst>
-              <a:ext uri="{FF2B5EF4-FFF2-40B4-BE49-F238E27FC236}">
-                <a16:creationId xmlns:a16="http://schemas.microsoft.com/office/drawing/2014/main" id="{0B51FE8A-E64A-4D8F-BB06-5696712B92FE}"/>
-              </a:ext>
-            </a:extLst>
-          </p:cNvPr>
-          <p:cNvSpPr>
-            <a:spLocks noGrp="1"/>
-          </p:cNvSpPr>
-          <p:nvPr>
-            <p:ph idx="1"/>
-          </p:nvPr>
-        </p:nvSpPr>
-        <p:spPr>
-          <a:xfrm>
-            <a:off x="677334" y="1930400"/>
-            <a:ext cx="8596668" cy="3880773"/>
-          </a:xfrm>
-        </p:spPr>
-        <p:txBody>
-          <a:bodyPr/>
-          <a:lstStyle/>
-          <a:p>
-            <a:r>
-              <a:rPr lang="es-ES" dirty="0"/>
-              <a:t>Me hubiera gustado tener una </a:t>
-            </a:r>
-            <a:r>
-              <a:rPr lang="es-ES" dirty="0" err="1"/>
-              <a:t>accuracy</a:t>
-            </a:r>
-            <a:r>
-              <a:rPr lang="es-ES" dirty="0"/>
-              <a:t> &gt; 90%</a:t>
-            </a:r>
-          </a:p>
-          <a:p>
-            <a:pPr lvl="1"/>
-            <a:r>
-              <a:rPr lang="es-ES" dirty="0"/>
-              <a:t>Es una encuesta…</a:t>
-            </a:r>
-          </a:p>
-          <a:p>
-            <a:pPr lvl="1"/>
-            <a:r>
-              <a:rPr lang="es-ES" dirty="0"/>
-              <a:t>… Faltan bastantes datos</a:t>
-            </a:r>
-          </a:p>
-          <a:p>
-            <a:pPr lvl="1"/>
-            <a:endParaRPr lang="es-ES" dirty="0"/>
-          </a:p>
-          <a:p>
-            <a:pPr marL="457200" lvl="1" indent="0">
-              <a:buNone/>
-            </a:pPr>
-            <a:endParaRPr lang="es-ES" i="1" dirty="0"/>
-          </a:p>
-          <a:p>
-            <a:pPr lvl="1"/>
-            <a:endParaRPr lang="es-ES" i="1" dirty="0"/>
-          </a:p>
-        </p:txBody>
-      </p:sp>
-    </p:spTree>
-    <p:extLst>
-      <p:ext uri="{BB962C8B-B14F-4D97-AF65-F5344CB8AC3E}">
-        <p14:creationId xmlns:p14="http://schemas.microsoft.com/office/powerpoint/2010/main" val="288374479"/>
-      </p:ext>
-    </p:extLst>
-  </p:cSld>
-  <p:clrMapOvr>
-    <a:masterClrMapping/>
-  </p:clrMapOvr>
-</p:sld>
-</file>
-
-<file path=ppt/slides/slide44.xml><?xml version="1.0" encoding="utf-8"?>
-<p:sld xmlns:a="http://schemas.openxmlformats.org/drawingml/2006/main" xmlns:r="http://schemas.openxmlformats.org/officeDocument/2006/relationships" xmlns:p="http://schemas.openxmlformats.org/presentationml/2006/main">
-  <p:cSld>
-    <p:spTree>
-      <p:nvGrpSpPr>
-        <p:cNvPr id="1" name=""/>
-        <p:cNvGrpSpPr/>
-        <p:nvPr/>
-      </p:nvGrpSpPr>
-      <p:grpSpPr>
-        <a:xfrm>
-          <a:off x="0" y="0"/>
-          <a:ext cx="0" cy="0"/>
-          <a:chOff x="0" y="0"/>
-          <a:chExt cx="0" cy="0"/>
-        </a:xfrm>
-      </p:grpSpPr>
-      <p:sp>
-        <p:nvSpPr>
-          <p:cNvPr id="2" name="Título 1">
-            <a:extLst>
-              <a:ext uri="{FF2B5EF4-FFF2-40B4-BE49-F238E27FC236}">
                 <a16:creationId xmlns:a16="http://schemas.microsoft.com/office/drawing/2014/main" id="{18F746AF-7F83-4AC2-BDC1-76EC23E2C28D}"/>
               </a:ext>
             </a:extLst>
@@ -12661,7 +12140,7 @@
           <a:p>
             <a:r>
               <a:rPr lang="es-ES" dirty="0"/>
-              <a:t>Número de filas reducido a ______</a:t>
+              <a:t>Número de filas reducido a 1146</a:t>
             </a:r>
           </a:p>
           <a:p>
@@ -12991,28 +12470,18 @@
               <a:rPr lang="en-US" sz="2400" i="1" dirty="0">
                 <a:sym typeface="Wingdings" panose="05000000000000000000" pitchFamily="2" charset="2"/>
               </a:rPr>
-              <a:t>“I’m not sure” </a:t>
-            </a:r>
-            <a:r>
-              <a:rPr lang="en-US" sz="2400" dirty="0">
-                <a:solidFill>
-                  <a:srgbClr val="FF0000"/>
-                </a:solidFill>
-                <a:sym typeface="Wingdings" panose="05000000000000000000" pitchFamily="2" charset="2"/>
-              </a:rPr>
-              <a:t>PONER CUÁNTAS ME HE AHORRADO BORRAR</a:t>
-            </a:r>
-            <a:endParaRPr lang="es-ES" sz="2400" dirty="0">
-              <a:solidFill>
-                <a:srgbClr val="FF0000"/>
-              </a:solidFill>
-            </a:endParaRPr>
-          </a:p>
-          <a:p>
-            <a:pPr marL="457200" lvl="1" indent="0">
+              <a:t>“I’m not sure”</a:t>
+            </a:r>
+          </a:p>
+          <a:p>
+            <a:pPr marL="0" indent="0">
               <a:buNone/>
             </a:pPr>
-            <a:endParaRPr lang="es-ES" dirty="0"/>
+            <a:r>
+              <a:rPr lang="es-ES" sz="2800" dirty="0"/>
+              <a:t>Se evita borrar 133 datos.</a:t>
+            </a:r>
+            <a:endParaRPr lang="es-ES" sz="2400" dirty="0"/>
           </a:p>
           <a:p>
             <a:pPr marL="0" indent="0">

</xml_diff>